<commit_message>
Gameplay and Small World Generation  (#2)
* Enemy generated dynamically

* Mana

* Fixed Collider hitboxes

* Update SampleScene.unity

* GenerateAttacksFromJSON

* EnemyAI - Implemented not polished

* interface and qoe enemies changes

* Fixed attacks bugs and Added HealthBar UI

* Gameplay Completed (Missing Shield)

* Shield Gameplay
</commit_message>
<xml_diff>
--- a/ReportsAndOthers/Presentations/Presentation.pptx
+++ b/ReportsAndOthers/Presentations/Presentation.pptx
@@ -5,7 +5,7 @@
     <p:sldMasterId id="2147483710" r:id="rId1"/>
   </p:sldMasterIdLst>
   <p:notesMasterIdLst>
-    <p:notesMasterId r:id="rId10"/>
+    <p:notesMasterId r:id="rId12"/>
   </p:notesMasterIdLst>
   <p:sldIdLst>
     <p:sldId id="256" r:id="rId2"/>
@@ -15,22 +15,24 @@
     <p:sldId id="295" r:id="rId6"/>
     <p:sldId id="322" r:id="rId7"/>
     <p:sldId id="267" r:id="rId8"/>
-    <p:sldId id="315" r:id="rId9"/>
+    <p:sldId id="323" r:id="rId9"/>
+    <p:sldId id="324" r:id="rId10"/>
+    <p:sldId id="315" r:id="rId11"/>
   </p:sldIdLst>
   <p:sldSz cx="9144000" cy="5143500" type="screen16x9"/>
   <p:notesSz cx="6858000" cy="9144000"/>
   <p:embeddedFontLst>
     <p:embeddedFont>
       <p:font typeface="Didact Gothic" panose="00000500000000000000" pitchFamily="2" charset="0"/>
-      <p:regular r:id="rId11"/>
+      <p:regular r:id="rId13"/>
     </p:embeddedFont>
     <p:embeddedFont>
       <p:font typeface="Julius Sans One" panose="020B0604020202020204" charset="0"/>
-      <p:regular r:id="rId12"/>
+      <p:regular r:id="rId14"/>
     </p:embeddedFont>
     <p:embeddedFont>
       <p:font typeface="Questrial" pitchFamily="2" charset="0"/>
-      <p:regular r:id="rId13"/>
+      <p:regular r:id="rId15"/>
     </p:embeddedFont>
   </p:embeddedFontLst>
   <p:defaultTextStyle>
@@ -17591,6 +17593,442 @@
 </p:sld>
 </file>
 
+<file path=ppt/slides/slide10.xml><?xml version="1.0" encoding="utf-8"?>
+<p:sld xmlns:a="http://schemas.openxmlformats.org/drawingml/2006/main" xmlns:r="http://schemas.openxmlformats.org/officeDocument/2006/relationships" xmlns:p="http://schemas.openxmlformats.org/presentationml/2006/main">
+  <p:cSld>
+    <p:bg>
+      <p:bgPr>
+        <a:solidFill>
+          <a:schemeClr val="dk1"/>
+        </a:solidFill>
+        <a:effectLst/>
+      </p:bgPr>
+    </p:bg>
+    <p:spTree>
+      <p:nvGrpSpPr>
+        <p:cNvPr id="1" name="Shape 1540"/>
+        <p:cNvGrpSpPr/>
+        <p:nvPr/>
+      </p:nvGrpSpPr>
+      <p:grpSpPr>
+        <a:xfrm>
+          <a:off x="0" y="0"/>
+          <a:ext cx="0" cy="0"/>
+          <a:chOff x="0" y="0"/>
+          <a:chExt cx="0" cy="0"/>
+        </a:xfrm>
+      </p:grpSpPr>
+      <p:sp>
+        <p:nvSpPr>
+          <p:cNvPr id="1541" name="Google Shape;1541;p126"/>
+          <p:cNvSpPr txBox="1">
+            <a:spLocks noGrp="1"/>
+          </p:cNvSpPr>
+          <p:nvPr>
+            <p:ph type="title"/>
+          </p:nvPr>
+        </p:nvSpPr>
+        <p:spPr>
+          <a:xfrm>
+            <a:off x="713250" y="672738"/>
+            <a:ext cx="7717500" cy="1296600"/>
+          </a:xfrm>
+          <a:prstGeom prst="rect">
+            <a:avLst/>
+          </a:prstGeom>
+        </p:spPr>
+        <p:txBody>
+          <a:bodyPr spcFirstLastPara="1" wrap="square" lIns="91425" tIns="91425" rIns="91425" bIns="91425" anchor="t" anchorCtr="0">
+            <a:noAutofit/>
+          </a:bodyPr>
+          <a:lstStyle/>
+          <a:p>
+            <a:pPr marL="0" lvl="0" indent="0" algn="ctr" rtl="0">
+              <a:spcBef>
+                <a:spcPts val="0"/>
+              </a:spcBef>
+              <a:spcAft>
+                <a:spcPts val="0"/>
+              </a:spcAft>
+              <a:buNone/>
+            </a:pPr>
+            <a:r>
+              <a:rPr lang="en" dirty="0"/>
+              <a:t>Thanks</a:t>
+            </a:r>
+            <a:endParaRPr dirty="0"/>
+          </a:p>
+        </p:txBody>
+      </p:sp>
+      <p:sp>
+        <p:nvSpPr>
+          <p:cNvPr id="1542" name="Google Shape;1542;p126"/>
+          <p:cNvSpPr txBox="1">
+            <a:spLocks noGrp="1"/>
+          </p:cNvSpPr>
+          <p:nvPr>
+            <p:ph type="body" idx="1"/>
+          </p:nvPr>
+        </p:nvSpPr>
+        <p:spPr>
+          <a:xfrm>
+            <a:off x="3069175" y="2544222"/>
+            <a:ext cx="3007500" cy="959849"/>
+          </a:xfrm>
+          <a:prstGeom prst="rect">
+            <a:avLst/>
+          </a:prstGeom>
+        </p:spPr>
+        <p:txBody>
+          <a:bodyPr spcFirstLastPara="1" wrap="square" lIns="91425" tIns="91425" rIns="91425" bIns="91425" anchor="t" anchorCtr="0">
+            <a:noAutofit/>
+          </a:bodyPr>
+          <a:lstStyle/>
+          <a:p>
+            <a:pPr marL="0" lvl="0" indent="0" algn="ctr" rtl="0">
+              <a:spcBef>
+                <a:spcPts val="0"/>
+              </a:spcBef>
+              <a:spcAft>
+                <a:spcPts val="0"/>
+              </a:spcAft>
+              <a:buNone/>
+            </a:pPr>
+            <a:r>
+              <a:rPr lang="pt-PT" dirty="0">
+                <a:solidFill>
+                  <a:schemeClr val="accent5"/>
+                </a:solidFill>
+              </a:rPr>
+              <a:t>André Faria</a:t>
+            </a:r>
+            <a:br>
+              <a:rPr lang="pt-PT" dirty="0">
+                <a:solidFill>
+                  <a:schemeClr val="accent5"/>
+                </a:solidFill>
+              </a:rPr>
+            </a:br>
+            <a:r>
+              <a:rPr lang="pt-PT" dirty="0">
+                <a:solidFill>
+                  <a:schemeClr val="accent5"/>
+                </a:solidFill>
+              </a:rPr>
+              <a:t>A47455@alunos.isel.pt</a:t>
+            </a:r>
+          </a:p>
+          <a:p>
+            <a:pPr marL="0" lvl="0" indent="0" algn="ctr" rtl="0">
+              <a:spcBef>
+                <a:spcPts val="0"/>
+              </a:spcBef>
+              <a:spcAft>
+                <a:spcPts val="0"/>
+              </a:spcAft>
+              <a:buNone/>
+            </a:pPr>
+            <a:endParaRPr lang="pt-PT" sz="800" dirty="0">
+              <a:solidFill>
+                <a:schemeClr val="accent5"/>
+              </a:solidFill>
+            </a:endParaRPr>
+          </a:p>
+          <a:p>
+            <a:pPr marL="0" lvl="0" indent="0" algn="ctr" rtl="0">
+              <a:spcBef>
+                <a:spcPts val="0"/>
+              </a:spcBef>
+              <a:spcAft>
+                <a:spcPts val="0"/>
+              </a:spcAft>
+              <a:buNone/>
+            </a:pPr>
+            <a:r>
+              <a:rPr lang="pt-PT" dirty="0">
+                <a:solidFill>
+                  <a:schemeClr val="accent5"/>
+                </a:solidFill>
+              </a:rPr>
+              <a:t>Sara Nobre</a:t>
+            </a:r>
+          </a:p>
+          <a:p>
+            <a:pPr marL="0" lvl="0" indent="0" algn="ctr" rtl="0">
+              <a:spcBef>
+                <a:spcPts val="0"/>
+              </a:spcBef>
+              <a:spcAft>
+                <a:spcPts val="0"/>
+              </a:spcAft>
+              <a:buNone/>
+            </a:pPr>
+            <a:r>
+              <a:rPr lang="pt-PT" dirty="0">
+                <a:solidFill>
+                  <a:schemeClr val="accent5"/>
+                </a:solidFill>
+              </a:rPr>
+              <a:t>A47504@alunos.isel.pt</a:t>
+            </a:r>
+            <a:endParaRPr dirty="0">
+              <a:solidFill>
+                <a:schemeClr val="accent5"/>
+              </a:solidFill>
+            </a:endParaRPr>
+          </a:p>
+        </p:txBody>
+      </p:sp>
+      <p:sp>
+        <p:nvSpPr>
+          <p:cNvPr id="1543" name="Google Shape;1543;p126"/>
+          <p:cNvSpPr txBox="1">
+            <a:spLocks noGrp="1"/>
+          </p:cNvSpPr>
+          <p:nvPr>
+            <p:ph type="subTitle" idx="2"/>
+          </p:nvPr>
+        </p:nvSpPr>
+        <p:spPr>
+          <a:xfrm>
+            <a:off x="3069175" y="1797405"/>
+            <a:ext cx="3007500" cy="429600"/>
+          </a:xfrm>
+          <a:prstGeom prst="rect">
+            <a:avLst/>
+          </a:prstGeom>
+        </p:spPr>
+        <p:txBody>
+          <a:bodyPr spcFirstLastPara="1" wrap="square" lIns="91425" tIns="91425" rIns="91425" bIns="91425" anchor="t" anchorCtr="0">
+            <a:noAutofit/>
+          </a:bodyPr>
+          <a:lstStyle/>
+          <a:p>
+            <a:pPr marL="0" lvl="0" indent="0" algn="ctr" rtl="0">
+              <a:lnSpc>
+                <a:spcPct val="100000"/>
+              </a:lnSpc>
+              <a:spcBef>
+                <a:spcPts val="0"/>
+              </a:spcBef>
+              <a:spcAft>
+                <a:spcPts val="0"/>
+              </a:spcAft>
+              <a:buNone/>
+            </a:pPr>
+            <a:r>
+              <a:rPr lang="en" sz="1600" dirty="0">
+                <a:solidFill>
+                  <a:schemeClr val="accent5"/>
+                </a:solidFill>
+              </a:rPr>
+              <a:t>Do you have any questions?</a:t>
+            </a:r>
+            <a:endParaRPr sz="1600" dirty="0">
+              <a:solidFill>
+                <a:schemeClr val="accent5"/>
+              </a:solidFill>
+            </a:endParaRPr>
+          </a:p>
+        </p:txBody>
+      </p:sp>
+      <p:pic>
+        <p:nvPicPr>
+          <p:cNvPr id="7" name="Imagem 6" descr="Uma imagem com texto, logótipo&#10;&#10;Descrição gerada automaticamente">
+            <a:extLst>
+              <a:ext uri="{FF2B5EF4-FFF2-40B4-BE49-F238E27FC236}">
+                <a16:creationId xmlns:a16="http://schemas.microsoft.com/office/drawing/2014/main" id="{723FBCF7-A6B6-2775-C5AE-4D67F551790C}"/>
+              </a:ext>
+            </a:extLst>
+          </p:cNvPr>
+          <p:cNvPicPr>
+            <a:picLocks noChangeAspect="1"/>
+          </p:cNvPicPr>
+          <p:nvPr/>
+        </p:nvPicPr>
+        <p:blipFill>
+          <a:blip r:embed="rId3"/>
+          <a:stretch>
+            <a:fillRect/>
+          </a:stretch>
+        </p:blipFill>
+        <p:spPr>
+          <a:xfrm>
+            <a:off x="6851902" y="-137600"/>
+            <a:ext cx="2292098" cy="1620676"/>
+          </a:xfrm>
+          <a:prstGeom prst="rect">
+            <a:avLst/>
+          </a:prstGeom>
+        </p:spPr>
+      </p:pic>
+    </p:spTree>
+  </p:cSld>
+  <p:clrMapOvr>
+    <a:masterClrMapping/>
+  </p:clrMapOvr>
+  <p:transition spd="med">
+    <p:fade/>
+  </p:transition>
+  <p:timing>
+    <p:tnLst>
+      <p:par>
+        <p:cTn id="1" dur="indefinite" restart="never" nodeType="tmRoot">
+          <p:childTnLst>
+            <p:seq concurrent="1" nextAc="seek">
+              <p:cTn id="2" dur="indefinite" nodeType="mainSeq">
+                <p:childTnLst>
+                  <p:par>
+                    <p:cTn id="3" fill="hold">
+                      <p:stCondLst>
+                        <p:cond delay="indefinite"/>
+                        <p:cond evt="onBegin" delay="0">
+                          <p:tn val="2"/>
+                        </p:cond>
+                      </p:stCondLst>
+                      <p:childTnLst>
+                        <p:par>
+                          <p:cTn id="4" fill="hold">
+                            <p:stCondLst>
+                              <p:cond delay="0"/>
+                            </p:stCondLst>
+                            <p:childTnLst>
+                              <p:par>
+                                <p:cTn id="5" presetID="10" presetClass="entr" presetSubtype="0" fill="hold" nodeType="afterEffect">
+                                  <p:stCondLst>
+                                    <p:cond delay="0"/>
+                                  </p:stCondLst>
+                                  <p:childTnLst>
+                                    <p:set>
+                                      <p:cBhvr>
+                                        <p:cTn id="6" dur="1" fill="hold">
+                                          <p:stCondLst>
+                                            <p:cond delay="0"/>
+                                          </p:stCondLst>
+                                        </p:cTn>
+                                        <p:tgtEl>
+                                          <p:spTgt spid="1541"/>
+                                        </p:tgtEl>
+                                        <p:attrNameLst>
+                                          <p:attrName>style.visibility</p:attrName>
+                                        </p:attrNameLst>
+                                      </p:cBhvr>
+                                      <p:to>
+                                        <p:strVal val="visible"/>
+                                      </p:to>
+                                    </p:set>
+                                    <p:animEffect transition="in" filter="fade">
+                                      <p:cBhvr>
+                                        <p:cTn id="7" dur="1000"/>
+                                        <p:tgtEl>
+                                          <p:spTgt spid="1541"/>
+                                        </p:tgtEl>
+                                      </p:cBhvr>
+                                    </p:animEffect>
+                                  </p:childTnLst>
+                                </p:cTn>
+                              </p:par>
+                              <p:par>
+                                <p:cTn id="8" presetID="10" presetClass="entr" presetSubtype="0" fill="hold" nodeType="withEffect">
+                                  <p:stCondLst>
+                                    <p:cond delay="0"/>
+                                  </p:stCondLst>
+                                  <p:childTnLst>
+                                    <p:set>
+                                      <p:cBhvr>
+                                        <p:cTn id="9" dur="1" fill="hold">
+                                          <p:stCondLst>
+                                            <p:cond delay="0"/>
+                                          </p:stCondLst>
+                                        </p:cTn>
+                                        <p:tgtEl>
+                                          <p:spTgt spid="1543"/>
+                                        </p:tgtEl>
+                                        <p:attrNameLst>
+                                          <p:attrName>style.visibility</p:attrName>
+                                        </p:attrNameLst>
+                                      </p:cBhvr>
+                                      <p:to>
+                                        <p:strVal val="visible"/>
+                                      </p:to>
+                                    </p:set>
+                                    <p:animEffect transition="in" filter="fade">
+                                      <p:cBhvr>
+                                        <p:cTn id="10" dur="1000"/>
+                                        <p:tgtEl>
+                                          <p:spTgt spid="1543"/>
+                                        </p:tgtEl>
+                                      </p:cBhvr>
+                                    </p:animEffect>
+                                  </p:childTnLst>
+                                </p:cTn>
+                              </p:par>
+                              <p:par>
+                                <p:cTn id="11" presetID="10" presetClass="entr" presetSubtype="0" fill="hold" nodeType="withEffect">
+                                  <p:stCondLst>
+                                    <p:cond delay="0"/>
+                                  </p:stCondLst>
+                                  <p:childTnLst>
+                                    <p:set>
+                                      <p:cBhvr>
+                                        <p:cTn id="12" dur="1" fill="hold">
+                                          <p:stCondLst>
+                                            <p:cond delay="0"/>
+                                          </p:stCondLst>
+                                        </p:cTn>
+                                        <p:tgtEl>
+                                          <p:spTgt spid="1542"/>
+                                        </p:tgtEl>
+                                        <p:attrNameLst>
+                                          <p:attrName>style.visibility</p:attrName>
+                                        </p:attrNameLst>
+                                      </p:cBhvr>
+                                      <p:to>
+                                        <p:strVal val="visible"/>
+                                      </p:to>
+                                    </p:set>
+                                    <p:animEffect transition="in" filter="fade">
+                                      <p:cBhvr>
+                                        <p:cTn id="13" dur="1000"/>
+                                        <p:tgtEl>
+                                          <p:spTgt spid="1542"/>
+                                        </p:tgtEl>
+                                      </p:cBhvr>
+                                    </p:animEffect>
+                                  </p:childTnLst>
+                                </p:cTn>
+                              </p:par>
+                            </p:childTnLst>
+                          </p:cTn>
+                        </p:par>
+                      </p:childTnLst>
+                    </p:cTn>
+                  </p:par>
+                </p:childTnLst>
+              </p:cTn>
+              <p:prevCondLst>
+                <p:cond evt="onPrev" delay="0">
+                  <p:tgtEl>
+                    <p:sldTgt/>
+                  </p:tgtEl>
+                </p:cond>
+              </p:prevCondLst>
+              <p:nextCondLst>
+                <p:cond evt="onNext" delay="0">
+                  <p:tgtEl>
+                    <p:sldTgt/>
+                  </p:tgtEl>
+                </p:cond>
+              </p:nextCondLst>
+            </p:seq>
+          </p:childTnLst>
+        </p:cTn>
+      </p:par>
+    </p:tnLst>
+  </p:timing>
+</p:sld>
+</file>
+
 <file path=ppt/slides/slide2.xml><?xml version="1.0" encoding="utf-8"?>
 <p:sld xmlns:a="http://schemas.openxmlformats.org/drawingml/2006/main" xmlns:r="http://schemas.openxmlformats.org/officeDocument/2006/relationships" xmlns:p="http://schemas.openxmlformats.org/presentationml/2006/main">
   <p:cSld>
@@ -20259,7 +20697,7 @@
           <a:p>
             <a:r>
               <a:rPr lang="en-US" dirty="0"/>
-              <a:t>Rouge-like deck builder</a:t>
+              <a:t>Rogue-like deck builder</a:t>
             </a:r>
             <a:endParaRPr lang="pt-PT" dirty="0"/>
           </a:p>
@@ -20288,8 +20726,8 @@
         </p:nvSpPr>
         <p:spPr>
           <a:xfrm>
-            <a:off x="732415" y="4115280"/>
-            <a:ext cx="3687186" cy="715800"/>
+            <a:off x="713225" y="4069560"/>
+            <a:ext cx="3968764" cy="715800"/>
           </a:xfrm>
           <a:prstGeom prst="rect">
             <a:avLst/>
@@ -20562,6 +21000,13 @@
             <a:r>
               <a:rPr lang="en" dirty="0"/>
               <a:t>Age around 15-30 years old.</a:t>
+            </a:r>
+          </a:p>
+          <a:p>
+            <a:pPr marL="88900" indent="0"/>
+            <a:r>
+              <a:rPr lang="en" dirty="0"/>
+              <a:t>Someone who uses mobile games to pass time.</a:t>
             </a:r>
           </a:p>
         </p:txBody>
@@ -21635,6 +22080,17 @@
             <a:r>
               <a:rPr lang="en-US" dirty="0"/>
               <a:t>Acquire upgrades that help in the next fights</a:t>
+            </a:r>
+          </a:p>
+          <a:p>
+            <a:pPr algn="l">
+              <a:spcAft>
+                <a:spcPts val="600"/>
+              </a:spcAft>
+            </a:pPr>
+            <a:r>
+              <a:rPr lang="en-US" dirty="0"/>
+              <a:t>Difficulty increases as player progresses</a:t>
             </a:r>
           </a:p>
         </p:txBody>
@@ -22821,7 +23277,7 @@
                   </a:outerShdw>
                 </a:effectLst>
               </a:rPr>
-              <a:t>Firebase</a:t>
+              <a:t>Audacity</a:t>
             </a:r>
             <a:endParaRPr dirty="0">
               <a:effectLst>
@@ -22871,15 +23327,15 @@
             </a:pPr>
             <a:r>
               <a:rPr lang="en" dirty="0"/>
-              <a:t>Service used to </a:t>
+              <a:t>Program used to </a:t>
             </a:r>
             <a:r>
               <a:rPr lang="en" u="sng" dirty="0"/>
-              <a:t>store</a:t>
+              <a:t>record</a:t>
             </a:r>
             <a:r>
               <a:rPr lang="en" dirty="0"/>
-              <a:t> the data</a:t>
+              <a:t> sound effects and music.</a:t>
             </a:r>
             <a:endParaRPr dirty="0"/>
           </a:p>
@@ -24329,36 +24785,6 @@
       </p:pic>
       <p:pic>
         <p:nvPicPr>
-          <p:cNvPr id="30" name="Imagem 29">
-            <a:extLst>
-              <a:ext uri="{FF2B5EF4-FFF2-40B4-BE49-F238E27FC236}">
-                <a16:creationId xmlns:a16="http://schemas.microsoft.com/office/drawing/2014/main" id="{15C830FD-AD32-6CFA-B23F-4BE7DD763CAF}"/>
-              </a:ext>
-            </a:extLst>
-          </p:cNvPr>
-          <p:cNvPicPr>
-            <a:picLocks noChangeAspect="1"/>
-          </p:cNvPicPr>
-          <p:nvPr/>
-        </p:nvPicPr>
-        <p:blipFill>
-          <a:blip r:embed="rId6"/>
-          <a:stretch>
-            <a:fillRect/>
-          </a:stretch>
-        </p:blipFill>
-        <p:spPr>
-          <a:xfrm>
-            <a:off x="6044638" y="2220203"/>
-            <a:ext cx="462965" cy="635491"/>
-          </a:xfrm>
-          <a:prstGeom prst="rect">
-            <a:avLst/>
-          </a:prstGeom>
-        </p:spPr>
-      </p:pic>
-      <p:pic>
-        <p:nvPicPr>
           <p:cNvPr id="32" name="Imagem 31">
             <a:extLst>
               <a:ext uri="{FF2B5EF4-FFF2-40B4-BE49-F238E27FC236}">
@@ -24372,7 +24798,7 @@
           <p:nvPr/>
         </p:nvPicPr>
         <p:blipFill>
-          <a:blip r:embed="rId7"/>
+          <a:blip r:embed="rId6"/>
           <a:stretch>
             <a:fillRect/>
           </a:stretch>
@@ -24678,6 +25104,36 @@
           </a:p>
         </p:txBody>
       </p:sp>
+      <p:pic>
+        <p:nvPicPr>
+          <p:cNvPr id="4" name="Imagem 3" descr="Uma imagem com Saturação de cores&#10;&#10;Descrição gerada automaticamente">
+            <a:extLst>
+              <a:ext uri="{FF2B5EF4-FFF2-40B4-BE49-F238E27FC236}">
+                <a16:creationId xmlns:a16="http://schemas.microsoft.com/office/drawing/2014/main" id="{6DEB6D8C-9052-A8B3-D1EF-7E049D3EF91E}"/>
+              </a:ext>
+            </a:extLst>
+          </p:cNvPr>
+          <p:cNvPicPr>
+            <a:picLocks noChangeAspect="1"/>
+          </p:cNvPicPr>
+          <p:nvPr/>
+        </p:nvPicPr>
+        <p:blipFill>
+          <a:blip r:embed="rId7"/>
+          <a:stretch>
+            <a:fillRect/>
+          </a:stretch>
+        </p:blipFill>
+        <p:spPr>
+          <a:xfrm>
+            <a:off x="5929922" y="2353239"/>
+            <a:ext cx="695253" cy="695253"/>
+          </a:xfrm>
+          <a:prstGeom prst="rect">
+            <a:avLst/>
+          </a:prstGeom>
+        </p:spPr>
+      </p:pic>
     </p:spTree>
   </p:cSld>
   <p:clrMapOvr>
@@ -27602,17 +28058,9 @@
 <file path=ppt/slides/slide8.xml><?xml version="1.0" encoding="utf-8"?>
 <p:sld xmlns:a="http://schemas.openxmlformats.org/drawingml/2006/main" xmlns:r="http://schemas.openxmlformats.org/officeDocument/2006/relationships" xmlns:p="http://schemas.openxmlformats.org/presentationml/2006/main">
   <p:cSld>
-    <p:bg>
-      <p:bgPr>
-        <a:solidFill>
-          <a:schemeClr val="dk1"/>
-        </a:solidFill>
-        <a:effectLst/>
-      </p:bgPr>
-    </p:bg>
     <p:spTree>
       <p:nvGrpSpPr>
-        <p:cNvPr id="1" name="Shape 1540"/>
+        <p:cNvPr id="1" name=""/>
         <p:cNvGrpSpPr/>
         <p:nvPr/>
       </p:nvGrpSpPr>
@@ -27626,249 +28074,371 @@
       </p:grpSpPr>
       <p:sp>
         <p:nvSpPr>
-          <p:cNvPr id="1541" name="Google Shape;1541;p126"/>
-          <p:cNvSpPr txBox="1">
+          <p:cNvPr id="14" name="Título 13">
+            <a:extLst>
+              <a:ext uri="{FF2B5EF4-FFF2-40B4-BE49-F238E27FC236}">
+                <a16:creationId xmlns:a16="http://schemas.microsoft.com/office/drawing/2014/main" id="{A3E7F3BB-5235-5B5B-0CEF-D18167B9A11B}"/>
+              </a:ext>
+            </a:extLst>
+          </p:cNvPr>
+          <p:cNvSpPr>
             <a:spLocks noGrp="1"/>
           </p:cNvSpPr>
           <p:nvPr>
-            <p:ph type="title"/>
+            <p:ph type="title" idx="15"/>
           </p:nvPr>
         </p:nvSpPr>
-        <p:spPr>
-          <a:xfrm>
-            <a:off x="713250" y="672738"/>
-            <a:ext cx="7717500" cy="1296600"/>
-          </a:xfrm>
-          <a:prstGeom prst="rect">
-            <a:avLst/>
-          </a:prstGeom>
-        </p:spPr>
+        <p:spPr/>
         <p:txBody>
-          <a:bodyPr spcFirstLastPara="1" wrap="square" lIns="91425" tIns="91425" rIns="91425" bIns="91425" anchor="t" anchorCtr="0">
-            <a:noAutofit/>
-          </a:bodyPr>
+          <a:bodyPr/>
           <a:lstStyle/>
           <a:p>
-            <a:pPr marL="0" lvl="0" indent="0" algn="ctr" rtl="0">
-              <a:spcBef>
-                <a:spcPts val="0"/>
-              </a:spcBef>
-              <a:spcAft>
-                <a:spcPts val="0"/>
-              </a:spcAft>
-              <a:buNone/>
-            </a:pPr>
             <a:r>
-              <a:rPr lang="en" dirty="0"/>
-              <a:t>Thanks</a:t>
+              <a:rPr lang="en-US" dirty="0"/>
+              <a:t>System Attributes</a:t>
             </a:r>
-            <a:endParaRPr dirty="0"/>
           </a:p>
         </p:txBody>
       </p:sp>
-      <p:sp>
-        <p:nvSpPr>
-          <p:cNvPr id="1542" name="Google Shape;1542;p126"/>
-          <p:cNvSpPr txBox="1">
-            <a:spLocks noGrp="1"/>
-          </p:cNvSpPr>
-          <p:nvPr>
-            <p:ph type="body" idx="1"/>
-          </p:nvPr>
-        </p:nvSpPr>
-        <p:spPr>
-          <a:xfrm>
-            <a:off x="3069175" y="2544222"/>
-            <a:ext cx="3007500" cy="959849"/>
-          </a:xfrm>
-          <a:prstGeom prst="rect">
-            <a:avLst/>
-          </a:prstGeom>
-        </p:spPr>
-        <p:txBody>
-          <a:bodyPr spcFirstLastPara="1" wrap="square" lIns="91425" tIns="91425" rIns="91425" bIns="91425" anchor="t" anchorCtr="0">
-            <a:noAutofit/>
-          </a:bodyPr>
-          <a:lstStyle/>
-          <a:p>
-            <a:pPr marL="0" lvl="0" indent="0" algn="ctr" rtl="0">
-              <a:spcBef>
-                <a:spcPts val="0"/>
-              </a:spcBef>
-              <a:spcAft>
-                <a:spcPts val="0"/>
-              </a:spcAft>
-              <a:buNone/>
-            </a:pPr>
-            <a:r>
-              <a:rPr lang="pt-PT" dirty="0">
-                <a:solidFill>
-                  <a:schemeClr val="accent5"/>
-                </a:solidFill>
-              </a:rPr>
-              <a:t>André Faria</a:t>
-            </a:r>
-            <a:br>
-              <a:rPr lang="pt-PT" dirty="0">
-                <a:solidFill>
-                  <a:schemeClr val="accent5"/>
-                </a:solidFill>
-              </a:rPr>
-            </a:br>
-            <a:r>
-              <a:rPr lang="pt-PT" dirty="0">
-                <a:solidFill>
-                  <a:schemeClr val="accent5"/>
-                </a:solidFill>
-              </a:rPr>
-              <a:t>A47455@alunos.isel.pt</a:t>
-            </a:r>
-          </a:p>
-          <a:p>
-            <a:pPr marL="0" lvl="0" indent="0" algn="ctr" rtl="0">
-              <a:spcBef>
-                <a:spcPts val="0"/>
-              </a:spcBef>
-              <a:spcAft>
-                <a:spcPts val="0"/>
-              </a:spcAft>
-              <a:buNone/>
-            </a:pPr>
-            <a:endParaRPr lang="pt-PT" sz="800" dirty="0">
-              <a:solidFill>
-                <a:schemeClr val="accent5"/>
-              </a:solidFill>
-            </a:endParaRPr>
-          </a:p>
-          <a:p>
-            <a:pPr marL="0" lvl="0" indent="0" algn="ctr" rtl="0">
-              <a:spcBef>
-                <a:spcPts val="0"/>
-              </a:spcBef>
-              <a:spcAft>
-                <a:spcPts val="0"/>
-              </a:spcAft>
-              <a:buNone/>
-            </a:pPr>
-            <a:r>
-              <a:rPr lang="pt-PT" dirty="0">
-                <a:solidFill>
-                  <a:schemeClr val="accent5"/>
-                </a:solidFill>
-              </a:rPr>
-              <a:t>Sara Nobre</a:t>
-            </a:r>
-          </a:p>
-          <a:p>
-            <a:pPr marL="0" lvl="0" indent="0" algn="ctr" rtl="0">
-              <a:spcBef>
-                <a:spcPts val="0"/>
-              </a:spcBef>
-              <a:spcAft>
-                <a:spcPts val="0"/>
-              </a:spcAft>
-              <a:buNone/>
-            </a:pPr>
-            <a:r>
-              <a:rPr lang="pt-PT" dirty="0">
-                <a:solidFill>
-                  <a:schemeClr val="accent5"/>
-                </a:solidFill>
-              </a:rPr>
-              <a:t>A47504@alunos.isel.pt</a:t>
-            </a:r>
-            <a:endParaRPr dirty="0">
-              <a:solidFill>
-                <a:schemeClr val="accent5"/>
-              </a:solidFill>
-            </a:endParaRPr>
-          </a:p>
-        </p:txBody>
-      </p:sp>
-      <p:sp>
-        <p:nvSpPr>
-          <p:cNvPr id="1543" name="Google Shape;1543;p126"/>
-          <p:cNvSpPr txBox="1">
-            <a:spLocks noGrp="1"/>
-          </p:cNvSpPr>
-          <p:nvPr>
-            <p:ph type="subTitle" idx="2"/>
-          </p:nvPr>
-        </p:nvSpPr>
-        <p:spPr>
-          <a:xfrm>
-            <a:off x="3069175" y="1797405"/>
-            <a:ext cx="3007500" cy="429600"/>
-          </a:xfrm>
-          <a:prstGeom prst="rect">
-            <a:avLst/>
-          </a:prstGeom>
-        </p:spPr>
-        <p:txBody>
-          <a:bodyPr spcFirstLastPara="1" wrap="square" lIns="91425" tIns="91425" rIns="91425" bIns="91425" anchor="t" anchorCtr="0">
-            <a:noAutofit/>
-          </a:bodyPr>
-          <a:lstStyle/>
-          <a:p>
-            <a:pPr marL="0" lvl="0" indent="0" algn="ctr" rtl="0">
-              <a:lnSpc>
-                <a:spcPct val="100000"/>
-              </a:lnSpc>
-              <a:spcBef>
-                <a:spcPts val="0"/>
-              </a:spcBef>
-              <a:spcAft>
-                <a:spcPts val="0"/>
-              </a:spcAft>
-              <a:buNone/>
-            </a:pPr>
-            <a:r>
-              <a:rPr lang="en" sz="1600" dirty="0">
-                <a:solidFill>
-                  <a:schemeClr val="accent5"/>
-                </a:solidFill>
-              </a:rPr>
-              <a:t>Do you have any questions?</a:t>
-            </a:r>
-            <a:endParaRPr sz="1600" dirty="0">
-              <a:solidFill>
-                <a:schemeClr val="accent5"/>
-              </a:solidFill>
-            </a:endParaRPr>
-          </a:p>
-        </p:txBody>
-      </p:sp>
-      <p:pic>
-        <p:nvPicPr>
-          <p:cNvPr id="7" name="Imagem 6" descr="Uma imagem com texto, logótipo&#10;&#10;Descrição gerada automaticamente">
+      <p:graphicFrame>
+        <p:nvGraphicFramePr>
+          <p:cNvPr id="2" name="Tabela 2">
             <a:extLst>
               <a:ext uri="{FF2B5EF4-FFF2-40B4-BE49-F238E27FC236}">
-                <a16:creationId xmlns:a16="http://schemas.microsoft.com/office/drawing/2014/main" id="{723FBCF7-A6B6-2775-C5AE-4D67F551790C}"/>
+                <a16:creationId xmlns:a16="http://schemas.microsoft.com/office/drawing/2014/main" id="{0DDED308-75E4-C364-CC32-352E38B2470A}"/>
               </a:ext>
             </a:extLst>
           </p:cNvPr>
-          <p:cNvPicPr>
-            <a:picLocks noChangeAspect="1"/>
-          </p:cNvPicPr>
-          <p:nvPr/>
-        </p:nvPicPr>
-        <p:blipFill>
-          <a:blip r:embed="rId3"/>
-          <a:stretch>
-            <a:fillRect/>
-          </a:stretch>
-        </p:blipFill>
-        <p:spPr>
-          <a:xfrm>
-            <a:off x="6851902" y="-137600"/>
-            <a:ext cx="2292098" cy="1620676"/>
-          </a:xfrm>
-          <a:prstGeom prst="rect">
-            <a:avLst/>
-          </a:prstGeom>
-        </p:spPr>
-      </p:pic>
+          <p:cNvGraphicFramePr>
+            <a:graphicFrameLocks noGrp="1"/>
+          </p:cNvGraphicFramePr>
+          <p:nvPr>
+            <p:extLst>
+              <p:ext uri="{D42A27DB-BD31-4B8C-83A1-F6EECF244321}">
+                <p14:modId xmlns:p14="http://schemas.microsoft.com/office/powerpoint/2010/main" val="3046115410"/>
+              </p:ext>
+            </p:extLst>
+          </p:nvPr>
+        </p:nvGraphicFramePr>
+        <p:xfrm>
+          <a:off x="4468872" y="1489710"/>
+          <a:ext cx="4523874" cy="3108960"/>
+        </p:xfrm>
+        <a:graphic>
+          <a:graphicData uri="http://schemas.openxmlformats.org/drawingml/2006/table">
+            <a:tbl>
+              <a:tblPr firstRow="1" bandRow="1">
+                <a:tableStyleId>{00A15C55-8517-42AA-B614-E9B94910E393}</a:tableStyleId>
+              </a:tblPr>
+              <a:tblGrid>
+                <a:gridCol w="1507958">
+                  <a:extLst>
+                    <a:ext uri="{9D8B030D-6E8A-4147-A177-3AD203B41FA5}">
+                      <a16:colId xmlns:a16="http://schemas.microsoft.com/office/drawing/2014/main" val="1681547778"/>
+                    </a:ext>
+                  </a:extLst>
+                </a:gridCol>
+                <a:gridCol w="1507958">
+                  <a:extLst>
+                    <a:ext uri="{9D8B030D-6E8A-4147-A177-3AD203B41FA5}">
+                      <a16:colId xmlns:a16="http://schemas.microsoft.com/office/drawing/2014/main" val="519148131"/>
+                    </a:ext>
+                  </a:extLst>
+                </a:gridCol>
+                <a:gridCol w="1507958">
+                  <a:extLst>
+                    <a:ext uri="{9D8B030D-6E8A-4147-A177-3AD203B41FA5}">
+                      <a16:colId xmlns:a16="http://schemas.microsoft.com/office/drawing/2014/main" val="1040589824"/>
+                    </a:ext>
+                  </a:extLst>
+                </a:gridCol>
+              </a:tblGrid>
+              <a:tr h="292180">
+                <a:tc>
+                  <a:txBody>
+                    <a:bodyPr/>
+                    <a:lstStyle/>
+                    <a:p>
+                      <a:r>
+                        <a:rPr lang="en-US" dirty="0"/>
+                        <a:t>Attributes</a:t>
+                      </a:r>
+                    </a:p>
+                  </a:txBody>
+                  <a:tcPr/>
+                </a:tc>
+                <a:tc>
+                  <a:txBody>
+                    <a:bodyPr/>
+                    <a:lstStyle/>
+                    <a:p>
+                      <a:r>
+                        <a:rPr lang="en-US" dirty="0"/>
+                        <a:t>Details / Restrictions (D / R)</a:t>
+                      </a:r>
+                    </a:p>
+                  </a:txBody>
+                  <a:tcPr/>
+                </a:tc>
+                <a:tc>
+                  <a:txBody>
+                    <a:bodyPr/>
+                    <a:lstStyle/>
+                    <a:p>
+                      <a:r>
+                        <a:rPr lang="en-US" dirty="0"/>
+                        <a:t>Categories</a:t>
+                      </a:r>
+                    </a:p>
+                  </a:txBody>
+                  <a:tcPr/>
+                </a:tc>
+                <a:extLst>
+                  <a:ext uri="{0D108BD9-81ED-4DB2-BD59-A6C34878D82A}">
+                    <a16:rowId xmlns:a16="http://schemas.microsoft.com/office/drawing/2014/main" val="2027282949"/>
+                  </a:ext>
+                </a:extLst>
+              </a:tr>
+              <a:tr h="292180">
+                <a:tc>
+                  <a:txBody>
+                    <a:bodyPr/>
+                    <a:lstStyle/>
+                    <a:p>
+                      <a:r>
+                        <a:rPr lang="en-US" dirty="0"/>
+                        <a:t>Platforms</a:t>
+                      </a:r>
+                    </a:p>
+                  </a:txBody>
+                  <a:tcPr/>
+                </a:tc>
+                <a:tc>
+                  <a:txBody>
+                    <a:bodyPr/>
+                    <a:lstStyle/>
+                    <a:p>
+                      <a:r>
+                        <a:rPr lang="en-US" dirty="0"/>
+                        <a:t>D – Unity, Mobile</a:t>
+                      </a:r>
+                    </a:p>
+                  </a:txBody>
+                  <a:tcPr/>
+                </a:tc>
+                <a:tc>
+                  <a:txBody>
+                    <a:bodyPr/>
+                    <a:lstStyle/>
+                    <a:p>
+                      <a:r>
+                        <a:rPr lang="en-US" dirty="0"/>
+                        <a:t>Mandatory</a:t>
+                      </a:r>
+                    </a:p>
+                  </a:txBody>
+                  <a:tcPr/>
+                </a:tc>
+                <a:extLst>
+                  <a:ext uri="{0D108BD9-81ED-4DB2-BD59-A6C34878D82A}">
+                    <a16:rowId xmlns:a16="http://schemas.microsoft.com/office/drawing/2014/main" val="3493805386"/>
+                  </a:ext>
+                </a:extLst>
+              </a:tr>
+              <a:tr h="292180">
+                <a:tc>
+                  <a:txBody>
+                    <a:bodyPr/>
+                    <a:lstStyle/>
+                    <a:p>
+                      <a:r>
+                        <a:rPr lang="en-US" dirty="0"/>
+                        <a:t>Ease of use</a:t>
+                      </a:r>
+                    </a:p>
+                  </a:txBody>
+                  <a:tcPr/>
+                </a:tc>
+                <a:tc>
+                  <a:txBody>
+                    <a:bodyPr/>
+                    <a:lstStyle/>
+                    <a:p>
+                      <a:r>
+                        <a:rPr lang="en-US" dirty="0"/>
+                        <a:t>D – simplistic, intuitive</a:t>
+                      </a:r>
+                    </a:p>
+                  </a:txBody>
+                  <a:tcPr/>
+                </a:tc>
+                <a:tc>
+                  <a:txBody>
+                    <a:bodyPr/>
+                    <a:lstStyle/>
+                    <a:p>
+                      <a:r>
+                        <a:rPr lang="en-US" dirty="0"/>
+                        <a:t>Mandatory</a:t>
+                      </a:r>
+                    </a:p>
+                  </a:txBody>
+                  <a:tcPr/>
+                </a:tc>
+                <a:extLst>
+                  <a:ext uri="{0D108BD9-81ED-4DB2-BD59-A6C34878D82A}">
+                    <a16:rowId xmlns:a16="http://schemas.microsoft.com/office/drawing/2014/main" val="1295825423"/>
+                  </a:ext>
+                </a:extLst>
+              </a:tr>
+              <a:tr h="292180">
+                <a:tc>
+                  <a:txBody>
+                    <a:bodyPr/>
+                    <a:lstStyle/>
+                    <a:p>
+                      <a:r>
+                        <a:rPr lang="en-US" dirty="0"/>
+                        <a:t>Monetization</a:t>
+                      </a:r>
+                    </a:p>
+                  </a:txBody>
+                  <a:tcPr/>
+                </a:tc>
+                <a:tc>
+                  <a:txBody>
+                    <a:bodyPr/>
+                    <a:lstStyle/>
+                    <a:p>
+                      <a:r>
+                        <a:rPr lang="en-US" dirty="0"/>
+                        <a:t>D – Ads, paid currency</a:t>
+                      </a:r>
+                    </a:p>
+                  </a:txBody>
+                  <a:tcPr/>
+                </a:tc>
+                <a:tc>
+                  <a:txBody>
+                    <a:bodyPr/>
+                    <a:lstStyle/>
+                    <a:p>
+                      <a:r>
+                        <a:rPr lang="en-US" dirty="0"/>
+                        <a:t>Preferable</a:t>
+                      </a:r>
+                    </a:p>
+                  </a:txBody>
+                  <a:tcPr/>
+                </a:tc>
+                <a:extLst>
+                  <a:ext uri="{0D108BD9-81ED-4DB2-BD59-A6C34878D82A}">
+                    <a16:rowId xmlns:a16="http://schemas.microsoft.com/office/drawing/2014/main" val="221035577"/>
+                  </a:ext>
+                </a:extLst>
+              </a:tr>
+              <a:tr h="292180">
+                <a:tc>
+                  <a:txBody>
+                    <a:bodyPr/>
+                    <a:lstStyle/>
+                    <a:p>
+                      <a:r>
+                        <a:rPr lang="en-US" dirty="0"/>
+                        <a:t>Graphics</a:t>
+                      </a:r>
+                    </a:p>
+                  </a:txBody>
+                  <a:tcPr/>
+                </a:tc>
+                <a:tc>
+                  <a:txBody>
+                    <a:bodyPr/>
+                    <a:lstStyle/>
+                    <a:p>
+                      <a:r>
+                        <a:rPr lang="en-US" dirty="0"/>
+                        <a:t>D – 2D, Pixel art</a:t>
+                      </a:r>
+                    </a:p>
+                  </a:txBody>
+                  <a:tcPr/>
+                </a:tc>
+                <a:tc>
+                  <a:txBody>
+                    <a:bodyPr/>
+                    <a:lstStyle/>
+                    <a:p>
+                      <a:r>
+                        <a:rPr lang="en-US" dirty="0"/>
+                        <a:t>Mandatory</a:t>
+                      </a:r>
+                    </a:p>
+                  </a:txBody>
+                  <a:tcPr/>
+                </a:tc>
+                <a:extLst>
+                  <a:ext uri="{0D108BD9-81ED-4DB2-BD59-A6C34878D82A}">
+                    <a16:rowId xmlns:a16="http://schemas.microsoft.com/office/drawing/2014/main" val="3044347824"/>
+                  </a:ext>
+                </a:extLst>
+              </a:tr>
+              <a:tr h="292180">
+                <a:tc>
+                  <a:txBody>
+                    <a:bodyPr/>
+                    <a:lstStyle/>
+                    <a:p>
+                      <a:r>
+                        <a:rPr lang="en-US" dirty="0"/>
+                        <a:t>Controls</a:t>
+                      </a:r>
+                    </a:p>
+                  </a:txBody>
+                  <a:tcPr/>
+                </a:tc>
+                <a:tc>
+                  <a:txBody>
+                    <a:bodyPr/>
+                    <a:lstStyle/>
+                    <a:p>
+                      <a:r>
+                        <a:rPr lang="en-US" dirty="0"/>
+                        <a:t>D – Touch Controls</a:t>
+                      </a:r>
+                    </a:p>
+                  </a:txBody>
+                  <a:tcPr/>
+                </a:tc>
+                <a:tc>
+                  <a:txBody>
+                    <a:bodyPr/>
+                    <a:lstStyle/>
+                    <a:p>
+                      <a:r>
+                        <a:rPr lang="en-US" dirty="0"/>
+                        <a:t>Mandatory</a:t>
+                      </a:r>
+                    </a:p>
+                  </a:txBody>
+                  <a:tcPr/>
+                </a:tc>
+                <a:extLst>
+                  <a:ext uri="{0D108BD9-81ED-4DB2-BD59-A6C34878D82A}">
+                    <a16:rowId xmlns:a16="http://schemas.microsoft.com/office/drawing/2014/main" val="1830734360"/>
+                  </a:ext>
+                </a:extLst>
+              </a:tr>
+            </a:tbl>
+          </a:graphicData>
+        </a:graphic>
+      </p:graphicFrame>
     </p:spTree>
+    <p:extLst>
+      <p:ext uri="{BB962C8B-B14F-4D97-AF65-F5344CB8AC3E}">
+        <p14:creationId xmlns:p14="http://schemas.microsoft.com/office/powerpoint/2010/main" val="2119097399"/>
+      </p:ext>
+    </p:extLst>
   </p:cSld>
   <p:clrMapOvr>
     <a:masterClrMapping/>
@@ -27876,162 +28446,450 @@
   <p:transition spd="med">
     <p:fade/>
   </p:transition>
-  <p:timing>
-    <p:tnLst>
-      <p:par>
-        <p:cTn id="1" dur="indefinite" restart="never" nodeType="tmRoot">
-          <p:childTnLst>
-            <p:seq concurrent="1" nextAc="seek">
-              <p:cTn id="2" dur="indefinite" nodeType="mainSeq">
-                <p:childTnLst>
-                  <p:par>
-                    <p:cTn id="3" fill="hold">
-                      <p:stCondLst>
-                        <p:cond delay="indefinite"/>
-                        <p:cond evt="onBegin" delay="0">
-                          <p:tn val="2"/>
-                        </p:cond>
-                      </p:stCondLst>
-                      <p:childTnLst>
-                        <p:par>
-                          <p:cTn id="4" fill="hold">
-                            <p:stCondLst>
-                              <p:cond delay="0"/>
-                            </p:stCondLst>
-                            <p:childTnLst>
-                              <p:par>
-                                <p:cTn id="5" presetID="10" presetClass="entr" presetSubtype="0" fill="hold" nodeType="afterEffect">
-                                  <p:stCondLst>
-                                    <p:cond delay="0"/>
-                                  </p:stCondLst>
-                                  <p:childTnLst>
-                                    <p:set>
-                                      <p:cBhvr>
-                                        <p:cTn id="6" dur="1" fill="hold">
-                                          <p:stCondLst>
-                                            <p:cond delay="0"/>
-                                          </p:stCondLst>
-                                        </p:cTn>
-                                        <p:tgtEl>
-                                          <p:spTgt spid="1541"/>
-                                        </p:tgtEl>
-                                        <p:attrNameLst>
-                                          <p:attrName>style.visibility</p:attrName>
-                                        </p:attrNameLst>
-                                      </p:cBhvr>
-                                      <p:to>
-                                        <p:strVal val="visible"/>
-                                      </p:to>
-                                    </p:set>
-                                    <p:animEffect transition="in" filter="fade">
-                                      <p:cBhvr>
-                                        <p:cTn id="7" dur="1000"/>
-                                        <p:tgtEl>
-                                          <p:spTgt spid="1541"/>
-                                        </p:tgtEl>
-                                      </p:cBhvr>
-                                    </p:animEffect>
-                                  </p:childTnLst>
-                                </p:cTn>
-                              </p:par>
-                              <p:par>
-                                <p:cTn id="8" presetID="10" presetClass="entr" presetSubtype="0" fill="hold" nodeType="withEffect">
-                                  <p:stCondLst>
-                                    <p:cond delay="0"/>
-                                  </p:stCondLst>
-                                  <p:childTnLst>
-                                    <p:set>
-                                      <p:cBhvr>
-                                        <p:cTn id="9" dur="1" fill="hold">
-                                          <p:stCondLst>
-                                            <p:cond delay="0"/>
-                                          </p:stCondLst>
-                                        </p:cTn>
-                                        <p:tgtEl>
-                                          <p:spTgt spid="1543"/>
-                                        </p:tgtEl>
-                                        <p:attrNameLst>
-                                          <p:attrName>style.visibility</p:attrName>
-                                        </p:attrNameLst>
-                                      </p:cBhvr>
-                                      <p:to>
-                                        <p:strVal val="visible"/>
-                                      </p:to>
-                                    </p:set>
-                                    <p:animEffect transition="in" filter="fade">
-                                      <p:cBhvr>
-                                        <p:cTn id="10" dur="1000"/>
-                                        <p:tgtEl>
-                                          <p:spTgt spid="1543"/>
-                                        </p:tgtEl>
-                                      </p:cBhvr>
-                                    </p:animEffect>
-                                  </p:childTnLst>
-                                </p:cTn>
-                              </p:par>
-                              <p:par>
-                                <p:cTn id="11" presetID="10" presetClass="entr" presetSubtype="0" fill="hold" nodeType="withEffect">
-                                  <p:stCondLst>
-                                    <p:cond delay="0"/>
-                                  </p:stCondLst>
-                                  <p:childTnLst>
-                                    <p:set>
-                                      <p:cBhvr>
-                                        <p:cTn id="12" dur="1" fill="hold">
-                                          <p:stCondLst>
-                                            <p:cond delay="0"/>
-                                          </p:stCondLst>
-                                        </p:cTn>
-                                        <p:tgtEl>
-                                          <p:spTgt spid="1542"/>
-                                        </p:tgtEl>
-                                        <p:attrNameLst>
-                                          <p:attrName>style.visibility</p:attrName>
-                                        </p:attrNameLst>
-                                      </p:cBhvr>
-                                      <p:to>
-                                        <p:strVal val="visible"/>
-                                      </p:to>
-                                    </p:set>
-                                    <p:animEffect transition="in" filter="fade">
-                                      <p:cBhvr>
-                                        <p:cTn id="13" dur="1000"/>
-                                        <p:tgtEl>
-                                          <p:spTgt spid="1542"/>
-                                        </p:tgtEl>
-                                      </p:cBhvr>
-                                    </p:animEffect>
-                                  </p:childTnLst>
-                                </p:cTn>
-                              </p:par>
-                            </p:childTnLst>
-                          </p:cTn>
-                        </p:par>
-                      </p:childTnLst>
-                    </p:cTn>
-                  </p:par>
-                </p:childTnLst>
-              </p:cTn>
-              <p:prevCondLst>
-                <p:cond evt="onPrev" delay="0">
-                  <p:tgtEl>
-                    <p:sldTgt/>
-                  </p:tgtEl>
-                </p:cond>
-              </p:prevCondLst>
-              <p:nextCondLst>
-                <p:cond evt="onNext" delay="0">
-                  <p:tgtEl>
-                    <p:sldTgt/>
-                  </p:tgtEl>
-                </p:cond>
-              </p:nextCondLst>
-            </p:seq>
-          </p:childTnLst>
-        </p:cTn>
-      </p:par>
-    </p:tnLst>
-  </p:timing>
+</p:sld>
+</file>
+
+<file path=ppt/slides/slide9.xml><?xml version="1.0" encoding="utf-8"?>
+<p:sld xmlns:a="http://schemas.openxmlformats.org/drawingml/2006/main" xmlns:r="http://schemas.openxmlformats.org/officeDocument/2006/relationships" xmlns:p="http://schemas.openxmlformats.org/presentationml/2006/main">
+  <p:cSld>
+    <p:spTree>
+      <p:nvGrpSpPr>
+        <p:cNvPr id="1" name=""/>
+        <p:cNvGrpSpPr/>
+        <p:nvPr/>
+      </p:nvGrpSpPr>
+      <p:grpSpPr>
+        <a:xfrm>
+          <a:off x="0" y="0"/>
+          <a:ext cx="0" cy="0"/>
+          <a:chOff x="0" y="0"/>
+          <a:chExt cx="0" cy="0"/>
+        </a:xfrm>
+      </p:grpSpPr>
+      <p:sp>
+        <p:nvSpPr>
+          <p:cNvPr id="2" name="Título 1">
+            <a:extLst>
+              <a:ext uri="{FF2B5EF4-FFF2-40B4-BE49-F238E27FC236}">
+                <a16:creationId xmlns:a16="http://schemas.microsoft.com/office/drawing/2014/main" id="{92576A9C-1C0E-96D5-9C40-CA6D25D5249D}"/>
+              </a:ext>
+            </a:extLst>
+          </p:cNvPr>
+          <p:cNvSpPr>
+            <a:spLocks noGrp="1"/>
+          </p:cNvSpPr>
+          <p:nvPr>
+            <p:ph type="title"/>
+          </p:nvPr>
+        </p:nvSpPr>
+        <p:spPr/>
+        <p:txBody>
+          <a:bodyPr/>
+          <a:lstStyle/>
+          <a:p>
+            <a:r>
+              <a:rPr lang="en-US" dirty="0"/>
+              <a:t>System Functions</a:t>
+            </a:r>
+            <a:br>
+              <a:rPr lang="en-US" dirty="0"/>
+            </a:br>
+            <a:endParaRPr lang="en-US" dirty="0"/>
+          </a:p>
+        </p:txBody>
+      </p:sp>
+      <p:graphicFrame>
+        <p:nvGraphicFramePr>
+          <p:cNvPr id="6" name="Tabela 6">
+            <a:extLst>
+              <a:ext uri="{FF2B5EF4-FFF2-40B4-BE49-F238E27FC236}">
+                <a16:creationId xmlns:a16="http://schemas.microsoft.com/office/drawing/2014/main" id="{6400C405-188F-CDF4-501D-26DDF4970508}"/>
+              </a:ext>
+            </a:extLst>
+          </p:cNvPr>
+          <p:cNvGraphicFramePr>
+            <a:graphicFrameLocks noGrp="1"/>
+          </p:cNvGraphicFramePr>
+          <p:nvPr>
+            <p:extLst>
+              <p:ext uri="{D42A27DB-BD31-4B8C-83A1-F6EECF244321}">
+                <p14:modId xmlns:p14="http://schemas.microsoft.com/office/powerpoint/2010/main" val="133918374"/>
+              </p:ext>
+            </p:extLst>
+          </p:nvPr>
+        </p:nvGraphicFramePr>
+        <p:xfrm>
+          <a:off x="251057" y="1378523"/>
+          <a:ext cx="8635236" cy="2595880"/>
+        </p:xfrm>
+        <a:graphic>
+          <a:graphicData uri="http://schemas.openxmlformats.org/drawingml/2006/table">
+            <a:tbl>
+              <a:tblPr firstRow="1" bandRow="1">
+                <a:tableStyleId>{21E4AEA4-8DFA-4A89-87EB-49C32662AFE0}</a:tableStyleId>
+              </a:tblPr>
+              <a:tblGrid>
+                <a:gridCol w="1199608">
+                  <a:extLst>
+                    <a:ext uri="{9D8B030D-6E8A-4147-A177-3AD203B41FA5}">
+                      <a16:colId xmlns:a16="http://schemas.microsoft.com/office/drawing/2014/main" val="418046561"/>
+                    </a:ext>
+                  </a:extLst>
+                </a:gridCol>
+                <a:gridCol w="4557216">
+                  <a:extLst>
+                    <a:ext uri="{9D8B030D-6E8A-4147-A177-3AD203B41FA5}">
+                      <a16:colId xmlns:a16="http://schemas.microsoft.com/office/drawing/2014/main" val="1552109539"/>
+                    </a:ext>
+                  </a:extLst>
+                </a:gridCol>
+                <a:gridCol w="2878412">
+                  <a:extLst>
+                    <a:ext uri="{9D8B030D-6E8A-4147-A177-3AD203B41FA5}">
+                      <a16:colId xmlns:a16="http://schemas.microsoft.com/office/drawing/2014/main" val="3561355658"/>
+                    </a:ext>
+                  </a:extLst>
+                </a:gridCol>
+              </a:tblGrid>
+              <a:tr h="370840">
+                <a:tc>
+                  <a:txBody>
+                    <a:bodyPr/>
+                    <a:lstStyle/>
+                    <a:p>
+                      <a:r>
+                        <a:rPr lang="en-US" sz="1200" dirty="0"/>
+                        <a:t>Requirements</a:t>
+                      </a:r>
+                    </a:p>
+                  </a:txBody>
+                  <a:tcPr/>
+                </a:tc>
+                <a:tc>
+                  <a:txBody>
+                    <a:bodyPr/>
+                    <a:lstStyle/>
+                    <a:p>
+                      <a:r>
+                        <a:rPr lang="en-US" sz="1200" dirty="0"/>
+                        <a:t>Function</a:t>
+                      </a:r>
+                    </a:p>
+                  </a:txBody>
+                  <a:tcPr/>
+                </a:tc>
+                <a:tc>
+                  <a:txBody>
+                    <a:bodyPr/>
+                    <a:lstStyle/>
+                    <a:p>
+                      <a:r>
+                        <a:rPr lang="en-US" sz="1200" dirty="0"/>
+                        <a:t>Category</a:t>
+                      </a:r>
+                    </a:p>
+                  </a:txBody>
+                  <a:tcPr/>
+                </a:tc>
+                <a:extLst>
+                  <a:ext uri="{0D108BD9-81ED-4DB2-BD59-A6C34878D82A}">
+                    <a16:rowId xmlns:a16="http://schemas.microsoft.com/office/drawing/2014/main" val="1002566362"/>
+                  </a:ext>
+                </a:extLst>
+              </a:tr>
+              <a:tr h="370840">
+                <a:tc>
+                  <a:txBody>
+                    <a:bodyPr/>
+                    <a:lstStyle/>
+                    <a:p>
+                      <a:r>
+                        <a:rPr lang="en-US" sz="1200" dirty="0"/>
+                        <a:t>R1</a:t>
+                      </a:r>
+                    </a:p>
+                  </a:txBody>
+                  <a:tcPr/>
+                </a:tc>
+                <a:tc>
+                  <a:txBody>
+                    <a:bodyPr/>
+                    <a:lstStyle/>
+                    <a:p>
+                      <a:r>
+                        <a:rPr lang="en-US" sz="1200" dirty="0"/>
+                        <a:t>The game must have a tutorial</a:t>
+                      </a:r>
+                    </a:p>
+                  </a:txBody>
+                  <a:tcPr/>
+                </a:tc>
+                <a:tc>
+                  <a:txBody>
+                    <a:bodyPr/>
+                    <a:lstStyle/>
+                    <a:p>
+                      <a:r>
+                        <a:rPr lang="en-US" sz="1200" dirty="0"/>
+                        <a:t>Visible</a:t>
+                      </a:r>
+                    </a:p>
+                  </a:txBody>
+                  <a:tcPr/>
+                </a:tc>
+                <a:extLst>
+                  <a:ext uri="{0D108BD9-81ED-4DB2-BD59-A6C34878D82A}">
+                    <a16:rowId xmlns:a16="http://schemas.microsoft.com/office/drawing/2014/main" val="746098265"/>
+                  </a:ext>
+                </a:extLst>
+              </a:tr>
+              <a:tr h="370840">
+                <a:tc>
+                  <a:txBody>
+                    <a:bodyPr/>
+                    <a:lstStyle/>
+                    <a:p>
+                      <a:r>
+                        <a:rPr lang="en-US" sz="1200" dirty="0"/>
+                        <a:t>R2</a:t>
+                      </a:r>
+                    </a:p>
+                  </a:txBody>
+                  <a:tcPr/>
+                </a:tc>
+                <a:tc>
+                  <a:txBody>
+                    <a:bodyPr/>
+                    <a:lstStyle/>
+                    <a:p>
+                      <a:r>
+                        <a:rPr lang="en-US" sz="1200" dirty="0"/>
+                        <a:t>The player must be able to control his actions</a:t>
+                      </a:r>
+                    </a:p>
+                  </a:txBody>
+                  <a:tcPr/>
+                </a:tc>
+                <a:tc>
+                  <a:txBody>
+                    <a:bodyPr/>
+                    <a:lstStyle/>
+                    <a:p>
+                      <a:r>
+                        <a:rPr lang="en-US" sz="1200" dirty="0"/>
+                        <a:t>Visible</a:t>
+                      </a:r>
+                    </a:p>
+                  </a:txBody>
+                  <a:tcPr/>
+                </a:tc>
+                <a:extLst>
+                  <a:ext uri="{0D108BD9-81ED-4DB2-BD59-A6C34878D82A}">
+                    <a16:rowId xmlns:a16="http://schemas.microsoft.com/office/drawing/2014/main" val="309980605"/>
+                  </a:ext>
+                </a:extLst>
+              </a:tr>
+              <a:tr h="370840">
+                <a:tc>
+                  <a:txBody>
+                    <a:bodyPr/>
+                    <a:lstStyle/>
+                    <a:p>
+                      <a:r>
+                        <a:rPr lang="en-US" sz="1200" dirty="0"/>
+                        <a:t>R3</a:t>
+                      </a:r>
+                    </a:p>
+                  </a:txBody>
+                  <a:tcPr/>
+                </a:tc>
+                <a:tc>
+                  <a:txBody>
+                    <a:bodyPr/>
+                    <a:lstStyle/>
+                    <a:p>
+                      <a:r>
+                        <a:rPr lang="en-US" sz="1200" dirty="0"/>
+                        <a:t>The player must be able to select the level he wants.</a:t>
+                      </a:r>
+                    </a:p>
+                  </a:txBody>
+                  <a:tcPr/>
+                </a:tc>
+                <a:tc>
+                  <a:txBody>
+                    <a:bodyPr/>
+                    <a:lstStyle/>
+                    <a:p>
+                      <a:r>
+                        <a:rPr lang="en-US" sz="1200" dirty="0"/>
+                        <a:t>Visible</a:t>
+                      </a:r>
+                    </a:p>
+                  </a:txBody>
+                  <a:tcPr/>
+                </a:tc>
+                <a:extLst>
+                  <a:ext uri="{0D108BD9-81ED-4DB2-BD59-A6C34878D82A}">
+                    <a16:rowId xmlns:a16="http://schemas.microsoft.com/office/drawing/2014/main" val="402637408"/>
+                  </a:ext>
+                </a:extLst>
+              </a:tr>
+              <a:tr h="370840">
+                <a:tc>
+                  <a:txBody>
+                    <a:bodyPr/>
+                    <a:lstStyle/>
+                    <a:p>
+                      <a:r>
+                        <a:rPr lang="en-US" sz="1200" dirty="0"/>
+                        <a:t>R4</a:t>
+                      </a:r>
+                    </a:p>
+                  </a:txBody>
+                  <a:tcPr/>
+                </a:tc>
+                <a:tc>
+                  <a:txBody>
+                    <a:bodyPr/>
+                    <a:lstStyle/>
+                    <a:p>
+                      <a:r>
+                        <a:rPr lang="en-US" sz="1200" dirty="0"/>
+                        <a:t>Loading visuals and data need to be quick</a:t>
+                      </a:r>
+                    </a:p>
+                  </a:txBody>
+                  <a:tcPr/>
+                </a:tc>
+                <a:tc>
+                  <a:txBody>
+                    <a:bodyPr/>
+                    <a:lstStyle/>
+                    <a:p>
+                      <a:r>
+                        <a:rPr lang="en-US" sz="1200" dirty="0"/>
+                        <a:t>Invisible</a:t>
+                      </a:r>
+                    </a:p>
+                  </a:txBody>
+                  <a:tcPr/>
+                </a:tc>
+                <a:extLst>
+                  <a:ext uri="{0D108BD9-81ED-4DB2-BD59-A6C34878D82A}">
+                    <a16:rowId xmlns:a16="http://schemas.microsoft.com/office/drawing/2014/main" val="3047824491"/>
+                  </a:ext>
+                </a:extLst>
+              </a:tr>
+              <a:tr h="370840">
+                <a:tc>
+                  <a:txBody>
+                    <a:bodyPr/>
+                    <a:lstStyle/>
+                    <a:p>
+                      <a:r>
+                        <a:rPr lang="en-US" sz="1200" dirty="0"/>
+                        <a:t>R5</a:t>
+                      </a:r>
+                    </a:p>
+                  </a:txBody>
+                  <a:tcPr/>
+                </a:tc>
+                <a:tc>
+                  <a:txBody>
+                    <a:bodyPr/>
+                    <a:lstStyle/>
+                    <a:p>
+                      <a:r>
+                        <a:rPr lang="en-US" sz="1200" dirty="0"/>
+                        <a:t>The game must have music and sound effects.</a:t>
+                      </a:r>
+                    </a:p>
+                  </a:txBody>
+                  <a:tcPr/>
+                </a:tc>
+                <a:tc>
+                  <a:txBody>
+                    <a:bodyPr/>
+                    <a:lstStyle/>
+                    <a:p>
+                      <a:r>
+                        <a:rPr lang="en-US" sz="1200" dirty="0"/>
+                        <a:t>Visible</a:t>
+                      </a:r>
+                    </a:p>
+                  </a:txBody>
+                  <a:tcPr/>
+                </a:tc>
+                <a:extLst>
+                  <a:ext uri="{0D108BD9-81ED-4DB2-BD59-A6C34878D82A}">
+                    <a16:rowId xmlns:a16="http://schemas.microsoft.com/office/drawing/2014/main" val="2085931372"/>
+                  </a:ext>
+                </a:extLst>
+              </a:tr>
+              <a:tr h="370840">
+                <a:tc>
+                  <a:txBody>
+                    <a:bodyPr/>
+                    <a:lstStyle/>
+                    <a:p>
+                      <a:r>
+                        <a:rPr lang="en-US" sz="1200" dirty="0"/>
+                        <a:t>R6</a:t>
+                      </a:r>
+                    </a:p>
+                  </a:txBody>
+                  <a:tcPr/>
+                </a:tc>
+                <a:tc>
+                  <a:txBody>
+                    <a:bodyPr/>
+                    <a:lstStyle/>
+                    <a:p>
+                      <a:r>
+                        <a:rPr lang="en-US" sz="1200" dirty="0"/>
+                        <a:t>The game must save the user’s data</a:t>
+                      </a:r>
+                    </a:p>
+                  </a:txBody>
+                  <a:tcPr/>
+                </a:tc>
+                <a:tc>
+                  <a:txBody>
+                    <a:bodyPr/>
+                    <a:lstStyle/>
+                    <a:p>
+                      <a:r>
+                        <a:rPr lang="en-US" sz="1200" dirty="0"/>
+                        <a:t>Invisible</a:t>
+                      </a:r>
+                    </a:p>
+                  </a:txBody>
+                  <a:tcPr/>
+                </a:tc>
+                <a:extLst>
+                  <a:ext uri="{0D108BD9-81ED-4DB2-BD59-A6C34878D82A}">
+                    <a16:rowId xmlns:a16="http://schemas.microsoft.com/office/drawing/2014/main" val="4138630267"/>
+                  </a:ext>
+                </a:extLst>
+              </a:tr>
+            </a:tbl>
+          </a:graphicData>
+        </a:graphic>
+      </p:graphicFrame>
+    </p:spTree>
+    <p:extLst>
+      <p:ext uri="{BB962C8B-B14F-4D97-AF65-F5344CB8AC3E}">
+        <p14:creationId xmlns:p14="http://schemas.microsoft.com/office/powerpoint/2010/main" val="1649728121"/>
+      </p:ext>
+    </p:extLst>
+  </p:cSld>
+  <p:clrMapOvr>
+    <a:masterClrMapping/>
+  </p:clrMapOvr>
+  <p:transition spd="med">
+    <p:fade/>
+  </p:transition>
 </p:sld>
 </file>
 

</xml_diff>

<commit_message>
Fixed Status Duration Bug
</commit_message>
<xml_diff>
--- a/ReportsAndOthers/Presentations/Presentation.pptx
+++ b/ReportsAndOthers/Presentations/Presentation.pptx
@@ -5,34 +5,35 @@
     <p:sldMasterId id="2147483710" r:id="rId1"/>
   </p:sldMasterIdLst>
   <p:notesMasterIdLst>
-    <p:notesMasterId r:id="rId12"/>
+    <p:notesMasterId r:id="rId13"/>
   </p:notesMasterIdLst>
   <p:sldIdLst>
     <p:sldId id="256" r:id="rId2"/>
     <p:sldId id="259" r:id="rId3"/>
     <p:sldId id="262" r:id="rId4"/>
     <p:sldId id="321" r:id="rId5"/>
-    <p:sldId id="295" r:id="rId6"/>
-    <p:sldId id="322" r:id="rId7"/>
-    <p:sldId id="267" r:id="rId8"/>
-    <p:sldId id="323" r:id="rId9"/>
-    <p:sldId id="324" r:id="rId10"/>
-    <p:sldId id="315" r:id="rId11"/>
+    <p:sldId id="325" r:id="rId6"/>
+    <p:sldId id="295" r:id="rId7"/>
+    <p:sldId id="322" r:id="rId8"/>
+    <p:sldId id="267" r:id="rId9"/>
+    <p:sldId id="323" r:id="rId10"/>
+    <p:sldId id="324" r:id="rId11"/>
+    <p:sldId id="315" r:id="rId12"/>
   </p:sldIdLst>
   <p:sldSz cx="9144000" cy="5143500" type="screen16x9"/>
   <p:notesSz cx="6858000" cy="9144000"/>
   <p:embeddedFontLst>
     <p:embeddedFont>
       <p:font typeface="Didact Gothic" panose="00000500000000000000" pitchFamily="2" charset="0"/>
-      <p:regular r:id="rId13"/>
+      <p:regular r:id="rId14"/>
     </p:embeddedFont>
     <p:embeddedFont>
       <p:font typeface="Julius Sans One" panose="020B0604020202020204" charset="0"/>
-      <p:regular r:id="rId14"/>
+      <p:regular r:id="rId15"/>
     </p:embeddedFont>
     <p:embeddedFont>
       <p:font typeface="Questrial" pitchFamily="2" charset="0"/>
-      <p:regular r:id="rId15"/>
+      <p:regular r:id="rId16"/>
     </p:embeddedFont>
   </p:embeddedFontLst>
   <p:defaultTextStyle>
@@ -17596,6 +17597,737 @@
 <file path=ppt/slides/slide10.xml><?xml version="1.0" encoding="utf-8"?>
 <p:sld xmlns:a="http://schemas.openxmlformats.org/drawingml/2006/main" xmlns:r="http://schemas.openxmlformats.org/officeDocument/2006/relationships" xmlns:p="http://schemas.openxmlformats.org/presentationml/2006/main">
   <p:cSld>
+    <p:spTree>
+      <p:nvGrpSpPr>
+        <p:cNvPr id="1" name=""/>
+        <p:cNvGrpSpPr/>
+        <p:nvPr/>
+      </p:nvGrpSpPr>
+      <p:grpSpPr>
+        <a:xfrm>
+          <a:off x="0" y="0"/>
+          <a:ext cx="0" cy="0"/>
+          <a:chOff x="0" y="0"/>
+          <a:chExt cx="0" cy="0"/>
+        </a:xfrm>
+      </p:grpSpPr>
+      <p:sp>
+        <p:nvSpPr>
+          <p:cNvPr id="2" name="Título 1">
+            <a:extLst>
+              <a:ext uri="{FF2B5EF4-FFF2-40B4-BE49-F238E27FC236}">
+                <a16:creationId xmlns:a16="http://schemas.microsoft.com/office/drawing/2014/main" id="{92576A9C-1C0E-96D5-9C40-CA6D25D5249D}"/>
+              </a:ext>
+            </a:extLst>
+          </p:cNvPr>
+          <p:cNvSpPr>
+            <a:spLocks noGrp="1"/>
+          </p:cNvSpPr>
+          <p:nvPr>
+            <p:ph type="title"/>
+          </p:nvPr>
+        </p:nvSpPr>
+        <p:spPr/>
+        <p:txBody>
+          <a:bodyPr/>
+          <a:lstStyle/>
+          <a:p>
+            <a:r>
+              <a:rPr lang="en-US" dirty="0"/>
+              <a:t>System Functions</a:t>
+            </a:r>
+            <a:br>
+              <a:rPr lang="en-US" dirty="0"/>
+            </a:br>
+            <a:endParaRPr lang="en-US" dirty="0"/>
+          </a:p>
+        </p:txBody>
+      </p:sp>
+      <p:graphicFrame>
+        <p:nvGraphicFramePr>
+          <p:cNvPr id="6" name="Tabela 6">
+            <a:extLst>
+              <a:ext uri="{FF2B5EF4-FFF2-40B4-BE49-F238E27FC236}">
+                <a16:creationId xmlns:a16="http://schemas.microsoft.com/office/drawing/2014/main" id="{6400C405-188F-CDF4-501D-26DDF4970508}"/>
+              </a:ext>
+            </a:extLst>
+          </p:cNvPr>
+          <p:cNvGraphicFramePr>
+            <a:graphicFrameLocks noGrp="1"/>
+          </p:cNvGraphicFramePr>
+          <p:nvPr>
+            <p:extLst>
+              <p:ext uri="{D42A27DB-BD31-4B8C-83A1-F6EECF244321}">
+                <p14:modId xmlns:p14="http://schemas.microsoft.com/office/powerpoint/2010/main" val="133918374"/>
+              </p:ext>
+            </p:extLst>
+          </p:nvPr>
+        </p:nvGraphicFramePr>
+        <p:xfrm>
+          <a:off x="251057" y="1378523"/>
+          <a:ext cx="8635236" cy="2595880"/>
+        </p:xfrm>
+        <a:graphic>
+          <a:graphicData uri="http://schemas.openxmlformats.org/drawingml/2006/table">
+            <a:tbl>
+              <a:tblPr firstRow="1" bandRow="1">
+                <a:tableStyleId>{21E4AEA4-8DFA-4A89-87EB-49C32662AFE0}</a:tableStyleId>
+              </a:tblPr>
+              <a:tblGrid>
+                <a:gridCol w="1199608">
+                  <a:extLst>
+                    <a:ext uri="{9D8B030D-6E8A-4147-A177-3AD203B41FA5}">
+                      <a16:colId xmlns:a16="http://schemas.microsoft.com/office/drawing/2014/main" val="418046561"/>
+                    </a:ext>
+                  </a:extLst>
+                </a:gridCol>
+                <a:gridCol w="4557216">
+                  <a:extLst>
+                    <a:ext uri="{9D8B030D-6E8A-4147-A177-3AD203B41FA5}">
+                      <a16:colId xmlns:a16="http://schemas.microsoft.com/office/drawing/2014/main" val="1552109539"/>
+                    </a:ext>
+                  </a:extLst>
+                </a:gridCol>
+                <a:gridCol w="2878412">
+                  <a:extLst>
+                    <a:ext uri="{9D8B030D-6E8A-4147-A177-3AD203B41FA5}">
+                      <a16:colId xmlns:a16="http://schemas.microsoft.com/office/drawing/2014/main" val="3561355658"/>
+                    </a:ext>
+                  </a:extLst>
+                </a:gridCol>
+              </a:tblGrid>
+              <a:tr h="370840">
+                <a:tc>
+                  <a:txBody>
+                    <a:bodyPr/>
+                    <a:lstStyle/>
+                    <a:p>
+                      <a:r>
+                        <a:rPr lang="en-US" sz="1200" dirty="0"/>
+                        <a:t>Requirements</a:t>
+                      </a:r>
+                    </a:p>
+                  </a:txBody>
+                  <a:tcPr/>
+                </a:tc>
+                <a:tc>
+                  <a:txBody>
+                    <a:bodyPr/>
+                    <a:lstStyle/>
+                    <a:p>
+                      <a:r>
+                        <a:rPr lang="en-US" sz="1200" dirty="0"/>
+                        <a:t>Function</a:t>
+                      </a:r>
+                    </a:p>
+                  </a:txBody>
+                  <a:tcPr/>
+                </a:tc>
+                <a:tc>
+                  <a:txBody>
+                    <a:bodyPr/>
+                    <a:lstStyle/>
+                    <a:p>
+                      <a:r>
+                        <a:rPr lang="en-US" sz="1200" dirty="0"/>
+                        <a:t>Category</a:t>
+                      </a:r>
+                    </a:p>
+                  </a:txBody>
+                  <a:tcPr/>
+                </a:tc>
+                <a:extLst>
+                  <a:ext uri="{0D108BD9-81ED-4DB2-BD59-A6C34878D82A}">
+                    <a16:rowId xmlns:a16="http://schemas.microsoft.com/office/drawing/2014/main" val="1002566362"/>
+                  </a:ext>
+                </a:extLst>
+              </a:tr>
+              <a:tr h="370840">
+                <a:tc>
+                  <a:txBody>
+                    <a:bodyPr/>
+                    <a:lstStyle/>
+                    <a:p>
+                      <a:r>
+                        <a:rPr lang="en-US" sz="1200" dirty="0"/>
+                        <a:t>R1</a:t>
+                      </a:r>
+                    </a:p>
+                  </a:txBody>
+                  <a:tcPr/>
+                </a:tc>
+                <a:tc>
+                  <a:txBody>
+                    <a:bodyPr/>
+                    <a:lstStyle/>
+                    <a:p>
+                      <a:r>
+                        <a:rPr lang="en-US" sz="1200" dirty="0"/>
+                        <a:t>The game must have a tutorial</a:t>
+                      </a:r>
+                    </a:p>
+                  </a:txBody>
+                  <a:tcPr/>
+                </a:tc>
+                <a:tc>
+                  <a:txBody>
+                    <a:bodyPr/>
+                    <a:lstStyle/>
+                    <a:p>
+                      <a:r>
+                        <a:rPr lang="en-US" sz="1200" dirty="0"/>
+                        <a:t>Visible</a:t>
+                      </a:r>
+                    </a:p>
+                  </a:txBody>
+                  <a:tcPr/>
+                </a:tc>
+                <a:extLst>
+                  <a:ext uri="{0D108BD9-81ED-4DB2-BD59-A6C34878D82A}">
+                    <a16:rowId xmlns:a16="http://schemas.microsoft.com/office/drawing/2014/main" val="746098265"/>
+                  </a:ext>
+                </a:extLst>
+              </a:tr>
+              <a:tr h="370840">
+                <a:tc>
+                  <a:txBody>
+                    <a:bodyPr/>
+                    <a:lstStyle/>
+                    <a:p>
+                      <a:r>
+                        <a:rPr lang="en-US" sz="1200" dirty="0"/>
+                        <a:t>R2</a:t>
+                      </a:r>
+                    </a:p>
+                  </a:txBody>
+                  <a:tcPr/>
+                </a:tc>
+                <a:tc>
+                  <a:txBody>
+                    <a:bodyPr/>
+                    <a:lstStyle/>
+                    <a:p>
+                      <a:r>
+                        <a:rPr lang="en-US" sz="1200" dirty="0"/>
+                        <a:t>The player must be able to control his actions</a:t>
+                      </a:r>
+                    </a:p>
+                  </a:txBody>
+                  <a:tcPr/>
+                </a:tc>
+                <a:tc>
+                  <a:txBody>
+                    <a:bodyPr/>
+                    <a:lstStyle/>
+                    <a:p>
+                      <a:r>
+                        <a:rPr lang="en-US" sz="1200" dirty="0"/>
+                        <a:t>Visible</a:t>
+                      </a:r>
+                    </a:p>
+                  </a:txBody>
+                  <a:tcPr/>
+                </a:tc>
+                <a:extLst>
+                  <a:ext uri="{0D108BD9-81ED-4DB2-BD59-A6C34878D82A}">
+                    <a16:rowId xmlns:a16="http://schemas.microsoft.com/office/drawing/2014/main" val="309980605"/>
+                  </a:ext>
+                </a:extLst>
+              </a:tr>
+              <a:tr h="370840">
+                <a:tc>
+                  <a:txBody>
+                    <a:bodyPr/>
+                    <a:lstStyle/>
+                    <a:p>
+                      <a:r>
+                        <a:rPr lang="en-US" sz="1200" dirty="0"/>
+                        <a:t>R3</a:t>
+                      </a:r>
+                    </a:p>
+                  </a:txBody>
+                  <a:tcPr/>
+                </a:tc>
+                <a:tc>
+                  <a:txBody>
+                    <a:bodyPr/>
+                    <a:lstStyle/>
+                    <a:p>
+                      <a:r>
+                        <a:rPr lang="en-US" sz="1200" dirty="0"/>
+                        <a:t>The player must be able to select the level he wants.</a:t>
+                      </a:r>
+                    </a:p>
+                  </a:txBody>
+                  <a:tcPr/>
+                </a:tc>
+                <a:tc>
+                  <a:txBody>
+                    <a:bodyPr/>
+                    <a:lstStyle/>
+                    <a:p>
+                      <a:r>
+                        <a:rPr lang="en-US" sz="1200" dirty="0"/>
+                        <a:t>Visible</a:t>
+                      </a:r>
+                    </a:p>
+                  </a:txBody>
+                  <a:tcPr/>
+                </a:tc>
+                <a:extLst>
+                  <a:ext uri="{0D108BD9-81ED-4DB2-BD59-A6C34878D82A}">
+                    <a16:rowId xmlns:a16="http://schemas.microsoft.com/office/drawing/2014/main" val="402637408"/>
+                  </a:ext>
+                </a:extLst>
+              </a:tr>
+              <a:tr h="370840">
+                <a:tc>
+                  <a:txBody>
+                    <a:bodyPr/>
+                    <a:lstStyle/>
+                    <a:p>
+                      <a:r>
+                        <a:rPr lang="en-US" sz="1200" dirty="0"/>
+                        <a:t>R4</a:t>
+                      </a:r>
+                    </a:p>
+                  </a:txBody>
+                  <a:tcPr/>
+                </a:tc>
+                <a:tc>
+                  <a:txBody>
+                    <a:bodyPr/>
+                    <a:lstStyle/>
+                    <a:p>
+                      <a:r>
+                        <a:rPr lang="en-US" sz="1200" dirty="0"/>
+                        <a:t>Loading visuals and data need to be quick</a:t>
+                      </a:r>
+                    </a:p>
+                  </a:txBody>
+                  <a:tcPr/>
+                </a:tc>
+                <a:tc>
+                  <a:txBody>
+                    <a:bodyPr/>
+                    <a:lstStyle/>
+                    <a:p>
+                      <a:r>
+                        <a:rPr lang="en-US" sz="1200" dirty="0"/>
+                        <a:t>Invisible</a:t>
+                      </a:r>
+                    </a:p>
+                  </a:txBody>
+                  <a:tcPr/>
+                </a:tc>
+                <a:extLst>
+                  <a:ext uri="{0D108BD9-81ED-4DB2-BD59-A6C34878D82A}">
+                    <a16:rowId xmlns:a16="http://schemas.microsoft.com/office/drawing/2014/main" val="3047824491"/>
+                  </a:ext>
+                </a:extLst>
+              </a:tr>
+              <a:tr h="370840">
+                <a:tc>
+                  <a:txBody>
+                    <a:bodyPr/>
+                    <a:lstStyle/>
+                    <a:p>
+                      <a:r>
+                        <a:rPr lang="en-US" sz="1200" dirty="0"/>
+                        <a:t>R5</a:t>
+                      </a:r>
+                    </a:p>
+                  </a:txBody>
+                  <a:tcPr/>
+                </a:tc>
+                <a:tc>
+                  <a:txBody>
+                    <a:bodyPr/>
+                    <a:lstStyle/>
+                    <a:p>
+                      <a:r>
+                        <a:rPr lang="en-US" sz="1200" dirty="0"/>
+                        <a:t>The game must have music and sound effects.</a:t>
+                      </a:r>
+                    </a:p>
+                  </a:txBody>
+                  <a:tcPr/>
+                </a:tc>
+                <a:tc>
+                  <a:txBody>
+                    <a:bodyPr/>
+                    <a:lstStyle/>
+                    <a:p>
+                      <a:r>
+                        <a:rPr lang="en-US" sz="1200" dirty="0"/>
+                        <a:t>Visible</a:t>
+                      </a:r>
+                    </a:p>
+                  </a:txBody>
+                  <a:tcPr/>
+                </a:tc>
+                <a:extLst>
+                  <a:ext uri="{0D108BD9-81ED-4DB2-BD59-A6C34878D82A}">
+                    <a16:rowId xmlns:a16="http://schemas.microsoft.com/office/drawing/2014/main" val="2085931372"/>
+                  </a:ext>
+                </a:extLst>
+              </a:tr>
+              <a:tr h="370840">
+                <a:tc>
+                  <a:txBody>
+                    <a:bodyPr/>
+                    <a:lstStyle/>
+                    <a:p>
+                      <a:r>
+                        <a:rPr lang="en-US" sz="1200" dirty="0"/>
+                        <a:t>R6</a:t>
+                      </a:r>
+                    </a:p>
+                  </a:txBody>
+                  <a:tcPr/>
+                </a:tc>
+                <a:tc>
+                  <a:txBody>
+                    <a:bodyPr/>
+                    <a:lstStyle/>
+                    <a:p>
+                      <a:r>
+                        <a:rPr lang="en-US" sz="1200" dirty="0"/>
+                        <a:t>The game must save the user’s data</a:t>
+                      </a:r>
+                    </a:p>
+                  </a:txBody>
+                  <a:tcPr/>
+                </a:tc>
+                <a:tc>
+                  <a:txBody>
+                    <a:bodyPr/>
+                    <a:lstStyle/>
+                    <a:p>
+                      <a:r>
+                        <a:rPr lang="en-US" sz="1200" dirty="0"/>
+                        <a:t>Invisible</a:t>
+                      </a:r>
+                    </a:p>
+                  </a:txBody>
+                  <a:tcPr/>
+                </a:tc>
+                <a:extLst>
+                  <a:ext uri="{0D108BD9-81ED-4DB2-BD59-A6C34878D82A}">
+                    <a16:rowId xmlns:a16="http://schemas.microsoft.com/office/drawing/2014/main" val="4138630267"/>
+                  </a:ext>
+                </a:extLst>
+              </a:tr>
+            </a:tbl>
+          </a:graphicData>
+        </a:graphic>
+      </p:graphicFrame>
+      <p:sp>
+        <p:nvSpPr>
+          <p:cNvPr id="3" name="Google Shape;531;p73">
+            <a:extLst>
+              <a:ext uri="{FF2B5EF4-FFF2-40B4-BE49-F238E27FC236}">
+                <a16:creationId xmlns:a16="http://schemas.microsoft.com/office/drawing/2014/main" id="{93AE1D72-C5FB-1F21-E38D-F1A465209720}"/>
+              </a:ext>
+            </a:extLst>
+          </p:cNvPr>
+          <p:cNvSpPr txBox="1">
+            <a:spLocks/>
+          </p:cNvSpPr>
+          <p:nvPr/>
+        </p:nvSpPr>
+        <p:spPr>
+          <a:xfrm>
+            <a:off x="8427719" y="4710914"/>
+            <a:ext cx="716281" cy="432586"/>
+          </a:xfrm>
+          <a:prstGeom prst="rect">
+            <a:avLst/>
+          </a:prstGeom>
+          <a:noFill/>
+          <a:ln>
+            <a:noFill/>
+          </a:ln>
+        </p:spPr>
+        <p:txBody>
+          <a:bodyPr spcFirstLastPara="1" wrap="square" lIns="91425" tIns="91425" rIns="91425" bIns="91425" numCol="1" anchor="t" anchorCtr="0">
+            <a:noAutofit/>
+          </a:bodyPr>
+          <a:lstStyle>
+            <a:defPPr marR="0" lvl="0" algn="l" rtl="0">
+              <a:lnSpc>
+                <a:spcPct val="100000"/>
+              </a:lnSpc>
+              <a:spcBef>
+                <a:spcPts val="0"/>
+              </a:spcBef>
+              <a:spcAft>
+                <a:spcPts val="0"/>
+              </a:spcAft>
+            </a:defPPr>
+            <a:lvl1pPr marL="457200" marR="0" lvl="0" indent="-317500" algn="l" rtl="0">
+              <a:lnSpc>
+                <a:spcPct val="100000"/>
+              </a:lnSpc>
+              <a:spcBef>
+                <a:spcPts val="0"/>
+              </a:spcBef>
+              <a:spcAft>
+                <a:spcPts val="0"/>
+              </a:spcAft>
+              <a:buClr>
+                <a:schemeClr val="dk1"/>
+              </a:buClr>
+              <a:buSzPts val="1400"/>
+              <a:buFont typeface="Didact Gothic"/>
+              <a:buNone/>
+              <a:defRPr sz="1400" b="0" i="0" u="none" strike="noStrike" cap="none">
+                <a:solidFill>
+                  <a:schemeClr val="dk1"/>
+                </a:solidFill>
+                <a:latin typeface="Didact Gothic"/>
+                <a:ea typeface="Didact Gothic"/>
+                <a:cs typeface="Didact Gothic"/>
+                <a:sym typeface="Didact Gothic"/>
+              </a:defRPr>
+            </a:lvl1pPr>
+            <a:lvl2pPr marL="914400" marR="0" lvl="1" indent="-317500" algn="l" rtl="0">
+              <a:lnSpc>
+                <a:spcPct val="115000"/>
+              </a:lnSpc>
+              <a:spcBef>
+                <a:spcPts val="0"/>
+              </a:spcBef>
+              <a:spcAft>
+                <a:spcPts val="0"/>
+              </a:spcAft>
+              <a:buClr>
+                <a:schemeClr val="dk1"/>
+              </a:buClr>
+              <a:buSzPts val="1400"/>
+              <a:buFont typeface="Didact Gothic"/>
+              <a:buNone/>
+              <a:defRPr sz="1400" b="0" i="0" u="none" strike="noStrike" cap="none">
+                <a:solidFill>
+                  <a:schemeClr val="dk1"/>
+                </a:solidFill>
+                <a:latin typeface="Didact Gothic"/>
+                <a:ea typeface="Didact Gothic"/>
+                <a:cs typeface="Didact Gothic"/>
+                <a:sym typeface="Didact Gothic"/>
+              </a:defRPr>
+            </a:lvl2pPr>
+            <a:lvl3pPr marL="1371600" marR="0" lvl="2" indent="-317500" algn="l" rtl="0">
+              <a:lnSpc>
+                <a:spcPct val="115000"/>
+              </a:lnSpc>
+              <a:spcBef>
+                <a:spcPts val="1600"/>
+              </a:spcBef>
+              <a:spcAft>
+                <a:spcPts val="0"/>
+              </a:spcAft>
+              <a:buClr>
+                <a:schemeClr val="dk1"/>
+              </a:buClr>
+              <a:buSzPts val="1400"/>
+              <a:buFont typeface="Didact Gothic"/>
+              <a:buNone/>
+              <a:defRPr sz="1400" b="0" i="0" u="none" strike="noStrike" cap="none">
+                <a:solidFill>
+                  <a:schemeClr val="dk1"/>
+                </a:solidFill>
+                <a:latin typeface="Didact Gothic"/>
+                <a:ea typeface="Didact Gothic"/>
+                <a:cs typeface="Didact Gothic"/>
+                <a:sym typeface="Didact Gothic"/>
+              </a:defRPr>
+            </a:lvl3pPr>
+            <a:lvl4pPr marL="1828800" marR="0" lvl="3" indent="-317500" algn="l" rtl="0">
+              <a:lnSpc>
+                <a:spcPct val="115000"/>
+              </a:lnSpc>
+              <a:spcBef>
+                <a:spcPts val="1600"/>
+              </a:spcBef>
+              <a:spcAft>
+                <a:spcPts val="0"/>
+              </a:spcAft>
+              <a:buClr>
+                <a:schemeClr val="dk1"/>
+              </a:buClr>
+              <a:buSzPts val="1400"/>
+              <a:buFont typeface="Didact Gothic"/>
+              <a:buNone/>
+              <a:defRPr sz="1400" b="0" i="0" u="none" strike="noStrike" cap="none">
+                <a:solidFill>
+                  <a:schemeClr val="dk1"/>
+                </a:solidFill>
+                <a:latin typeface="Didact Gothic"/>
+                <a:ea typeface="Didact Gothic"/>
+                <a:cs typeface="Didact Gothic"/>
+                <a:sym typeface="Didact Gothic"/>
+              </a:defRPr>
+            </a:lvl4pPr>
+            <a:lvl5pPr marL="2286000" marR="0" lvl="4" indent="-317500" algn="l" rtl="0">
+              <a:lnSpc>
+                <a:spcPct val="115000"/>
+              </a:lnSpc>
+              <a:spcBef>
+                <a:spcPts val="1600"/>
+              </a:spcBef>
+              <a:spcAft>
+                <a:spcPts val="0"/>
+              </a:spcAft>
+              <a:buClr>
+                <a:schemeClr val="dk1"/>
+              </a:buClr>
+              <a:buSzPts val="1400"/>
+              <a:buFont typeface="Didact Gothic"/>
+              <a:buNone/>
+              <a:defRPr sz="1400" b="0" i="0" u="none" strike="noStrike" cap="none">
+                <a:solidFill>
+                  <a:schemeClr val="dk1"/>
+                </a:solidFill>
+                <a:latin typeface="Didact Gothic"/>
+                <a:ea typeface="Didact Gothic"/>
+                <a:cs typeface="Didact Gothic"/>
+                <a:sym typeface="Didact Gothic"/>
+              </a:defRPr>
+            </a:lvl5pPr>
+            <a:lvl6pPr marL="2743200" marR="0" lvl="5" indent="-317500" algn="l" rtl="0">
+              <a:lnSpc>
+                <a:spcPct val="115000"/>
+              </a:lnSpc>
+              <a:spcBef>
+                <a:spcPts val="1600"/>
+              </a:spcBef>
+              <a:spcAft>
+                <a:spcPts val="0"/>
+              </a:spcAft>
+              <a:buClr>
+                <a:schemeClr val="dk1"/>
+              </a:buClr>
+              <a:buSzPts val="1400"/>
+              <a:buFont typeface="Didact Gothic"/>
+              <a:buNone/>
+              <a:defRPr sz="1400" b="0" i="0" u="none" strike="noStrike" cap="none">
+                <a:solidFill>
+                  <a:schemeClr val="dk1"/>
+                </a:solidFill>
+                <a:latin typeface="Didact Gothic"/>
+                <a:ea typeface="Didact Gothic"/>
+                <a:cs typeface="Didact Gothic"/>
+                <a:sym typeface="Didact Gothic"/>
+              </a:defRPr>
+            </a:lvl6pPr>
+            <a:lvl7pPr marL="3200400" marR="0" lvl="6" indent="-317500" algn="l" rtl="0">
+              <a:lnSpc>
+                <a:spcPct val="115000"/>
+              </a:lnSpc>
+              <a:spcBef>
+                <a:spcPts val="1600"/>
+              </a:spcBef>
+              <a:spcAft>
+                <a:spcPts val="0"/>
+              </a:spcAft>
+              <a:buClr>
+                <a:schemeClr val="dk1"/>
+              </a:buClr>
+              <a:buSzPts val="1400"/>
+              <a:buFont typeface="Didact Gothic"/>
+              <a:buNone/>
+              <a:defRPr sz="1400" b="0" i="0" u="none" strike="noStrike" cap="none">
+                <a:solidFill>
+                  <a:schemeClr val="dk1"/>
+                </a:solidFill>
+                <a:latin typeface="Didact Gothic"/>
+                <a:ea typeface="Didact Gothic"/>
+                <a:cs typeface="Didact Gothic"/>
+                <a:sym typeface="Didact Gothic"/>
+              </a:defRPr>
+            </a:lvl7pPr>
+            <a:lvl8pPr marL="3657600" marR="0" lvl="7" indent="-317500" algn="l" rtl="0">
+              <a:lnSpc>
+                <a:spcPct val="115000"/>
+              </a:lnSpc>
+              <a:spcBef>
+                <a:spcPts val="1600"/>
+              </a:spcBef>
+              <a:spcAft>
+                <a:spcPts val="0"/>
+              </a:spcAft>
+              <a:buClr>
+                <a:schemeClr val="dk1"/>
+              </a:buClr>
+              <a:buSzPts val="1400"/>
+              <a:buFont typeface="Didact Gothic"/>
+              <a:buNone/>
+              <a:defRPr sz="1400" b="0" i="0" u="none" strike="noStrike" cap="none">
+                <a:solidFill>
+                  <a:schemeClr val="dk1"/>
+                </a:solidFill>
+                <a:latin typeface="Didact Gothic"/>
+                <a:ea typeface="Didact Gothic"/>
+                <a:cs typeface="Didact Gothic"/>
+                <a:sym typeface="Didact Gothic"/>
+              </a:defRPr>
+            </a:lvl8pPr>
+            <a:lvl9pPr marL="4114800" marR="0" lvl="8" indent="-317500" algn="l" rtl="0">
+              <a:lnSpc>
+                <a:spcPct val="115000"/>
+              </a:lnSpc>
+              <a:spcBef>
+                <a:spcPts val="1600"/>
+              </a:spcBef>
+              <a:spcAft>
+                <a:spcPts val="1600"/>
+              </a:spcAft>
+              <a:buClr>
+                <a:schemeClr val="dk1"/>
+              </a:buClr>
+              <a:buSzPts val="1400"/>
+              <a:buFont typeface="Didact Gothic"/>
+              <a:buNone/>
+              <a:defRPr sz="1400" b="0" i="0" u="none" strike="noStrike" cap="none">
+                <a:solidFill>
+                  <a:schemeClr val="dk1"/>
+                </a:solidFill>
+                <a:latin typeface="Didact Gothic"/>
+                <a:ea typeface="Didact Gothic"/>
+                <a:cs typeface="Didact Gothic"/>
+                <a:sym typeface="Didact Gothic"/>
+              </a:defRPr>
+            </a:lvl9pPr>
+          </a:lstStyle>
+          <a:p>
+            <a:pPr marL="88900" indent="0"/>
+            <a:r>
+              <a:rPr lang="en" dirty="0"/>
+              <a:t>10/11</a:t>
+            </a:r>
+          </a:p>
+        </p:txBody>
+      </p:sp>
+    </p:spTree>
+    <p:extLst>
+      <p:ext uri="{BB962C8B-B14F-4D97-AF65-F5344CB8AC3E}">
+        <p14:creationId xmlns:p14="http://schemas.microsoft.com/office/powerpoint/2010/main" val="1649728121"/>
+      </p:ext>
+    </p:extLst>
+  </p:cSld>
+  <p:clrMapOvr>
+    <a:masterClrMapping/>
+  </p:clrMapOvr>
+  <p:transition spd="med">
+    <p:fade/>
+  </p:transition>
+</p:sld>
+</file>
+
+<file path=ppt/slides/slide11.xml><?xml version="1.0" encoding="utf-8"?>
+<p:sld xmlns:a="http://schemas.openxmlformats.org/drawingml/2006/main" xmlns:r="http://schemas.openxmlformats.org/officeDocument/2006/relationships" xmlns:p="http://schemas.openxmlformats.org/presentationml/2006/main">
+  <p:cSld>
     <p:bg>
       <p:bgPr>
         <a:solidFill>
@@ -19873,7 +20605,7 @@
             <a:pPr marL="88900" indent="0"/>
             <a:r>
               <a:rPr lang="en" dirty="0"/>
-              <a:t>2/8</a:t>
+              <a:t>2/11</a:t>
             </a:r>
           </a:p>
         </p:txBody>
@@ -19920,7 +20652,7 @@
         </p:nvGrpSpPr>
         <p:grpSpPr>
           <a:xfrm>
-            <a:off x="5392353" y="538677"/>
+            <a:off x="5443679" y="444548"/>
             <a:ext cx="3106188" cy="4066145"/>
             <a:chOff x="5634400" y="747899"/>
             <a:chExt cx="3106188" cy="4066145"/>
@@ -21584,7 +22316,7 @@
                   <a:schemeClr val="bg1"/>
                 </a:solidFill>
               </a:rPr>
-              <a:t>3/8</a:t>
+              <a:t>3/11</a:t>
             </a:r>
           </a:p>
         </p:txBody>
@@ -21985,7 +22717,7 @@
             </a:r>
             <a:r>
               <a:rPr lang="en-US" dirty="0"/>
-              <a:t> to reach the final room and beat the stage </a:t>
+              <a:t> to reach the final room and beat the stage</a:t>
             </a:r>
           </a:p>
           <a:p>
@@ -21996,138 +22728,7 @@
             </a:pPr>
             <a:r>
               <a:rPr lang="en-US" dirty="0"/>
-              <a:t>Proceed to the next stage and repeat…</a:t>
-            </a:r>
-          </a:p>
-        </p:txBody>
-      </p:sp>
-      <p:sp>
-        <p:nvSpPr>
-          <p:cNvPr id="3" name="Subtítulo 2">
-            <a:extLst>
-              <a:ext uri="{FF2B5EF4-FFF2-40B4-BE49-F238E27FC236}">
-                <a16:creationId xmlns:a16="http://schemas.microsoft.com/office/drawing/2014/main" id="{943F85DE-7BEE-DB7B-2A7F-0FD74483E52C}"/>
-              </a:ext>
-            </a:extLst>
-          </p:cNvPr>
-          <p:cNvSpPr>
-            <a:spLocks noGrp="1"/>
-          </p:cNvSpPr>
-          <p:nvPr>
-            <p:ph type="subTitle" idx="2"/>
-          </p:nvPr>
-        </p:nvSpPr>
-        <p:spPr>
-          <a:xfrm>
-            <a:off x="4647627" y="3473545"/>
-            <a:ext cx="4214490" cy="990600"/>
-          </a:xfrm>
-        </p:spPr>
-        <p:txBody>
-          <a:bodyPr/>
-          <a:lstStyle/>
-          <a:p>
-            <a:pPr algn="l">
-              <a:spcAft>
-                <a:spcPts val="600"/>
-              </a:spcAft>
-            </a:pPr>
-            <a:r>
-              <a:rPr lang="en-US" dirty="0"/>
-              <a:t>Choose a path</a:t>
-            </a:r>
-          </a:p>
-          <a:p>
-            <a:pPr algn="l">
-              <a:spcAft>
-                <a:spcPts val="600"/>
-              </a:spcAft>
-            </a:pPr>
-            <a:r>
-              <a:rPr lang="en-US" dirty="0"/>
-              <a:t>Turn-based with a set </a:t>
-            </a:r>
-            <a:r>
-              <a:rPr lang="en-US" u="sng" dirty="0"/>
-              <a:t>energy limit </a:t>
-            </a:r>
-          </a:p>
-          <a:p>
-            <a:pPr algn="l">
-              <a:spcAft>
-                <a:spcPts val="600"/>
-              </a:spcAft>
-            </a:pPr>
-            <a:r>
-              <a:rPr lang="en-US" dirty="0"/>
-              <a:t>Use </a:t>
-            </a:r>
-            <a:r>
-              <a:rPr lang="en-US" u="sng" dirty="0"/>
-              <a:t>cards to attack</a:t>
-            </a:r>
-            <a:r>
-              <a:rPr lang="en-US" dirty="0"/>
-              <a:t> and defeat enemies</a:t>
-            </a:r>
-          </a:p>
-          <a:p>
-            <a:pPr algn="l">
-              <a:spcAft>
-                <a:spcPts val="600"/>
-              </a:spcAft>
-            </a:pPr>
-            <a:r>
-              <a:rPr lang="en-US" dirty="0"/>
-              <a:t>Acquire upgrades that help in the next fights</a:t>
-            </a:r>
-          </a:p>
-          <a:p>
-            <a:pPr algn="l">
-              <a:spcAft>
-                <a:spcPts val="600"/>
-              </a:spcAft>
-            </a:pPr>
-            <a:r>
-              <a:rPr lang="en-US" dirty="0"/>
-              <a:t>Difficulty increases as player progresses</a:t>
-            </a:r>
-          </a:p>
-        </p:txBody>
-      </p:sp>
-      <p:sp>
-        <p:nvSpPr>
-          <p:cNvPr id="4" name="Título 3">
-            <a:extLst>
-              <a:ext uri="{FF2B5EF4-FFF2-40B4-BE49-F238E27FC236}">
-                <a16:creationId xmlns:a16="http://schemas.microsoft.com/office/drawing/2014/main" id="{AFE2D430-5327-BD30-11E6-4DBB136F1E0E}"/>
-              </a:ext>
-            </a:extLst>
-          </p:cNvPr>
-          <p:cNvSpPr>
-            <a:spLocks noGrp="1"/>
-          </p:cNvSpPr>
-          <p:nvPr>
-            <p:ph type="title"/>
-          </p:nvPr>
-        </p:nvSpPr>
-        <p:spPr>
-          <a:xfrm>
-            <a:off x="4970761" y="2759650"/>
-            <a:ext cx="3568223" cy="528600"/>
-          </a:xfrm>
-        </p:spPr>
-        <p:txBody>
-          <a:bodyPr/>
-          <a:lstStyle/>
-          <a:p>
-            <a:r>
-              <a:rPr lang="pt-PT" dirty="0"/>
-              <a:t>Core </a:t>
-            </a:r>
-            <a:r>
-              <a:rPr lang="en-US" dirty="0"/>
-              <a:t>gameplay</a:t>
+              <a:t>Proceed to the next world and repeat…</a:t>
             </a:r>
           </a:p>
         </p:txBody>
@@ -22447,11 +23048,41 @@
             <a:pPr marL="88900" indent="0"/>
             <a:r>
               <a:rPr lang="en" dirty="0"/>
-              <a:t>4/8</a:t>
+              <a:t>4/11</a:t>
             </a:r>
           </a:p>
         </p:txBody>
       </p:sp>
+      <p:pic>
+        <p:nvPicPr>
+          <p:cNvPr id="19" name="Imagem 18" descr="Uma imagem com captura de ecrã, Jogo de pc, Software de multimédia, jogo&#10;&#10;Descrição gerada automaticamente">
+            <a:extLst>
+              <a:ext uri="{FF2B5EF4-FFF2-40B4-BE49-F238E27FC236}">
+                <a16:creationId xmlns:a16="http://schemas.microsoft.com/office/drawing/2014/main" id="{86A39810-3D1A-2C29-441A-D679C9767A13}"/>
+              </a:ext>
+            </a:extLst>
+          </p:cNvPr>
+          <p:cNvPicPr>
+            <a:picLocks noChangeAspect="1"/>
+          </p:cNvPicPr>
+          <p:nvPr/>
+        </p:nvPicPr>
+        <p:blipFill>
+          <a:blip r:embed="rId2"/>
+          <a:stretch>
+            <a:fillRect/>
+          </a:stretch>
+        </p:blipFill>
+        <p:spPr>
+          <a:xfrm>
+            <a:off x="4371996" y="2096934"/>
+            <a:ext cx="4772004" cy="2277097"/>
+          </a:xfrm>
+          <a:prstGeom prst="rect">
+            <a:avLst/>
+          </a:prstGeom>
+        </p:spPr>
+      </p:pic>
     </p:spTree>
     <p:extLst>
       <p:ext uri="{BB962C8B-B14F-4D97-AF65-F5344CB8AC3E}">
@@ -22653,27 +23284,669 @@
                             </p:childTnLst>
                           </p:cTn>
                         </p:par>
+                      </p:childTnLst>
+                    </p:cTn>
+                  </p:par>
+                </p:childTnLst>
+              </p:cTn>
+              <p:prevCondLst>
+                <p:cond evt="onPrev" delay="0">
+                  <p:tgtEl>
+                    <p:sldTgt/>
+                  </p:tgtEl>
+                </p:cond>
+              </p:prevCondLst>
+              <p:nextCondLst>
+                <p:cond evt="onNext" delay="0">
+                  <p:tgtEl>
+                    <p:sldTgt/>
+                  </p:tgtEl>
+                </p:cond>
+              </p:nextCondLst>
+            </p:seq>
+          </p:childTnLst>
+        </p:cTn>
+      </p:par>
+    </p:tnLst>
+    <p:bldLst>
+      <p:bldP spid="2" grpId="0"/>
+      <p:bldP spid="5" grpId="0"/>
+    </p:bldLst>
+  </p:timing>
+</p:sld>
+</file>
+
+<file path=ppt/slides/slide5.xml><?xml version="1.0" encoding="utf-8"?>
+<p:sld xmlns:a="http://schemas.openxmlformats.org/drawingml/2006/main" xmlns:r="http://schemas.openxmlformats.org/officeDocument/2006/relationships" xmlns:p="http://schemas.openxmlformats.org/presentationml/2006/main">
+  <p:cSld>
+    <p:spTree>
+      <p:nvGrpSpPr>
+        <p:cNvPr id="1" name=""/>
+        <p:cNvGrpSpPr/>
+        <p:nvPr/>
+      </p:nvGrpSpPr>
+      <p:grpSpPr>
+        <a:xfrm>
+          <a:off x="0" y="0"/>
+          <a:ext cx="0" cy="0"/>
+          <a:chOff x="0" y="0"/>
+          <a:chExt cx="0" cy="0"/>
+        </a:xfrm>
+      </p:grpSpPr>
+      <p:pic>
+        <p:nvPicPr>
+          <p:cNvPr id="23" name="Imagem 22">
+            <a:extLst>
+              <a:ext uri="{FF2B5EF4-FFF2-40B4-BE49-F238E27FC236}">
+                <a16:creationId xmlns:a16="http://schemas.microsoft.com/office/drawing/2014/main" id="{F41790DD-0313-B2A5-1397-5025843F7C5B}"/>
+              </a:ext>
+            </a:extLst>
+          </p:cNvPr>
+          <p:cNvPicPr>
+            <a:picLocks noChangeAspect="1"/>
+          </p:cNvPicPr>
+          <p:nvPr/>
+        </p:nvPicPr>
+        <p:blipFill>
+          <a:blip r:embed="rId2"/>
+          <a:srcRect/>
+          <a:stretch/>
+        </p:blipFill>
+        <p:spPr>
+          <a:xfrm rot="19467465">
+            <a:off x="397888" y="889174"/>
+            <a:ext cx="1351619" cy="1802158"/>
+          </a:xfrm>
+          <a:prstGeom prst="rect">
+            <a:avLst/>
+          </a:prstGeom>
+        </p:spPr>
+      </p:pic>
+      <p:pic>
+        <p:nvPicPr>
+          <p:cNvPr id="21" name="Imagem 20">
+            <a:extLst>
+              <a:ext uri="{FF2B5EF4-FFF2-40B4-BE49-F238E27FC236}">
+                <a16:creationId xmlns:a16="http://schemas.microsoft.com/office/drawing/2014/main" id="{78D0476C-4A85-407D-2740-65AAF135D1EF}"/>
+              </a:ext>
+            </a:extLst>
+          </p:cNvPr>
+          <p:cNvPicPr>
+            <a:picLocks noChangeAspect="1"/>
+          </p:cNvPicPr>
+          <p:nvPr/>
+        </p:nvPicPr>
+        <p:blipFill>
+          <a:blip r:embed="rId3"/>
+          <a:srcRect/>
+          <a:stretch/>
+        </p:blipFill>
+        <p:spPr>
+          <a:xfrm rot="20403967">
+            <a:off x="1032706" y="516770"/>
+            <a:ext cx="1351619" cy="1802158"/>
+          </a:xfrm>
+          <a:prstGeom prst="rect">
+            <a:avLst/>
+          </a:prstGeom>
+        </p:spPr>
+      </p:pic>
+      <p:sp>
+        <p:nvSpPr>
+          <p:cNvPr id="12" name="Subtítulo 2">
+            <a:extLst>
+              <a:ext uri="{FF2B5EF4-FFF2-40B4-BE49-F238E27FC236}">
+                <a16:creationId xmlns:a16="http://schemas.microsoft.com/office/drawing/2014/main" id="{0E491797-3569-B422-196A-EE7DC2064EA7}"/>
+              </a:ext>
+            </a:extLst>
+          </p:cNvPr>
+          <p:cNvSpPr>
+            <a:spLocks noGrp="1"/>
+          </p:cNvSpPr>
+          <p:nvPr>
+            <p:ph type="subTitle" idx="2"/>
+          </p:nvPr>
+        </p:nvSpPr>
+        <p:spPr>
+          <a:xfrm>
+            <a:off x="4647627" y="3473545"/>
+            <a:ext cx="4214490" cy="990600"/>
+          </a:xfrm>
+        </p:spPr>
+        <p:txBody>
+          <a:bodyPr/>
+          <a:lstStyle/>
+          <a:p>
+            <a:pPr algn="l">
+              <a:spcAft>
+                <a:spcPts val="600"/>
+              </a:spcAft>
+            </a:pPr>
+            <a:r>
+              <a:rPr lang="en-US" dirty="0"/>
+              <a:t>Choose a path</a:t>
+            </a:r>
+          </a:p>
+          <a:p>
+            <a:pPr algn="l">
+              <a:spcAft>
+                <a:spcPts val="600"/>
+              </a:spcAft>
+            </a:pPr>
+            <a:r>
+              <a:rPr lang="en-US" dirty="0"/>
+              <a:t>Turn-based with a set </a:t>
+            </a:r>
+            <a:r>
+              <a:rPr lang="en-US" u="sng" dirty="0"/>
+              <a:t>energy limit </a:t>
+            </a:r>
+          </a:p>
+          <a:p>
+            <a:pPr algn="l">
+              <a:spcAft>
+                <a:spcPts val="600"/>
+              </a:spcAft>
+            </a:pPr>
+            <a:r>
+              <a:rPr lang="en-US" dirty="0"/>
+              <a:t>Use </a:t>
+            </a:r>
+            <a:r>
+              <a:rPr lang="en-US" u="sng" dirty="0"/>
+              <a:t>cards to attack</a:t>
+            </a:r>
+            <a:r>
+              <a:rPr lang="en-US" dirty="0"/>
+              <a:t> and defeat enemies</a:t>
+            </a:r>
+          </a:p>
+          <a:p>
+            <a:pPr algn="l">
+              <a:spcAft>
+                <a:spcPts val="600"/>
+              </a:spcAft>
+            </a:pPr>
+            <a:r>
+              <a:rPr lang="en-US" dirty="0"/>
+              <a:t>Acquire upgrades that help in the next fights</a:t>
+            </a:r>
+          </a:p>
+          <a:p>
+            <a:pPr algn="l">
+              <a:spcAft>
+                <a:spcPts val="600"/>
+              </a:spcAft>
+            </a:pPr>
+            <a:r>
+              <a:rPr lang="en-US" dirty="0"/>
+              <a:t>Difficulty increases as player progresses</a:t>
+            </a:r>
+          </a:p>
+        </p:txBody>
+      </p:sp>
+      <p:sp>
+        <p:nvSpPr>
+          <p:cNvPr id="13" name="Título 3">
+            <a:extLst>
+              <a:ext uri="{FF2B5EF4-FFF2-40B4-BE49-F238E27FC236}">
+                <a16:creationId xmlns:a16="http://schemas.microsoft.com/office/drawing/2014/main" id="{7017069C-9D02-6193-568C-71117ABC1C6B}"/>
+              </a:ext>
+            </a:extLst>
+          </p:cNvPr>
+          <p:cNvSpPr>
+            <a:spLocks noGrp="1"/>
+          </p:cNvSpPr>
+          <p:nvPr>
+            <p:ph type="title"/>
+          </p:nvPr>
+        </p:nvSpPr>
+        <p:spPr>
+          <a:xfrm>
+            <a:off x="4970761" y="2759650"/>
+            <a:ext cx="3568223" cy="528600"/>
+          </a:xfrm>
+        </p:spPr>
+        <p:txBody>
+          <a:bodyPr/>
+          <a:lstStyle/>
+          <a:p>
+            <a:r>
+              <a:rPr lang="pt-PT" dirty="0"/>
+              <a:t>Core </a:t>
+            </a:r>
+            <a:r>
+              <a:rPr lang="en-US" dirty="0"/>
+              <a:t>gameplay</a:t>
+            </a:r>
+          </a:p>
+        </p:txBody>
+      </p:sp>
+      <p:sp>
+        <p:nvSpPr>
+          <p:cNvPr id="14" name="Google Shape;531;p73">
+            <a:extLst>
+              <a:ext uri="{FF2B5EF4-FFF2-40B4-BE49-F238E27FC236}">
+                <a16:creationId xmlns:a16="http://schemas.microsoft.com/office/drawing/2014/main" id="{9828323C-6E31-8BBA-52FE-751DA28C403F}"/>
+              </a:ext>
+            </a:extLst>
+          </p:cNvPr>
+          <p:cNvSpPr txBox="1">
+            <a:spLocks/>
+          </p:cNvSpPr>
+          <p:nvPr/>
+        </p:nvSpPr>
+        <p:spPr>
+          <a:xfrm>
+            <a:off x="8427719" y="4710914"/>
+            <a:ext cx="716281" cy="432586"/>
+          </a:xfrm>
+          <a:prstGeom prst="rect">
+            <a:avLst/>
+          </a:prstGeom>
+          <a:noFill/>
+          <a:ln>
+            <a:noFill/>
+          </a:ln>
+        </p:spPr>
+        <p:txBody>
+          <a:bodyPr spcFirstLastPara="1" wrap="square" lIns="91425" tIns="91425" rIns="91425" bIns="91425" numCol="1" anchor="t" anchorCtr="0">
+            <a:noAutofit/>
+          </a:bodyPr>
+          <a:lstStyle>
+            <a:defPPr marR="0" lvl="0" algn="l" rtl="0">
+              <a:lnSpc>
+                <a:spcPct val="100000"/>
+              </a:lnSpc>
+              <a:spcBef>
+                <a:spcPts val="0"/>
+              </a:spcBef>
+              <a:spcAft>
+                <a:spcPts val="0"/>
+              </a:spcAft>
+            </a:defPPr>
+            <a:lvl1pPr marL="457200" marR="0" lvl="0" indent="-317500" algn="l" rtl="0">
+              <a:lnSpc>
+                <a:spcPct val="100000"/>
+              </a:lnSpc>
+              <a:spcBef>
+                <a:spcPts val="0"/>
+              </a:spcBef>
+              <a:spcAft>
+                <a:spcPts val="0"/>
+              </a:spcAft>
+              <a:buClr>
+                <a:schemeClr val="dk1"/>
+              </a:buClr>
+              <a:buSzPts val="1400"/>
+              <a:buFont typeface="Didact Gothic"/>
+              <a:buNone/>
+              <a:defRPr sz="1400" b="0" i="0" u="none" strike="noStrike" cap="none">
+                <a:solidFill>
+                  <a:schemeClr val="dk1"/>
+                </a:solidFill>
+                <a:latin typeface="Didact Gothic"/>
+                <a:ea typeface="Didact Gothic"/>
+                <a:cs typeface="Didact Gothic"/>
+                <a:sym typeface="Didact Gothic"/>
+              </a:defRPr>
+            </a:lvl1pPr>
+            <a:lvl2pPr marL="914400" marR="0" lvl="1" indent="-317500" algn="l" rtl="0">
+              <a:lnSpc>
+                <a:spcPct val="115000"/>
+              </a:lnSpc>
+              <a:spcBef>
+                <a:spcPts val="0"/>
+              </a:spcBef>
+              <a:spcAft>
+                <a:spcPts val="0"/>
+              </a:spcAft>
+              <a:buClr>
+                <a:schemeClr val="dk1"/>
+              </a:buClr>
+              <a:buSzPts val="1400"/>
+              <a:buFont typeface="Didact Gothic"/>
+              <a:buNone/>
+              <a:defRPr sz="1400" b="0" i="0" u="none" strike="noStrike" cap="none">
+                <a:solidFill>
+                  <a:schemeClr val="dk1"/>
+                </a:solidFill>
+                <a:latin typeface="Didact Gothic"/>
+                <a:ea typeface="Didact Gothic"/>
+                <a:cs typeface="Didact Gothic"/>
+                <a:sym typeface="Didact Gothic"/>
+              </a:defRPr>
+            </a:lvl2pPr>
+            <a:lvl3pPr marL="1371600" marR="0" lvl="2" indent="-317500" algn="l" rtl="0">
+              <a:lnSpc>
+                <a:spcPct val="115000"/>
+              </a:lnSpc>
+              <a:spcBef>
+                <a:spcPts val="1600"/>
+              </a:spcBef>
+              <a:spcAft>
+                <a:spcPts val="0"/>
+              </a:spcAft>
+              <a:buClr>
+                <a:schemeClr val="dk1"/>
+              </a:buClr>
+              <a:buSzPts val="1400"/>
+              <a:buFont typeface="Didact Gothic"/>
+              <a:buNone/>
+              <a:defRPr sz="1400" b="0" i="0" u="none" strike="noStrike" cap="none">
+                <a:solidFill>
+                  <a:schemeClr val="dk1"/>
+                </a:solidFill>
+                <a:latin typeface="Didact Gothic"/>
+                <a:ea typeface="Didact Gothic"/>
+                <a:cs typeface="Didact Gothic"/>
+                <a:sym typeface="Didact Gothic"/>
+              </a:defRPr>
+            </a:lvl3pPr>
+            <a:lvl4pPr marL="1828800" marR="0" lvl="3" indent="-317500" algn="l" rtl="0">
+              <a:lnSpc>
+                <a:spcPct val="115000"/>
+              </a:lnSpc>
+              <a:spcBef>
+                <a:spcPts val="1600"/>
+              </a:spcBef>
+              <a:spcAft>
+                <a:spcPts val="0"/>
+              </a:spcAft>
+              <a:buClr>
+                <a:schemeClr val="dk1"/>
+              </a:buClr>
+              <a:buSzPts val="1400"/>
+              <a:buFont typeface="Didact Gothic"/>
+              <a:buNone/>
+              <a:defRPr sz="1400" b="0" i="0" u="none" strike="noStrike" cap="none">
+                <a:solidFill>
+                  <a:schemeClr val="dk1"/>
+                </a:solidFill>
+                <a:latin typeface="Didact Gothic"/>
+                <a:ea typeface="Didact Gothic"/>
+                <a:cs typeface="Didact Gothic"/>
+                <a:sym typeface="Didact Gothic"/>
+              </a:defRPr>
+            </a:lvl4pPr>
+            <a:lvl5pPr marL="2286000" marR="0" lvl="4" indent="-317500" algn="l" rtl="0">
+              <a:lnSpc>
+                <a:spcPct val="115000"/>
+              </a:lnSpc>
+              <a:spcBef>
+                <a:spcPts val="1600"/>
+              </a:spcBef>
+              <a:spcAft>
+                <a:spcPts val="0"/>
+              </a:spcAft>
+              <a:buClr>
+                <a:schemeClr val="dk1"/>
+              </a:buClr>
+              <a:buSzPts val="1400"/>
+              <a:buFont typeface="Didact Gothic"/>
+              <a:buNone/>
+              <a:defRPr sz="1400" b="0" i="0" u="none" strike="noStrike" cap="none">
+                <a:solidFill>
+                  <a:schemeClr val="dk1"/>
+                </a:solidFill>
+                <a:latin typeface="Didact Gothic"/>
+                <a:ea typeface="Didact Gothic"/>
+                <a:cs typeface="Didact Gothic"/>
+                <a:sym typeface="Didact Gothic"/>
+              </a:defRPr>
+            </a:lvl5pPr>
+            <a:lvl6pPr marL="2743200" marR="0" lvl="5" indent="-317500" algn="l" rtl="0">
+              <a:lnSpc>
+                <a:spcPct val="115000"/>
+              </a:lnSpc>
+              <a:spcBef>
+                <a:spcPts val="1600"/>
+              </a:spcBef>
+              <a:spcAft>
+                <a:spcPts val="0"/>
+              </a:spcAft>
+              <a:buClr>
+                <a:schemeClr val="dk1"/>
+              </a:buClr>
+              <a:buSzPts val="1400"/>
+              <a:buFont typeface="Didact Gothic"/>
+              <a:buNone/>
+              <a:defRPr sz="1400" b="0" i="0" u="none" strike="noStrike" cap="none">
+                <a:solidFill>
+                  <a:schemeClr val="dk1"/>
+                </a:solidFill>
+                <a:latin typeface="Didact Gothic"/>
+                <a:ea typeface="Didact Gothic"/>
+                <a:cs typeface="Didact Gothic"/>
+                <a:sym typeface="Didact Gothic"/>
+              </a:defRPr>
+            </a:lvl6pPr>
+            <a:lvl7pPr marL="3200400" marR="0" lvl="6" indent="-317500" algn="l" rtl="0">
+              <a:lnSpc>
+                <a:spcPct val="115000"/>
+              </a:lnSpc>
+              <a:spcBef>
+                <a:spcPts val="1600"/>
+              </a:spcBef>
+              <a:spcAft>
+                <a:spcPts val="0"/>
+              </a:spcAft>
+              <a:buClr>
+                <a:schemeClr val="dk1"/>
+              </a:buClr>
+              <a:buSzPts val="1400"/>
+              <a:buFont typeface="Didact Gothic"/>
+              <a:buNone/>
+              <a:defRPr sz="1400" b="0" i="0" u="none" strike="noStrike" cap="none">
+                <a:solidFill>
+                  <a:schemeClr val="dk1"/>
+                </a:solidFill>
+                <a:latin typeface="Didact Gothic"/>
+                <a:ea typeface="Didact Gothic"/>
+                <a:cs typeface="Didact Gothic"/>
+                <a:sym typeface="Didact Gothic"/>
+              </a:defRPr>
+            </a:lvl7pPr>
+            <a:lvl8pPr marL="3657600" marR="0" lvl="7" indent="-317500" algn="l" rtl="0">
+              <a:lnSpc>
+                <a:spcPct val="115000"/>
+              </a:lnSpc>
+              <a:spcBef>
+                <a:spcPts val="1600"/>
+              </a:spcBef>
+              <a:spcAft>
+                <a:spcPts val="0"/>
+              </a:spcAft>
+              <a:buClr>
+                <a:schemeClr val="dk1"/>
+              </a:buClr>
+              <a:buSzPts val="1400"/>
+              <a:buFont typeface="Didact Gothic"/>
+              <a:buNone/>
+              <a:defRPr sz="1400" b="0" i="0" u="none" strike="noStrike" cap="none">
+                <a:solidFill>
+                  <a:schemeClr val="dk1"/>
+                </a:solidFill>
+                <a:latin typeface="Didact Gothic"/>
+                <a:ea typeface="Didact Gothic"/>
+                <a:cs typeface="Didact Gothic"/>
+                <a:sym typeface="Didact Gothic"/>
+              </a:defRPr>
+            </a:lvl8pPr>
+            <a:lvl9pPr marL="4114800" marR="0" lvl="8" indent="-317500" algn="l" rtl="0">
+              <a:lnSpc>
+                <a:spcPct val="115000"/>
+              </a:lnSpc>
+              <a:spcBef>
+                <a:spcPts val="1600"/>
+              </a:spcBef>
+              <a:spcAft>
+                <a:spcPts val="1600"/>
+              </a:spcAft>
+              <a:buClr>
+                <a:schemeClr val="dk1"/>
+              </a:buClr>
+              <a:buSzPts val="1400"/>
+              <a:buFont typeface="Didact Gothic"/>
+              <a:buNone/>
+              <a:defRPr sz="1400" b="0" i="0" u="none" strike="noStrike" cap="none">
+                <a:solidFill>
+                  <a:schemeClr val="dk1"/>
+                </a:solidFill>
+                <a:latin typeface="Didact Gothic"/>
+                <a:ea typeface="Didact Gothic"/>
+                <a:cs typeface="Didact Gothic"/>
+                <a:sym typeface="Didact Gothic"/>
+              </a:defRPr>
+            </a:lvl9pPr>
+          </a:lstStyle>
+          <a:p>
+            <a:pPr marL="88900" indent="0"/>
+            <a:r>
+              <a:rPr lang="en" dirty="0"/>
+              <a:t>5/11</a:t>
+            </a:r>
+          </a:p>
+        </p:txBody>
+      </p:sp>
+      <p:pic>
+        <p:nvPicPr>
+          <p:cNvPr id="20" name="Imagem 19">
+            <a:extLst>
+              <a:ext uri="{FF2B5EF4-FFF2-40B4-BE49-F238E27FC236}">
+                <a16:creationId xmlns:a16="http://schemas.microsoft.com/office/drawing/2014/main" id="{E41551FA-A54E-F379-F930-6610A83DBF90}"/>
+              </a:ext>
+            </a:extLst>
+          </p:cNvPr>
+          <p:cNvPicPr>
+            <a:picLocks noChangeAspect="1"/>
+          </p:cNvPicPr>
+          <p:nvPr/>
+        </p:nvPicPr>
+        <p:blipFill>
+          <a:blip r:embed="rId4"/>
+          <a:srcRect/>
+          <a:stretch/>
+        </p:blipFill>
+        <p:spPr>
+          <a:xfrm>
+            <a:off x="1708516" y="376189"/>
+            <a:ext cx="1351619" cy="1802158"/>
+          </a:xfrm>
+          <a:prstGeom prst="rect">
+            <a:avLst/>
+          </a:prstGeom>
+        </p:spPr>
+      </p:pic>
+      <p:pic>
+        <p:nvPicPr>
+          <p:cNvPr id="22" name="Imagem 21">
+            <a:extLst>
+              <a:ext uri="{FF2B5EF4-FFF2-40B4-BE49-F238E27FC236}">
+                <a16:creationId xmlns:a16="http://schemas.microsoft.com/office/drawing/2014/main" id="{4EC56C6F-2824-BC07-C252-5B90370A911F}"/>
+              </a:ext>
+            </a:extLst>
+          </p:cNvPr>
+          <p:cNvPicPr>
+            <a:picLocks noChangeAspect="1"/>
+          </p:cNvPicPr>
+          <p:nvPr/>
+        </p:nvPicPr>
+        <p:blipFill>
+          <a:blip r:embed="rId5"/>
+          <a:srcRect/>
+          <a:stretch/>
+        </p:blipFill>
+        <p:spPr>
+          <a:xfrm rot="1303896">
+            <a:off x="2321226" y="417965"/>
+            <a:ext cx="1351619" cy="1802158"/>
+          </a:xfrm>
+          <a:prstGeom prst="rect">
+            <a:avLst/>
+          </a:prstGeom>
+        </p:spPr>
+      </p:pic>
+      <p:pic>
+        <p:nvPicPr>
+          <p:cNvPr id="24" name="Imagem 23">
+            <a:extLst>
+              <a:ext uri="{FF2B5EF4-FFF2-40B4-BE49-F238E27FC236}">
+                <a16:creationId xmlns:a16="http://schemas.microsoft.com/office/drawing/2014/main" id="{890A543F-3F0D-DC66-78A0-4BDA2BE83DB0}"/>
+              </a:ext>
+            </a:extLst>
+          </p:cNvPr>
+          <p:cNvPicPr>
+            <a:picLocks noChangeAspect="1"/>
+          </p:cNvPicPr>
+          <p:nvPr/>
+        </p:nvPicPr>
+        <p:blipFill>
+          <a:blip r:embed="rId6"/>
+          <a:srcRect/>
+          <a:stretch/>
+        </p:blipFill>
+        <p:spPr>
+          <a:xfrm rot="1965321">
+            <a:off x="3114732" y="735125"/>
+            <a:ext cx="1351619" cy="1802158"/>
+          </a:xfrm>
+          <a:prstGeom prst="rect">
+            <a:avLst/>
+          </a:prstGeom>
+        </p:spPr>
+      </p:pic>
+    </p:spTree>
+    <p:extLst>
+      <p:ext uri="{BB962C8B-B14F-4D97-AF65-F5344CB8AC3E}">
+        <p14:creationId xmlns:p14="http://schemas.microsoft.com/office/powerpoint/2010/main" val="1350965842"/>
+      </p:ext>
+    </p:extLst>
+  </p:cSld>
+  <p:clrMapOvr>
+    <a:masterClrMapping/>
+  </p:clrMapOvr>
+  <p:transition spd="med">
+    <p:fade/>
+  </p:transition>
+  <p:timing>
+    <p:tnLst>
+      <p:par>
+        <p:cTn id="1" dur="indefinite" restart="never" nodeType="tmRoot">
+          <p:childTnLst>
+            <p:seq concurrent="1" nextAc="seek">
+              <p:cTn id="2" dur="indefinite" nodeType="mainSeq">
+                <p:childTnLst>
+                  <p:par>
+                    <p:cTn id="3" fill="hold">
+                      <p:stCondLst>
+                        <p:cond delay="indefinite"/>
+                        <p:cond evt="onBegin" delay="0">
+                          <p:tn val="2"/>
+                        </p:cond>
+                      </p:stCondLst>
+                      <p:childTnLst>
                         <p:par>
-                          <p:cTn id="15" fill="hold">
+                          <p:cTn id="4" fill="hold">
                             <p:stCondLst>
-                              <p:cond delay="750"/>
+                              <p:cond delay="0"/>
                             </p:stCondLst>
                             <p:childTnLst>
                               <p:par>
-                                <p:cTn id="16" presetID="42" presetClass="entr" presetSubtype="0" fill="hold" grpId="0" nodeType="afterEffect">
+                                <p:cTn id="5" presetID="42" presetClass="entr" presetSubtype="0" fill="hold" grpId="0" nodeType="afterEffect">
                                   <p:stCondLst>
                                     <p:cond delay="0"/>
                                   </p:stCondLst>
                                   <p:childTnLst>
                                     <p:set>
                                       <p:cBhvr>
-                                        <p:cTn id="17" dur="1" fill="hold">
+                                        <p:cTn id="6" dur="1" fill="hold">
                                           <p:stCondLst>
                                             <p:cond delay="0"/>
                                           </p:stCondLst>
                                         </p:cTn>
                                         <p:tgtEl>
-                                          <p:spTgt spid="4"/>
+                                          <p:spTgt spid="13"/>
                                         </p:tgtEl>
                                         <p:attrNameLst>
                                           <p:attrName>style.visibility</p:attrName>
@@ -22685,17 +23958,17 @@
                                     </p:set>
                                     <p:animEffect transition="in" filter="fade">
                                       <p:cBhvr>
-                                        <p:cTn id="18" dur="750"/>
+                                        <p:cTn id="7" dur="750"/>
                                         <p:tgtEl>
-                                          <p:spTgt spid="4"/>
+                                          <p:spTgt spid="13"/>
                                         </p:tgtEl>
                                       </p:cBhvr>
                                     </p:animEffect>
                                     <p:anim calcmode="lin" valueType="num">
                                       <p:cBhvr>
-                                        <p:cTn id="19" dur="750" fill="hold"/>
+                                        <p:cTn id="8" dur="750" fill="hold"/>
                                         <p:tgtEl>
-                                          <p:spTgt spid="4"/>
+                                          <p:spTgt spid="13"/>
                                         </p:tgtEl>
                                         <p:attrNameLst>
                                           <p:attrName>ppt_x</p:attrName>
@@ -22716,9 +23989,9 @@
                                     </p:anim>
                                     <p:anim calcmode="lin" valueType="num">
                                       <p:cBhvr>
-                                        <p:cTn id="20" dur="750" fill="hold"/>
+                                        <p:cTn id="9" dur="750" fill="hold"/>
                                         <p:tgtEl>
-                                          <p:spTgt spid="4"/>
+                                          <p:spTgt spid="13"/>
                                         </p:tgtEl>
                                         <p:attrNameLst>
                                           <p:attrName>ppt_y</p:attrName>
@@ -22741,20 +24014,20 @@
                                 </p:cTn>
                               </p:par>
                               <p:par>
-                                <p:cTn id="21" presetID="42" presetClass="entr" presetSubtype="0" fill="hold" grpId="0" nodeType="withEffect">
+                                <p:cTn id="10" presetID="42" presetClass="entr" presetSubtype="0" fill="hold" grpId="0" nodeType="withEffect">
                                   <p:stCondLst>
                                     <p:cond delay="0"/>
                                   </p:stCondLst>
                                   <p:childTnLst>
                                     <p:set>
                                       <p:cBhvr>
-                                        <p:cTn id="22" dur="1" fill="hold">
+                                        <p:cTn id="11" dur="1" fill="hold">
                                           <p:stCondLst>
                                             <p:cond delay="0"/>
                                           </p:stCondLst>
                                         </p:cTn>
                                         <p:tgtEl>
-                                          <p:spTgt spid="3"/>
+                                          <p:spTgt spid="12"/>
                                         </p:tgtEl>
                                         <p:attrNameLst>
                                           <p:attrName>style.visibility</p:attrName>
@@ -22766,17 +24039,17 @@
                                     </p:set>
                                     <p:animEffect transition="in" filter="fade">
                                       <p:cBhvr>
-                                        <p:cTn id="23" dur="750"/>
+                                        <p:cTn id="12" dur="750"/>
                                         <p:tgtEl>
-                                          <p:spTgt spid="3"/>
+                                          <p:spTgt spid="12"/>
                                         </p:tgtEl>
                                       </p:cBhvr>
                                     </p:animEffect>
                                     <p:anim calcmode="lin" valueType="num">
                                       <p:cBhvr>
-                                        <p:cTn id="24" dur="750" fill="hold"/>
+                                        <p:cTn id="13" dur="750" fill="hold"/>
                                         <p:tgtEl>
-                                          <p:spTgt spid="3"/>
+                                          <p:spTgt spid="12"/>
                                         </p:tgtEl>
                                         <p:attrNameLst>
                                           <p:attrName>ppt_x</p:attrName>
@@ -22797,9 +24070,9 @@
                                     </p:anim>
                                     <p:anim calcmode="lin" valueType="num">
                                       <p:cBhvr>
-                                        <p:cTn id="25" dur="750" fill="hold"/>
+                                        <p:cTn id="14" dur="750" fill="hold"/>
                                         <p:tgtEl>
-                                          <p:spTgt spid="3"/>
+                                          <p:spTgt spid="12"/>
                                         </p:tgtEl>
                                         <p:attrNameLst>
                                           <p:attrName>ppt_y</p:attrName>
@@ -22849,16 +24122,14 @@
       </p:par>
     </p:tnLst>
     <p:bldLst>
-      <p:bldP spid="2" grpId="0"/>
-      <p:bldP spid="3" grpId="0"/>
-      <p:bldP spid="4" grpId="0"/>
-      <p:bldP spid="5" grpId="0"/>
+      <p:bldP spid="12" grpId="0"/>
+      <p:bldP spid="13" grpId="0"/>
     </p:bldLst>
   </p:timing>
 </p:sld>
 </file>
 
-<file path=ppt/slides/slide5.xml><?xml version="1.0" encoding="utf-8"?>
+<file path=ppt/slides/slide6.xml><?xml version="1.0" encoding="utf-8"?>
 <p:sld xmlns:a="http://schemas.openxmlformats.org/drawingml/2006/main" xmlns:r="http://schemas.openxmlformats.org/officeDocument/2006/relationships" xmlns:p="http://schemas.openxmlformats.org/presentationml/2006/main">
   <p:cSld>
     <p:spTree>
@@ -25099,7 +26370,7 @@
                   <a:schemeClr val="bg1"/>
                 </a:solidFill>
               </a:rPr>
-              <a:t>5/8</a:t>
+              <a:t>6/11</a:t>
             </a:r>
           </a:p>
         </p:txBody>
@@ -25546,7 +26817,7 @@
 </p:sld>
 </file>
 
-<file path=ppt/slides/slide6.xml><?xml version="1.0" encoding="utf-8"?>
+<file path=ppt/slides/slide7.xml><?xml version="1.0" encoding="utf-8"?>
 <p:sld xmlns:a="http://schemas.openxmlformats.org/drawingml/2006/main" xmlns:r="http://schemas.openxmlformats.org/officeDocument/2006/relationships" xmlns:p="http://schemas.openxmlformats.org/presentationml/2006/main">
   <p:cSld>
     <p:spTree>
@@ -27415,7 +28686,7 @@
             <a:pPr marL="88900" indent="0"/>
             <a:r>
               <a:rPr lang="en" dirty="0"/>
-              <a:t>6/8</a:t>
+              <a:t>7/11</a:t>
             </a:r>
           </a:p>
         </p:txBody>
@@ -27706,7 +28977,7 @@
 </p:sld>
 </file>
 
-<file path=ppt/slides/slide7.xml><?xml version="1.0" encoding="utf-8"?>
+<file path=ppt/slides/slide8.xml><?xml version="1.0" encoding="utf-8"?>
 <p:sld xmlns:a="http://schemas.openxmlformats.org/drawingml/2006/main" xmlns:r="http://schemas.openxmlformats.org/officeDocument/2006/relationships" xmlns:p="http://schemas.openxmlformats.org/presentationml/2006/main">
   <p:cSld>
     <p:spTree>
@@ -28039,7 +29310,7 @@
             <a:pPr marL="88900" indent="0"/>
             <a:r>
               <a:rPr lang="en" dirty="0"/>
-              <a:t>7/8</a:t>
+              <a:t>8/11</a:t>
             </a:r>
           </a:p>
         </p:txBody>
@@ -28055,7 +29326,7 @@
 </p:sld>
 </file>
 
-<file path=ppt/slides/slide8.xml><?xml version="1.0" encoding="utf-8"?>
+<file path=ppt/slides/slide9.xml><?xml version="1.0" encoding="utf-8"?>
 <p:sld xmlns:a="http://schemas.openxmlformats.org/drawingml/2006/main" xmlns:r="http://schemas.openxmlformats.org/officeDocument/2006/relationships" xmlns:p="http://schemas.openxmlformats.org/presentationml/2006/main">
   <p:cSld>
     <p:spTree>
@@ -28433,454 +29704,297 @@
           </a:graphicData>
         </a:graphic>
       </p:graphicFrame>
+      <p:sp>
+        <p:nvSpPr>
+          <p:cNvPr id="3" name="Google Shape;531;p73">
+            <a:extLst>
+              <a:ext uri="{FF2B5EF4-FFF2-40B4-BE49-F238E27FC236}">
+                <a16:creationId xmlns:a16="http://schemas.microsoft.com/office/drawing/2014/main" id="{E304DDC4-BF6D-5FDB-1CDA-BFF69B6716EF}"/>
+              </a:ext>
+            </a:extLst>
+          </p:cNvPr>
+          <p:cNvSpPr txBox="1">
+            <a:spLocks/>
+          </p:cNvSpPr>
+          <p:nvPr/>
+        </p:nvSpPr>
+        <p:spPr>
+          <a:xfrm>
+            <a:off x="8427719" y="4710914"/>
+            <a:ext cx="716281" cy="432586"/>
+          </a:xfrm>
+          <a:prstGeom prst="rect">
+            <a:avLst/>
+          </a:prstGeom>
+          <a:noFill/>
+          <a:ln>
+            <a:noFill/>
+          </a:ln>
+        </p:spPr>
+        <p:txBody>
+          <a:bodyPr spcFirstLastPara="1" wrap="square" lIns="91425" tIns="91425" rIns="91425" bIns="91425" numCol="1" anchor="t" anchorCtr="0">
+            <a:noAutofit/>
+          </a:bodyPr>
+          <a:lstStyle>
+            <a:defPPr marR="0" lvl="0" algn="l" rtl="0">
+              <a:lnSpc>
+                <a:spcPct val="100000"/>
+              </a:lnSpc>
+              <a:spcBef>
+                <a:spcPts val="0"/>
+              </a:spcBef>
+              <a:spcAft>
+                <a:spcPts val="0"/>
+              </a:spcAft>
+            </a:defPPr>
+            <a:lvl1pPr marL="457200" marR="0" lvl="0" indent="-317500" algn="l" rtl="0">
+              <a:lnSpc>
+                <a:spcPct val="100000"/>
+              </a:lnSpc>
+              <a:spcBef>
+                <a:spcPts val="0"/>
+              </a:spcBef>
+              <a:spcAft>
+                <a:spcPts val="0"/>
+              </a:spcAft>
+              <a:buClr>
+                <a:schemeClr val="dk1"/>
+              </a:buClr>
+              <a:buSzPts val="1400"/>
+              <a:buFont typeface="Didact Gothic"/>
+              <a:buNone/>
+              <a:defRPr sz="1400" b="0" i="0" u="none" strike="noStrike" cap="none">
+                <a:solidFill>
+                  <a:schemeClr val="dk1"/>
+                </a:solidFill>
+                <a:latin typeface="Didact Gothic"/>
+                <a:ea typeface="Didact Gothic"/>
+                <a:cs typeface="Didact Gothic"/>
+                <a:sym typeface="Didact Gothic"/>
+              </a:defRPr>
+            </a:lvl1pPr>
+            <a:lvl2pPr marL="914400" marR="0" lvl="1" indent="-317500" algn="l" rtl="0">
+              <a:lnSpc>
+                <a:spcPct val="115000"/>
+              </a:lnSpc>
+              <a:spcBef>
+                <a:spcPts val="0"/>
+              </a:spcBef>
+              <a:spcAft>
+                <a:spcPts val="0"/>
+              </a:spcAft>
+              <a:buClr>
+                <a:schemeClr val="dk1"/>
+              </a:buClr>
+              <a:buSzPts val="1400"/>
+              <a:buFont typeface="Didact Gothic"/>
+              <a:buNone/>
+              <a:defRPr sz="1400" b="0" i="0" u="none" strike="noStrike" cap="none">
+                <a:solidFill>
+                  <a:schemeClr val="dk1"/>
+                </a:solidFill>
+                <a:latin typeface="Didact Gothic"/>
+                <a:ea typeface="Didact Gothic"/>
+                <a:cs typeface="Didact Gothic"/>
+                <a:sym typeface="Didact Gothic"/>
+              </a:defRPr>
+            </a:lvl2pPr>
+            <a:lvl3pPr marL="1371600" marR="0" lvl="2" indent="-317500" algn="l" rtl="0">
+              <a:lnSpc>
+                <a:spcPct val="115000"/>
+              </a:lnSpc>
+              <a:spcBef>
+                <a:spcPts val="1600"/>
+              </a:spcBef>
+              <a:spcAft>
+                <a:spcPts val="0"/>
+              </a:spcAft>
+              <a:buClr>
+                <a:schemeClr val="dk1"/>
+              </a:buClr>
+              <a:buSzPts val="1400"/>
+              <a:buFont typeface="Didact Gothic"/>
+              <a:buNone/>
+              <a:defRPr sz="1400" b="0" i="0" u="none" strike="noStrike" cap="none">
+                <a:solidFill>
+                  <a:schemeClr val="dk1"/>
+                </a:solidFill>
+                <a:latin typeface="Didact Gothic"/>
+                <a:ea typeface="Didact Gothic"/>
+                <a:cs typeface="Didact Gothic"/>
+                <a:sym typeface="Didact Gothic"/>
+              </a:defRPr>
+            </a:lvl3pPr>
+            <a:lvl4pPr marL="1828800" marR="0" lvl="3" indent="-317500" algn="l" rtl="0">
+              <a:lnSpc>
+                <a:spcPct val="115000"/>
+              </a:lnSpc>
+              <a:spcBef>
+                <a:spcPts val="1600"/>
+              </a:spcBef>
+              <a:spcAft>
+                <a:spcPts val="0"/>
+              </a:spcAft>
+              <a:buClr>
+                <a:schemeClr val="dk1"/>
+              </a:buClr>
+              <a:buSzPts val="1400"/>
+              <a:buFont typeface="Didact Gothic"/>
+              <a:buNone/>
+              <a:defRPr sz="1400" b="0" i="0" u="none" strike="noStrike" cap="none">
+                <a:solidFill>
+                  <a:schemeClr val="dk1"/>
+                </a:solidFill>
+                <a:latin typeface="Didact Gothic"/>
+                <a:ea typeface="Didact Gothic"/>
+                <a:cs typeface="Didact Gothic"/>
+                <a:sym typeface="Didact Gothic"/>
+              </a:defRPr>
+            </a:lvl4pPr>
+            <a:lvl5pPr marL="2286000" marR="0" lvl="4" indent="-317500" algn="l" rtl="0">
+              <a:lnSpc>
+                <a:spcPct val="115000"/>
+              </a:lnSpc>
+              <a:spcBef>
+                <a:spcPts val="1600"/>
+              </a:spcBef>
+              <a:spcAft>
+                <a:spcPts val="0"/>
+              </a:spcAft>
+              <a:buClr>
+                <a:schemeClr val="dk1"/>
+              </a:buClr>
+              <a:buSzPts val="1400"/>
+              <a:buFont typeface="Didact Gothic"/>
+              <a:buNone/>
+              <a:defRPr sz="1400" b="0" i="0" u="none" strike="noStrike" cap="none">
+                <a:solidFill>
+                  <a:schemeClr val="dk1"/>
+                </a:solidFill>
+                <a:latin typeface="Didact Gothic"/>
+                <a:ea typeface="Didact Gothic"/>
+                <a:cs typeface="Didact Gothic"/>
+                <a:sym typeface="Didact Gothic"/>
+              </a:defRPr>
+            </a:lvl5pPr>
+            <a:lvl6pPr marL="2743200" marR="0" lvl="5" indent="-317500" algn="l" rtl="0">
+              <a:lnSpc>
+                <a:spcPct val="115000"/>
+              </a:lnSpc>
+              <a:spcBef>
+                <a:spcPts val="1600"/>
+              </a:spcBef>
+              <a:spcAft>
+                <a:spcPts val="0"/>
+              </a:spcAft>
+              <a:buClr>
+                <a:schemeClr val="dk1"/>
+              </a:buClr>
+              <a:buSzPts val="1400"/>
+              <a:buFont typeface="Didact Gothic"/>
+              <a:buNone/>
+              <a:defRPr sz="1400" b="0" i="0" u="none" strike="noStrike" cap="none">
+                <a:solidFill>
+                  <a:schemeClr val="dk1"/>
+                </a:solidFill>
+                <a:latin typeface="Didact Gothic"/>
+                <a:ea typeface="Didact Gothic"/>
+                <a:cs typeface="Didact Gothic"/>
+                <a:sym typeface="Didact Gothic"/>
+              </a:defRPr>
+            </a:lvl6pPr>
+            <a:lvl7pPr marL="3200400" marR="0" lvl="6" indent="-317500" algn="l" rtl="0">
+              <a:lnSpc>
+                <a:spcPct val="115000"/>
+              </a:lnSpc>
+              <a:spcBef>
+                <a:spcPts val="1600"/>
+              </a:spcBef>
+              <a:spcAft>
+                <a:spcPts val="0"/>
+              </a:spcAft>
+              <a:buClr>
+                <a:schemeClr val="dk1"/>
+              </a:buClr>
+              <a:buSzPts val="1400"/>
+              <a:buFont typeface="Didact Gothic"/>
+              <a:buNone/>
+              <a:defRPr sz="1400" b="0" i="0" u="none" strike="noStrike" cap="none">
+                <a:solidFill>
+                  <a:schemeClr val="dk1"/>
+                </a:solidFill>
+                <a:latin typeface="Didact Gothic"/>
+                <a:ea typeface="Didact Gothic"/>
+                <a:cs typeface="Didact Gothic"/>
+                <a:sym typeface="Didact Gothic"/>
+              </a:defRPr>
+            </a:lvl7pPr>
+            <a:lvl8pPr marL="3657600" marR="0" lvl="7" indent="-317500" algn="l" rtl="0">
+              <a:lnSpc>
+                <a:spcPct val="115000"/>
+              </a:lnSpc>
+              <a:spcBef>
+                <a:spcPts val="1600"/>
+              </a:spcBef>
+              <a:spcAft>
+                <a:spcPts val="0"/>
+              </a:spcAft>
+              <a:buClr>
+                <a:schemeClr val="dk1"/>
+              </a:buClr>
+              <a:buSzPts val="1400"/>
+              <a:buFont typeface="Didact Gothic"/>
+              <a:buNone/>
+              <a:defRPr sz="1400" b="0" i="0" u="none" strike="noStrike" cap="none">
+                <a:solidFill>
+                  <a:schemeClr val="dk1"/>
+                </a:solidFill>
+                <a:latin typeface="Didact Gothic"/>
+                <a:ea typeface="Didact Gothic"/>
+                <a:cs typeface="Didact Gothic"/>
+                <a:sym typeface="Didact Gothic"/>
+              </a:defRPr>
+            </a:lvl8pPr>
+            <a:lvl9pPr marL="4114800" marR="0" lvl="8" indent="-317500" algn="l" rtl="0">
+              <a:lnSpc>
+                <a:spcPct val="115000"/>
+              </a:lnSpc>
+              <a:spcBef>
+                <a:spcPts val="1600"/>
+              </a:spcBef>
+              <a:spcAft>
+                <a:spcPts val="1600"/>
+              </a:spcAft>
+              <a:buClr>
+                <a:schemeClr val="dk1"/>
+              </a:buClr>
+              <a:buSzPts val="1400"/>
+              <a:buFont typeface="Didact Gothic"/>
+              <a:buNone/>
+              <a:defRPr sz="1400" b="0" i="0" u="none" strike="noStrike" cap="none">
+                <a:solidFill>
+                  <a:schemeClr val="dk1"/>
+                </a:solidFill>
+                <a:latin typeface="Didact Gothic"/>
+                <a:ea typeface="Didact Gothic"/>
+                <a:cs typeface="Didact Gothic"/>
+                <a:sym typeface="Didact Gothic"/>
+              </a:defRPr>
+            </a:lvl9pPr>
+          </a:lstStyle>
+          <a:p>
+            <a:pPr marL="88900" indent="0"/>
+            <a:r>
+              <a:rPr lang="en" dirty="0"/>
+              <a:t>9/11</a:t>
+            </a:r>
+          </a:p>
+        </p:txBody>
+      </p:sp>
     </p:spTree>
     <p:extLst>
       <p:ext uri="{BB962C8B-B14F-4D97-AF65-F5344CB8AC3E}">
         <p14:creationId xmlns:p14="http://schemas.microsoft.com/office/powerpoint/2010/main" val="2119097399"/>
-      </p:ext>
-    </p:extLst>
-  </p:cSld>
-  <p:clrMapOvr>
-    <a:masterClrMapping/>
-  </p:clrMapOvr>
-  <p:transition spd="med">
-    <p:fade/>
-  </p:transition>
-</p:sld>
-</file>
-
-<file path=ppt/slides/slide9.xml><?xml version="1.0" encoding="utf-8"?>
-<p:sld xmlns:a="http://schemas.openxmlformats.org/drawingml/2006/main" xmlns:r="http://schemas.openxmlformats.org/officeDocument/2006/relationships" xmlns:p="http://schemas.openxmlformats.org/presentationml/2006/main">
-  <p:cSld>
-    <p:spTree>
-      <p:nvGrpSpPr>
-        <p:cNvPr id="1" name=""/>
-        <p:cNvGrpSpPr/>
-        <p:nvPr/>
-      </p:nvGrpSpPr>
-      <p:grpSpPr>
-        <a:xfrm>
-          <a:off x="0" y="0"/>
-          <a:ext cx="0" cy="0"/>
-          <a:chOff x="0" y="0"/>
-          <a:chExt cx="0" cy="0"/>
-        </a:xfrm>
-      </p:grpSpPr>
-      <p:sp>
-        <p:nvSpPr>
-          <p:cNvPr id="2" name="Título 1">
-            <a:extLst>
-              <a:ext uri="{FF2B5EF4-FFF2-40B4-BE49-F238E27FC236}">
-                <a16:creationId xmlns:a16="http://schemas.microsoft.com/office/drawing/2014/main" id="{92576A9C-1C0E-96D5-9C40-CA6D25D5249D}"/>
-              </a:ext>
-            </a:extLst>
-          </p:cNvPr>
-          <p:cNvSpPr>
-            <a:spLocks noGrp="1"/>
-          </p:cNvSpPr>
-          <p:nvPr>
-            <p:ph type="title"/>
-          </p:nvPr>
-        </p:nvSpPr>
-        <p:spPr/>
-        <p:txBody>
-          <a:bodyPr/>
-          <a:lstStyle/>
-          <a:p>
-            <a:r>
-              <a:rPr lang="en-US" dirty="0"/>
-              <a:t>System Functions</a:t>
-            </a:r>
-            <a:br>
-              <a:rPr lang="en-US" dirty="0"/>
-            </a:br>
-            <a:endParaRPr lang="en-US" dirty="0"/>
-          </a:p>
-        </p:txBody>
-      </p:sp>
-      <p:graphicFrame>
-        <p:nvGraphicFramePr>
-          <p:cNvPr id="6" name="Tabela 6">
-            <a:extLst>
-              <a:ext uri="{FF2B5EF4-FFF2-40B4-BE49-F238E27FC236}">
-                <a16:creationId xmlns:a16="http://schemas.microsoft.com/office/drawing/2014/main" id="{6400C405-188F-CDF4-501D-26DDF4970508}"/>
-              </a:ext>
-            </a:extLst>
-          </p:cNvPr>
-          <p:cNvGraphicFramePr>
-            <a:graphicFrameLocks noGrp="1"/>
-          </p:cNvGraphicFramePr>
-          <p:nvPr>
-            <p:extLst>
-              <p:ext uri="{D42A27DB-BD31-4B8C-83A1-F6EECF244321}">
-                <p14:modId xmlns:p14="http://schemas.microsoft.com/office/powerpoint/2010/main" val="133918374"/>
-              </p:ext>
-            </p:extLst>
-          </p:nvPr>
-        </p:nvGraphicFramePr>
-        <p:xfrm>
-          <a:off x="251057" y="1378523"/>
-          <a:ext cx="8635236" cy="2595880"/>
-        </p:xfrm>
-        <a:graphic>
-          <a:graphicData uri="http://schemas.openxmlformats.org/drawingml/2006/table">
-            <a:tbl>
-              <a:tblPr firstRow="1" bandRow="1">
-                <a:tableStyleId>{21E4AEA4-8DFA-4A89-87EB-49C32662AFE0}</a:tableStyleId>
-              </a:tblPr>
-              <a:tblGrid>
-                <a:gridCol w="1199608">
-                  <a:extLst>
-                    <a:ext uri="{9D8B030D-6E8A-4147-A177-3AD203B41FA5}">
-                      <a16:colId xmlns:a16="http://schemas.microsoft.com/office/drawing/2014/main" val="418046561"/>
-                    </a:ext>
-                  </a:extLst>
-                </a:gridCol>
-                <a:gridCol w="4557216">
-                  <a:extLst>
-                    <a:ext uri="{9D8B030D-6E8A-4147-A177-3AD203B41FA5}">
-                      <a16:colId xmlns:a16="http://schemas.microsoft.com/office/drawing/2014/main" val="1552109539"/>
-                    </a:ext>
-                  </a:extLst>
-                </a:gridCol>
-                <a:gridCol w="2878412">
-                  <a:extLst>
-                    <a:ext uri="{9D8B030D-6E8A-4147-A177-3AD203B41FA5}">
-                      <a16:colId xmlns:a16="http://schemas.microsoft.com/office/drawing/2014/main" val="3561355658"/>
-                    </a:ext>
-                  </a:extLst>
-                </a:gridCol>
-              </a:tblGrid>
-              <a:tr h="370840">
-                <a:tc>
-                  <a:txBody>
-                    <a:bodyPr/>
-                    <a:lstStyle/>
-                    <a:p>
-                      <a:r>
-                        <a:rPr lang="en-US" sz="1200" dirty="0"/>
-                        <a:t>Requirements</a:t>
-                      </a:r>
-                    </a:p>
-                  </a:txBody>
-                  <a:tcPr/>
-                </a:tc>
-                <a:tc>
-                  <a:txBody>
-                    <a:bodyPr/>
-                    <a:lstStyle/>
-                    <a:p>
-                      <a:r>
-                        <a:rPr lang="en-US" sz="1200" dirty="0"/>
-                        <a:t>Function</a:t>
-                      </a:r>
-                    </a:p>
-                  </a:txBody>
-                  <a:tcPr/>
-                </a:tc>
-                <a:tc>
-                  <a:txBody>
-                    <a:bodyPr/>
-                    <a:lstStyle/>
-                    <a:p>
-                      <a:r>
-                        <a:rPr lang="en-US" sz="1200" dirty="0"/>
-                        <a:t>Category</a:t>
-                      </a:r>
-                    </a:p>
-                  </a:txBody>
-                  <a:tcPr/>
-                </a:tc>
-                <a:extLst>
-                  <a:ext uri="{0D108BD9-81ED-4DB2-BD59-A6C34878D82A}">
-                    <a16:rowId xmlns:a16="http://schemas.microsoft.com/office/drawing/2014/main" val="1002566362"/>
-                  </a:ext>
-                </a:extLst>
-              </a:tr>
-              <a:tr h="370840">
-                <a:tc>
-                  <a:txBody>
-                    <a:bodyPr/>
-                    <a:lstStyle/>
-                    <a:p>
-                      <a:r>
-                        <a:rPr lang="en-US" sz="1200" dirty="0"/>
-                        <a:t>R1</a:t>
-                      </a:r>
-                    </a:p>
-                  </a:txBody>
-                  <a:tcPr/>
-                </a:tc>
-                <a:tc>
-                  <a:txBody>
-                    <a:bodyPr/>
-                    <a:lstStyle/>
-                    <a:p>
-                      <a:r>
-                        <a:rPr lang="en-US" sz="1200" dirty="0"/>
-                        <a:t>The game must have a tutorial</a:t>
-                      </a:r>
-                    </a:p>
-                  </a:txBody>
-                  <a:tcPr/>
-                </a:tc>
-                <a:tc>
-                  <a:txBody>
-                    <a:bodyPr/>
-                    <a:lstStyle/>
-                    <a:p>
-                      <a:r>
-                        <a:rPr lang="en-US" sz="1200" dirty="0"/>
-                        <a:t>Visible</a:t>
-                      </a:r>
-                    </a:p>
-                  </a:txBody>
-                  <a:tcPr/>
-                </a:tc>
-                <a:extLst>
-                  <a:ext uri="{0D108BD9-81ED-4DB2-BD59-A6C34878D82A}">
-                    <a16:rowId xmlns:a16="http://schemas.microsoft.com/office/drawing/2014/main" val="746098265"/>
-                  </a:ext>
-                </a:extLst>
-              </a:tr>
-              <a:tr h="370840">
-                <a:tc>
-                  <a:txBody>
-                    <a:bodyPr/>
-                    <a:lstStyle/>
-                    <a:p>
-                      <a:r>
-                        <a:rPr lang="en-US" sz="1200" dirty="0"/>
-                        <a:t>R2</a:t>
-                      </a:r>
-                    </a:p>
-                  </a:txBody>
-                  <a:tcPr/>
-                </a:tc>
-                <a:tc>
-                  <a:txBody>
-                    <a:bodyPr/>
-                    <a:lstStyle/>
-                    <a:p>
-                      <a:r>
-                        <a:rPr lang="en-US" sz="1200" dirty="0"/>
-                        <a:t>The player must be able to control his actions</a:t>
-                      </a:r>
-                    </a:p>
-                  </a:txBody>
-                  <a:tcPr/>
-                </a:tc>
-                <a:tc>
-                  <a:txBody>
-                    <a:bodyPr/>
-                    <a:lstStyle/>
-                    <a:p>
-                      <a:r>
-                        <a:rPr lang="en-US" sz="1200" dirty="0"/>
-                        <a:t>Visible</a:t>
-                      </a:r>
-                    </a:p>
-                  </a:txBody>
-                  <a:tcPr/>
-                </a:tc>
-                <a:extLst>
-                  <a:ext uri="{0D108BD9-81ED-4DB2-BD59-A6C34878D82A}">
-                    <a16:rowId xmlns:a16="http://schemas.microsoft.com/office/drawing/2014/main" val="309980605"/>
-                  </a:ext>
-                </a:extLst>
-              </a:tr>
-              <a:tr h="370840">
-                <a:tc>
-                  <a:txBody>
-                    <a:bodyPr/>
-                    <a:lstStyle/>
-                    <a:p>
-                      <a:r>
-                        <a:rPr lang="en-US" sz="1200" dirty="0"/>
-                        <a:t>R3</a:t>
-                      </a:r>
-                    </a:p>
-                  </a:txBody>
-                  <a:tcPr/>
-                </a:tc>
-                <a:tc>
-                  <a:txBody>
-                    <a:bodyPr/>
-                    <a:lstStyle/>
-                    <a:p>
-                      <a:r>
-                        <a:rPr lang="en-US" sz="1200" dirty="0"/>
-                        <a:t>The player must be able to select the level he wants.</a:t>
-                      </a:r>
-                    </a:p>
-                  </a:txBody>
-                  <a:tcPr/>
-                </a:tc>
-                <a:tc>
-                  <a:txBody>
-                    <a:bodyPr/>
-                    <a:lstStyle/>
-                    <a:p>
-                      <a:r>
-                        <a:rPr lang="en-US" sz="1200" dirty="0"/>
-                        <a:t>Visible</a:t>
-                      </a:r>
-                    </a:p>
-                  </a:txBody>
-                  <a:tcPr/>
-                </a:tc>
-                <a:extLst>
-                  <a:ext uri="{0D108BD9-81ED-4DB2-BD59-A6C34878D82A}">
-                    <a16:rowId xmlns:a16="http://schemas.microsoft.com/office/drawing/2014/main" val="402637408"/>
-                  </a:ext>
-                </a:extLst>
-              </a:tr>
-              <a:tr h="370840">
-                <a:tc>
-                  <a:txBody>
-                    <a:bodyPr/>
-                    <a:lstStyle/>
-                    <a:p>
-                      <a:r>
-                        <a:rPr lang="en-US" sz="1200" dirty="0"/>
-                        <a:t>R4</a:t>
-                      </a:r>
-                    </a:p>
-                  </a:txBody>
-                  <a:tcPr/>
-                </a:tc>
-                <a:tc>
-                  <a:txBody>
-                    <a:bodyPr/>
-                    <a:lstStyle/>
-                    <a:p>
-                      <a:r>
-                        <a:rPr lang="en-US" sz="1200" dirty="0"/>
-                        <a:t>Loading visuals and data need to be quick</a:t>
-                      </a:r>
-                    </a:p>
-                  </a:txBody>
-                  <a:tcPr/>
-                </a:tc>
-                <a:tc>
-                  <a:txBody>
-                    <a:bodyPr/>
-                    <a:lstStyle/>
-                    <a:p>
-                      <a:r>
-                        <a:rPr lang="en-US" sz="1200" dirty="0"/>
-                        <a:t>Invisible</a:t>
-                      </a:r>
-                    </a:p>
-                  </a:txBody>
-                  <a:tcPr/>
-                </a:tc>
-                <a:extLst>
-                  <a:ext uri="{0D108BD9-81ED-4DB2-BD59-A6C34878D82A}">
-                    <a16:rowId xmlns:a16="http://schemas.microsoft.com/office/drawing/2014/main" val="3047824491"/>
-                  </a:ext>
-                </a:extLst>
-              </a:tr>
-              <a:tr h="370840">
-                <a:tc>
-                  <a:txBody>
-                    <a:bodyPr/>
-                    <a:lstStyle/>
-                    <a:p>
-                      <a:r>
-                        <a:rPr lang="en-US" sz="1200" dirty="0"/>
-                        <a:t>R5</a:t>
-                      </a:r>
-                    </a:p>
-                  </a:txBody>
-                  <a:tcPr/>
-                </a:tc>
-                <a:tc>
-                  <a:txBody>
-                    <a:bodyPr/>
-                    <a:lstStyle/>
-                    <a:p>
-                      <a:r>
-                        <a:rPr lang="en-US" sz="1200" dirty="0"/>
-                        <a:t>The game must have music and sound effects.</a:t>
-                      </a:r>
-                    </a:p>
-                  </a:txBody>
-                  <a:tcPr/>
-                </a:tc>
-                <a:tc>
-                  <a:txBody>
-                    <a:bodyPr/>
-                    <a:lstStyle/>
-                    <a:p>
-                      <a:r>
-                        <a:rPr lang="en-US" sz="1200" dirty="0"/>
-                        <a:t>Visible</a:t>
-                      </a:r>
-                    </a:p>
-                  </a:txBody>
-                  <a:tcPr/>
-                </a:tc>
-                <a:extLst>
-                  <a:ext uri="{0D108BD9-81ED-4DB2-BD59-A6C34878D82A}">
-                    <a16:rowId xmlns:a16="http://schemas.microsoft.com/office/drawing/2014/main" val="2085931372"/>
-                  </a:ext>
-                </a:extLst>
-              </a:tr>
-              <a:tr h="370840">
-                <a:tc>
-                  <a:txBody>
-                    <a:bodyPr/>
-                    <a:lstStyle/>
-                    <a:p>
-                      <a:r>
-                        <a:rPr lang="en-US" sz="1200" dirty="0"/>
-                        <a:t>R6</a:t>
-                      </a:r>
-                    </a:p>
-                  </a:txBody>
-                  <a:tcPr/>
-                </a:tc>
-                <a:tc>
-                  <a:txBody>
-                    <a:bodyPr/>
-                    <a:lstStyle/>
-                    <a:p>
-                      <a:r>
-                        <a:rPr lang="en-US" sz="1200" dirty="0"/>
-                        <a:t>The game must save the user’s data</a:t>
-                      </a:r>
-                    </a:p>
-                  </a:txBody>
-                  <a:tcPr/>
-                </a:tc>
-                <a:tc>
-                  <a:txBody>
-                    <a:bodyPr/>
-                    <a:lstStyle/>
-                    <a:p>
-                      <a:r>
-                        <a:rPr lang="en-US" sz="1200" dirty="0"/>
-                        <a:t>Invisible</a:t>
-                      </a:r>
-                    </a:p>
-                  </a:txBody>
-                  <a:tcPr/>
-                </a:tc>
-                <a:extLst>
-                  <a:ext uri="{0D108BD9-81ED-4DB2-BD59-A6C34878D82A}">
-                    <a16:rowId xmlns:a16="http://schemas.microsoft.com/office/drawing/2014/main" val="4138630267"/>
-                  </a:ext>
-                </a:extLst>
-              </a:tr>
-            </a:tbl>
-          </a:graphicData>
-        </a:graphic>
-      </p:graphicFrame>
-    </p:spTree>
-    <p:extLst>
-      <p:ext uri="{BB962C8B-B14F-4D97-AF65-F5344CB8AC3E}">
-        <p14:creationId xmlns:p14="http://schemas.microsoft.com/office/powerpoint/2010/main" val="1649728121"/>
       </p:ext>
     </p:extLst>
   </p:cSld>

</xml_diff>

<commit_message>
Sequence stages and ui upd
</commit_message>
<xml_diff>
--- a/ReportsAndOthers/Presentations/Presentation.pptx
+++ b/ReportsAndOthers/Presentations/Presentation.pptx
@@ -16,8 +16,8 @@
     <p:sldId id="295" r:id="rId7"/>
     <p:sldId id="322" r:id="rId8"/>
     <p:sldId id="267" r:id="rId9"/>
-    <p:sldId id="323" r:id="rId10"/>
-    <p:sldId id="324" r:id="rId11"/>
+    <p:sldId id="324" r:id="rId10"/>
+    <p:sldId id="326" r:id="rId11"/>
     <p:sldId id="315" r:id="rId12"/>
   </p:sldIdLst>
   <p:sldSz cx="9144000" cy="5143500" type="screen16x9"/>
@@ -17611,12 +17611,42 @@
           <a:chExt cx="0" cy="0"/>
         </a:xfrm>
       </p:grpSpPr>
+      <p:pic>
+        <p:nvPicPr>
+          <p:cNvPr id="6" name="Imagem 5" descr="Uma imagem com captura de ecrã&#10;&#10;Descrição gerada automaticamente">
+            <a:extLst>
+              <a:ext uri="{FF2B5EF4-FFF2-40B4-BE49-F238E27FC236}">
+                <a16:creationId xmlns:a16="http://schemas.microsoft.com/office/drawing/2014/main" id="{120BEA83-247C-7B15-0DC1-B20E84D1AF7B}"/>
+              </a:ext>
+            </a:extLst>
+          </p:cNvPr>
+          <p:cNvPicPr>
+            <a:picLocks noChangeAspect="1"/>
+          </p:cNvPicPr>
+          <p:nvPr/>
+        </p:nvPicPr>
+        <p:blipFill>
+          <a:blip r:embed="rId2"/>
+          <a:stretch>
+            <a:fillRect/>
+          </a:stretch>
+        </p:blipFill>
+        <p:spPr>
+          <a:xfrm>
+            <a:off x="1474954" y="1109789"/>
+            <a:ext cx="6194092" cy="3643584"/>
+          </a:xfrm>
+          <a:prstGeom prst="rect">
+            <a:avLst/>
+          </a:prstGeom>
+        </p:spPr>
+      </p:pic>
       <p:sp>
         <p:nvSpPr>
-          <p:cNvPr id="2" name="Título 1">
+          <p:cNvPr id="14" name="Título 13">
             <a:extLst>
               <a:ext uri="{FF2B5EF4-FFF2-40B4-BE49-F238E27FC236}">
-                <a16:creationId xmlns:a16="http://schemas.microsoft.com/office/drawing/2014/main" id="{92576A9C-1C0E-96D5-9C40-CA6D25D5249D}"/>
+                <a16:creationId xmlns:a16="http://schemas.microsoft.com/office/drawing/2014/main" id="{A3E7F3BB-5235-5B5B-0CEF-D18167B9A11B}"/>
               </a:ext>
             </a:extLst>
           </p:cNvPr>
@@ -17624,31 +17654,32 @@
             <a:spLocks noGrp="1"/>
           </p:cNvSpPr>
           <p:nvPr>
-            <p:ph type="title"/>
+            <p:ph type="title" idx="4294967295"/>
           </p:nvPr>
         </p:nvSpPr>
-        <p:spPr/>
+        <p:spPr>
+          <a:xfrm>
+            <a:off x="3306301" y="279268"/>
+            <a:ext cx="3416300" cy="528637"/>
+          </a:xfrm>
+        </p:spPr>
         <p:txBody>
           <a:bodyPr/>
           <a:lstStyle/>
           <a:p>
             <a:r>
               <a:rPr lang="en-US" dirty="0"/>
-              <a:t>System Functions</a:t>
+              <a:t>System Attributes</a:t>
             </a:r>
-            <a:br>
-              <a:rPr lang="en-US" dirty="0"/>
-            </a:br>
-            <a:endParaRPr lang="en-US" dirty="0"/>
           </a:p>
         </p:txBody>
       </p:sp>
       <p:graphicFrame>
         <p:nvGraphicFramePr>
-          <p:cNvPr id="6" name="Tabela 6">
+          <p:cNvPr id="2" name="Tabela 2">
             <a:extLst>
               <a:ext uri="{FF2B5EF4-FFF2-40B4-BE49-F238E27FC236}">
-                <a16:creationId xmlns:a16="http://schemas.microsoft.com/office/drawing/2014/main" id="{6400C405-188F-CDF4-501D-26DDF4970508}"/>
+                <a16:creationId xmlns:a16="http://schemas.microsoft.com/office/drawing/2014/main" id="{0DDED308-75E4-C364-CC32-352E38B2470A}"/>
               </a:ext>
             </a:extLst>
           </p:cNvPr>
@@ -17658,57 +17689,79 @@
           <p:nvPr>
             <p:extLst>
               <p:ext uri="{D42A27DB-BD31-4B8C-83A1-F6EECF244321}">
-                <p14:modId xmlns:p14="http://schemas.microsoft.com/office/powerpoint/2010/main" val="133918374"/>
+                <p14:modId xmlns:p14="http://schemas.microsoft.com/office/powerpoint/2010/main" val="573860417"/>
               </p:ext>
             </p:extLst>
           </p:nvPr>
         </p:nvGraphicFramePr>
         <p:xfrm>
-          <a:off x="251057" y="1378523"/>
-          <a:ext cx="8635236" cy="2595880"/>
+          <a:off x="2858037" y="1702411"/>
+          <a:ext cx="4158016" cy="2468880"/>
         </p:xfrm>
         <a:graphic>
           <a:graphicData uri="http://schemas.openxmlformats.org/drawingml/2006/table">
             <a:tbl>
               <a:tblPr firstRow="1" bandRow="1">
-                <a:tableStyleId>{21E4AEA4-8DFA-4A89-87EB-49C32662AFE0}</a:tableStyleId>
+                <a:tableStyleId>{00A15C55-8517-42AA-B614-E9B94910E393}</a:tableStyleId>
               </a:tblPr>
               <a:tblGrid>
-                <a:gridCol w="1199608">
+                <a:gridCol w="1237176">
                   <a:extLst>
                     <a:ext uri="{9D8B030D-6E8A-4147-A177-3AD203B41FA5}">
-                      <a16:colId xmlns:a16="http://schemas.microsoft.com/office/drawing/2014/main" val="418046561"/>
+                      <a16:colId xmlns:a16="http://schemas.microsoft.com/office/drawing/2014/main" val="1681547778"/>
                     </a:ext>
                   </a:extLst>
                 </a:gridCol>
-                <a:gridCol w="4557216">
+                <a:gridCol w="1792620">
                   <a:extLst>
                     <a:ext uri="{9D8B030D-6E8A-4147-A177-3AD203B41FA5}">
-                      <a16:colId xmlns:a16="http://schemas.microsoft.com/office/drawing/2014/main" val="1552109539"/>
+                      <a16:colId xmlns:a16="http://schemas.microsoft.com/office/drawing/2014/main" val="519148131"/>
                     </a:ext>
                   </a:extLst>
                 </a:gridCol>
-                <a:gridCol w="2878412">
+                <a:gridCol w="1128220">
                   <a:extLst>
                     <a:ext uri="{9D8B030D-6E8A-4147-A177-3AD203B41FA5}">
-                      <a16:colId xmlns:a16="http://schemas.microsoft.com/office/drawing/2014/main" val="3561355658"/>
+                      <a16:colId xmlns:a16="http://schemas.microsoft.com/office/drawing/2014/main" val="1040589824"/>
                     </a:ext>
                   </a:extLst>
                 </a:gridCol>
               </a:tblGrid>
-              <a:tr h="370840">
+              <a:tr h="292180">
                 <a:tc>
                   <a:txBody>
                     <a:bodyPr/>
                     <a:lstStyle/>
                     <a:p>
                       <a:r>
-                        <a:rPr lang="en-US" sz="1200" dirty="0"/>
-                        <a:t>Requirements</a:t>
+                        <a:rPr lang="en-US" dirty="0"/>
+                        <a:t>Attributes</a:t>
                       </a:r>
                     </a:p>
                   </a:txBody>
-                  <a:tcPr/>
+                  <a:tcPr anchor="ctr">
+                    <a:lnL w="19050" cap="flat" cmpd="sng" algn="ctr">
+                      <a:solidFill>
+                        <a:schemeClr val="bg1"/>
+                      </a:solidFill>
+                      <a:prstDash val="solid"/>
+                      <a:round/>
+                      <a:headEnd type="none" w="med" len="med"/>
+                      <a:tailEnd type="none" w="med" len="med"/>
+                    </a:lnL>
+                    <a:lnT w="19050" cap="flat" cmpd="sng" algn="ctr">
+                      <a:solidFill>
+                        <a:schemeClr val="bg1"/>
+                      </a:solidFill>
+                      <a:prstDash val="solid"/>
+                      <a:round/>
+                      <a:headEnd type="none" w="med" len="med"/>
+                      <a:tailEnd type="none" w="med" len="med"/>
+                    </a:lnT>
+                    <a:solidFill>
+                      <a:srgbClr val="62362F"/>
+                    </a:solidFill>
+                  </a:tcPr>
                 </a:tc>
                 <a:tc>
                   <a:txBody>
@@ -17716,12 +17769,34 @@
                     <a:lstStyle/>
                     <a:p>
                       <a:r>
-                        <a:rPr lang="en-US" sz="1200" dirty="0"/>
-                        <a:t>Function</a:t>
+                        <a:rPr lang="en-US" dirty="0"/>
+                        <a:t>Details / Restrictions (D / R)</a:t>
                       </a:r>
                     </a:p>
                   </a:txBody>
-                  <a:tcPr/>
+                  <a:tcPr>
+                    <a:lnT w="19050" cap="flat" cmpd="sng" algn="ctr">
+                      <a:solidFill>
+                        <a:schemeClr val="bg1"/>
+                      </a:solidFill>
+                      <a:prstDash val="solid"/>
+                      <a:round/>
+                      <a:headEnd type="none" w="med" len="med"/>
+                      <a:tailEnd type="none" w="med" len="med"/>
+                    </a:lnT>
+                    <a:lnB w="28575" cap="flat" cmpd="sng" algn="ctr">
+                      <a:solidFill>
+                        <a:schemeClr val="bg1"/>
+                      </a:solidFill>
+                      <a:prstDash val="solid"/>
+                      <a:round/>
+                      <a:headEnd type="none" w="med" len="med"/>
+                      <a:tailEnd type="none" w="med" len="med"/>
+                    </a:lnB>
+                    <a:solidFill>
+                      <a:srgbClr val="62362F"/>
+                    </a:solidFill>
+                  </a:tcPr>
                 </a:tc>
                 <a:tc>
                   <a:txBody>
@@ -17729,32 +17804,76 @@
                     <a:lstStyle/>
                     <a:p>
                       <a:r>
-                        <a:rPr lang="en-US" sz="1200" dirty="0"/>
-                        <a:t>Category</a:t>
+                        <a:rPr lang="en-US" dirty="0"/>
+                        <a:t>Categories</a:t>
                       </a:r>
                     </a:p>
                   </a:txBody>
-                  <a:tcPr/>
+                  <a:tcPr anchor="ctr">
+                    <a:lnR w="19050" cap="flat" cmpd="sng" algn="ctr">
+                      <a:solidFill>
+                        <a:schemeClr val="bg1"/>
+                      </a:solidFill>
+                      <a:prstDash val="solid"/>
+                      <a:round/>
+                      <a:headEnd type="none" w="med" len="med"/>
+                      <a:tailEnd type="none" w="med" len="med"/>
+                    </a:lnR>
+                    <a:lnT w="19050" cap="flat" cmpd="sng" algn="ctr">
+                      <a:solidFill>
+                        <a:schemeClr val="bg1"/>
+                      </a:solidFill>
+                      <a:prstDash val="solid"/>
+                      <a:round/>
+                      <a:headEnd type="none" w="med" len="med"/>
+                      <a:tailEnd type="none" w="med" len="med"/>
+                    </a:lnT>
+                    <a:lnB w="28575" cap="flat" cmpd="sng" algn="ctr">
+                      <a:solidFill>
+                        <a:schemeClr val="bg1"/>
+                      </a:solidFill>
+                      <a:prstDash val="solid"/>
+                      <a:round/>
+                      <a:headEnd type="none" w="med" len="med"/>
+                      <a:tailEnd type="none" w="med" len="med"/>
+                    </a:lnB>
+                    <a:solidFill>
+                      <a:srgbClr val="62362F"/>
+                    </a:solidFill>
+                  </a:tcPr>
                 </a:tc>
                 <a:extLst>
                   <a:ext uri="{0D108BD9-81ED-4DB2-BD59-A6C34878D82A}">
-                    <a16:rowId xmlns:a16="http://schemas.microsoft.com/office/drawing/2014/main" val="1002566362"/>
+                    <a16:rowId xmlns:a16="http://schemas.microsoft.com/office/drawing/2014/main" val="2027282949"/>
                   </a:ext>
                 </a:extLst>
               </a:tr>
-              <a:tr h="370840">
+              <a:tr h="292180">
                 <a:tc>
                   <a:txBody>
                     <a:bodyPr/>
                     <a:lstStyle/>
                     <a:p>
                       <a:r>
-                        <a:rPr lang="en-US" sz="1200" dirty="0"/>
-                        <a:t>R1</a:t>
+                        <a:rPr lang="en-US" dirty="0"/>
+                        <a:t>Platforms</a:t>
                       </a:r>
                     </a:p>
                   </a:txBody>
-                  <a:tcPr/>
+                  <a:tcPr anchor="ctr">
+                    <a:lnL w="19050" cap="flat" cmpd="sng" algn="ctr">
+                      <a:solidFill>
+                        <a:schemeClr val="bg1"/>
+                      </a:solidFill>
+                      <a:prstDash val="solid"/>
+                      <a:round/>
+                      <a:headEnd type="none" w="med" len="med"/>
+                      <a:tailEnd type="none" w="med" len="med"/>
+                    </a:lnL>
+                    <a:solidFill>
+                      <a:srgbClr val="EBBB43"/>
+                    </a:solidFill>
+                  </a:tcPr>
                 </a:tc>
                 <a:tc>
                   <a:txBody>
@@ -17762,12 +17881,25 @@
                     <a:lstStyle/>
                     <a:p>
                       <a:r>
-                        <a:rPr lang="en-US" sz="1200" dirty="0"/>
-                        <a:t>The game must have a tutorial</a:t>
+                        <a:rPr lang="en-US" dirty="0"/>
+                        <a:t>D – Unity, Mobile</a:t>
                       </a:r>
                     </a:p>
                   </a:txBody>
-                  <a:tcPr/>
+                  <a:tcPr>
+                    <a:lnT w="28575" cap="flat" cmpd="sng" algn="ctr">
+                      <a:solidFill>
+                        <a:schemeClr val="bg1"/>
+                      </a:solidFill>
+                      <a:prstDash val="solid"/>
+                      <a:round/>
+                      <a:headEnd type="none" w="med" len="med"/>
+                      <a:tailEnd type="none" w="med" len="med"/>
+                    </a:lnT>
+                    <a:solidFill>
+                      <a:srgbClr val="EBBB43"/>
+                    </a:solidFill>
+                  </a:tcPr>
                 </a:tc>
                 <a:tc>
                   <a:txBody>
@@ -17775,32 +17907,67 @@
                     <a:lstStyle/>
                     <a:p>
                       <a:r>
-                        <a:rPr lang="en-US" sz="1200" dirty="0"/>
-                        <a:t>Visible</a:t>
+                        <a:rPr lang="en-US" dirty="0"/>
+                        <a:t>Mandatory</a:t>
                       </a:r>
                     </a:p>
                   </a:txBody>
-                  <a:tcPr/>
+                  <a:tcPr anchor="ctr">
+                    <a:lnR w="19050" cap="flat" cmpd="sng" algn="ctr">
+                      <a:solidFill>
+                        <a:schemeClr val="bg1"/>
+                      </a:solidFill>
+                      <a:prstDash val="solid"/>
+                      <a:round/>
+                      <a:headEnd type="none" w="med" len="med"/>
+                      <a:tailEnd type="none" w="med" len="med"/>
+                    </a:lnR>
+                    <a:lnT w="28575" cap="flat" cmpd="sng" algn="ctr">
+                      <a:solidFill>
+                        <a:schemeClr val="bg1"/>
+                      </a:solidFill>
+                      <a:prstDash val="solid"/>
+                      <a:round/>
+                      <a:headEnd type="none" w="med" len="med"/>
+                      <a:tailEnd type="none" w="med" len="med"/>
+                    </a:lnT>
+                    <a:solidFill>
+                      <a:srgbClr val="EBBB43"/>
+                    </a:solidFill>
+                  </a:tcPr>
                 </a:tc>
                 <a:extLst>
                   <a:ext uri="{0D108BD9-81ED-4DB2-BD59-A6C34878D82A}">
-                    <a16:rowId xmlns:a16="http://schemas.microsoft.com/office/drawing/2014/main" val="746098265"/>
+                    <a16:rowId xmlns:a16="http://schemas.microsoft.com/office/drawing/2014/main" val="3493805386"/>
                   </a:ext>
                 </a:extLst>
               </a:tr>
-              <a:tr h="370840">
+              <a:tr h="292180">
                 <a:tc>
                   <a:txBody>
                     <a:bodyPr/>
                     <a:lstStyle/>
                     <a:p>
                       <a:r>
-                        <a:rPr lang="en-US" sz="1200" dirty="0"/>
-                        <a:t>R2</a:t>
+                        <a:rPr lang="en-US" dirty="0"/>
+                        <a:t>Ease of use</a:t>
                       </a:r>
                     </a:p>
                   </a:txBody>
-                  <a:tcPr/>
+                  <a:tcPr anchor="ctr">
+                    <a:lnL w="19050" cap="flat" cmpd="sng" algn="ctr">
+                      <a:solidFill>
+                        <a:schemeClr val="bg1"/>
+                      </a:solidFill>
+                      <a:prstDash val="solid"/>
+                      <a:round/>
+                      <a:headEnd type="none" w="med" len="med"/>
+                      <a:tailEnd type="none" w="med" len="med"/>
+                    </a:lnL>
+                    <a:solidFill>
+                      <a:srgbClr val="F4D996"/>
+                    </a:solidFill>
+                  </a:tcPr>
                 </a:tc>
                 <a:tc>
                   <a:txBody>
@@ -17808,12 +17975,16 @@
                     <a:lstStyle/>
                     <a:p>
                       <a:r>
-                        <a:rPr lang="en-US" sz="1200" dirty="0"/>
-                        <a:t>The player must be able to control his actions</a:t>
+                        <a:rPr lang="en-US" dirty="0"/>
+                        <a:t>D – simplistic, intuitive</a:t>
                       </a:r>
                     </a:p>
                   </a:txBody>
-                  <a:tcPr/>
+                  <a:tcPr>
+                    <a:solidFill>
+                      <a:srgbClr val="F4D996"/>
+                    </a:solidFill>
+                  </a:tcPr>
                 </a:tc>
                 <a:tc>
                   <a:txBody>
@@ -17821,32 +17992,58 @@
                     <a:lstStyle/>
                     <a:p>
                       <a:r>
-                        <a:rPr lang="en-US" sz="1200" dirty="0"/>
-                        <a:t>Visible</a:t>
+                        <a:rPr lang="en-US" dirty="0"/>
+                        <a:t>Mandatory</a:t>
                       </a:r>
                     </a:p>
                   </a:txBody>
-                  <a:tcPr/>
+                  <a:tcPr anchor="ctr">
+                    <a:lnR w="19050" cap="flat" cmpd="sng" algn="ctr">
+                      <a:solidFill>
+                        <a:schemeClr val="bg1"/>
+                      </a:solidFill>
+                      <a:prstDash val="solid"/>
+                      <a:round/>
+                      <a:headEnd type="none" w="med" len="med"/>
+                      <a:tailEnd type="none" w="med" len="med"/>
+                    </a:lnR>
+                    <a:solidFill>
+                      <a:srgbClr val="F4D996"/>
+                    </a:solidFill>
+                  </a:tcPr>
                 </a:tc>
                 <a:extLst>
                   <a:ext uri="{0D108BD9-81ED-4DB2-BD59-A6C34878D82A}">
-                    <a16:rowId xmlns:a16="http://schemas.microsoft.com/office/drawing/2014/main" val="309980605"/>
+                    <a16:rowId xmlns:a16="http://schemas.microsoft.com/office/drawing/2014/main" val="1295825423"/>
                   </a:ext>
                 </a:extLst>
               </a:tr>
-              <a:tr h="370840">
+              <a:tr h="292180">
                 <a:tc>
                   <a:txBody>
                     <a:bodyPr/>
                     <a:lstStyle/>
                     <a:p>
                       <a:r>
-                        <a:rPr lang="en-US" sz="1200" dirty="0"/>
-                        <a:t>R3</a:t>
+                        <a:rPr lang="en-US" dirty="0"/>
+                        <a:t>Monetization</a:t>
                       </a:r>
                     </a:p>
                   </a:txBody>
-                  <a:tcPr/>
+                  <a:tcPr anchor="ctr">
+                    <a:lnL w="19050" cap="flat" cmpd="sng" algn="ctr">
+                      <a:solidFill>
+                        <a:schemeClr val="bg1"/>
+                      </a:solidFill>
+                      <a:prstDash val="solid"/>
+                      <a:round/>
+                      <a:headEnd type="none" w="med" len="med"/>
+                      <a:tailEnd type="none" w="med" len="med"/>
+                    </a:lnL>
+                    <a:solidFill>
+                      <a:srgbClr val="EBBB43"/>
+                    </a:solidFill>
+                  </a:tcPr>
                 </a:tc>
                 <a:tc>
                   <a:txBody>
@@ -17854,12 +18051,16 @@
                     <a:lstStyle/>
                     <a:p>
                       <a:r>
-                        <a:rPr lang="en-US" sz="1200" dirty="0"/>
-                        <a:t>The player must be able to select the level he wants.</a:t>
+                        <a:rPr lang="en-US" dirty="0"/>
+                        <a:t>D – Ads, paid currency</a:t>
                       </a:r>
                     </a:p>
                   </a:txBody>
-                  <a:tcPr/>
+                  <a:tcPr>
+                    <a:solidFill>
+                      <a:srgbClr val="EBBB43"/>
+                    </a:solidFill>
+                  </a:tcPr>
                 </a:tc>
                 <a:tc>
                   <a:txBody>
@@ -17867,32 +18068,58 @@
                     <a:lstStyle/>
                     <a:p>
                       <a:r>
-                        <a:rPr lang="en-US" sz="1200" dirty="0"/>
-                        <a:t>Visible</a:t>
+                        <a:rPr lang="en-US" dirty="0"/>
+                        <a:t>Preferable</a:t>
                       </a:r>
                     </a:p>
                   </a:txBody>
-                  <a:tcPr/>
+                  <a:tcPr anchor="ctr">
+                    <a:lnR w="19050" cap="flat" cmpd="sng" algn="ctr">
+                      <a:solidFill>
+                        <a:schemeClr val="bg1"/>
+                      </a:solidFill>
+                      <a:prstDash val="solid"/>
+                      <a:round/>
+                      <a:headEnd type="none" w="med" len="med"/>
+                      <a:tailEnd type="none" w="med" len="med"/>
+                    </a:lnR>
+                    <a:solidFill>
+                      <a:srgbClr val="EBBB43"/>
+                    </a:solidFill>
+                  </a:tcPr>
                 </a:tc>
                 <a:extLst>
                   <a:ext uri="{0D108BD9-81ED-4DB2-BD59-A6C34878D82A}">
-                    <a16:rowId xmlns:a16="http://schemas.microsoft.com/office/drawing/2014/main" val="402637408"/>
+                    <a16:rowId xmlns:a16="http://schemas.microsoft.com/office/drawing/2014/main" val="221035577"/>
                   </a:ext>
                 </a:extLst>
               </a:tr>
-              <a:tr h="370840">
+              <a:tr h="292180">
                 <a:tc>
                   <a:txBody>
                     <a:bodyPr/>
                     <a:lstStyle/>
                     <a:p>
                       <a:r>
-                        <a:rPr lang="en-US" sz="1200" dirty="0"/>
-                        <a:t>R4</a:t>
+                        <a:rPr lang="en-US" dirty="0"/>
+                        <a:t>Graphics</a:t>
                       </a:r>
                     </a:p>
                   </a:txBody>
-                  <a:tcPr/>
+                  <a:tcPr anchor="ctr">
+                    <a:lnL w="19050" cap="flat" cmpd="sng" algn="ctr">
+                      <a:solidFill>
+                        <a:schemeClr val="bg1"/>
+                      </a:solidFill>
+                      <a:prstDash val="solid"/>
+                      <a:round/>
+                      <a:headEnd type="none" w="med" len="med"/>
+                      <a:tailEnd type="none" w="med" len="med"/>
+                    </a:lnL>
+                    <a:solidFill>
+                      <a:srgbClr val="F1CF7B"/>
+                    </a:solidFill>
+                  </a:tcPr>
                 </a:tc>
                 <a:tc>
                   <a:txBody>
@@ -17900,12 +18127,16 @@
                     <a:lstStyle/>
                     <a:p>
                       <a:r>
-                        <a:rPr lang="en-US" sz="1200" dirty="0"/>
-                        <a:t>Loading visuals and data need to be quick</a:t>
+                        <a:rPr lang="en-US" dirty="0"/>
+                        <a:t>D – 2D, Pixel art</a:t>
                       </a:r>
                     </a:p>
                   </a:txBody>
-                  <a:tcPr/>
+                  <a:tcPr>
+                    <a:solidFill>
+                      <a:srgbClr val="F1CF7B"/>
+                    </a:solidFill>
+                  </a:tcPr>
                 </a:tc>
                 <a:tc>
                   <a:txBody>
@@ -17913,32 +18144,67 @@
                     <a:lstStyle/>
                     <a:p>
                       <a:r>
-                        <a:rPr lang="en-US" sz="1200" dirty="0"/>
-                        <a:t>Invisible</a:t>
+                        <a:rPr lang="en-US" dirty="0"/>
+                        <a:t>Mandatory</a:t>
                       </a:r>
                     </a:p>
                   </a:txBody>
-                  <a:tcPr/>
+                  <a:tcPr anchor="ctr">
+                    <a:lnR w="19050" cap="flat" cmpd="sng" algn="ctr">
+                      <a:solidFill>
+                        <a:schemeClr val="bg1"/>
+                      </a:solidFill>
+                      <a:prstDash val="solid"/>
+                      <a:round/>
+                      <a:headEnd type="none" w="med" len="med"/>
+                      <a:tailEnd type="none" w="med" len="med"/>
+                    </a:lnR>
+                    <a:solidFill>
+                      <a:srgbClr val="F1CF7B"/>
+                    </a:solidFill>
+                  </a:tcPr>
                 </a:tc>
                 <a:extLst>
                   <a:ext uri="{0D108BD9-81ED-4DB2-BD59-A6C34878D82A}">
-                    <a16:rowId xmlns:a16="http://schemas.microsoft.com/office/drawing/2014/main" val="3047824491"/>
+                    <a16:rowId xmlns:a16="http://schemas.microsoft.com/office/drawing/2014/main" val="3044347824"/>
                   </a:ext>
                 </a:extLst>
               </a:tr>
-              <a:tr h="370840">
+              <a:tr h="292180">
                 <a:tc>
                   <a:txBody>
                     <a:bodyPr/>
                     <a:lstStyle/>
                     <a:p>
                       <a:r>
-                        <a:rPr lang="en-US" sz="1200" dirty="0"/>
-                        <a:t>R5</a:t>
+                        <a:rPr lang="en-US" dirty="0"/>
+                        <a:t>Controls</a:t>
                       </a:r>
                     </a:p>
                   </a:txBody>
-                  <a:tcPr/>
+                  <a:tcPr anchor="ctr">
+                    <a:lnL w="19050" cap="flat" cmpd="sng" algn="ctr">
+                      <a:solidFill>
+                        <a:schemeClr val="bg1"/>
+                      </a:solidFill>
+                      <a:prstDash val="solid"/>
+                      <a:round/>
+                      <a:headEnd type="none" w="med" len="med"/>
+                      <a:tailEnd type="none" w="med" len="med"/>
+                    </a:lnL>
+                    <a:lnB w="19050" cap="flat" cmpd="sng" algn="ctr">
+                      <a:solidFill>
+                        <a:schemeClr val="bg1"/>
+                      </a:solidFill>
+                      <a:prstDash val="solid"/>
+                      <a:round/>
+                      <a:headEnd type="none" w="med" len="med"/>
+                      <a:tailEnd type="none" w="med" len="med"/>
+                    </a:lnB>
+                    <a:solidFill>
+                      <a:srgbClr val="EBBB43"/>
+                    </a:solidFill>
+                  </a:tcPr>
                 </a:tc>
                 <a:tc>
                   <a:txBody>
@@ -17946,12 +18212,25 @@
                     <a:lstStyle/>
                     <a:p>
                       <a:r>
-                        <a:rPr lang="en-US" sz="1200" dirty="0"/>
-                        <a:t>The game must have music and sound effects.</a:t>
+                        <a:rPr lang="en-US" dirty="0"/>
+                        <a:t>D – Touch Controls</a:t>
                       </a:r>
                     </a:p>
                   </a:txBody>
-                  <a:tcPr/>
+                  <a:tcPr>
+                    <a:lnB w="19050" cap="flat" cmpd="sng" algn="ctr">
+                      <a:solidFill>
+                        <a:schemeClr val="bg1"/>
+                      </a:solidFill>
+                      <a:prstDash val="solid"/>
+                      <a:round/>
+                      <a:headEnd type="none" w="med" len="med"/>
+                      <a:tailEnd type="none" w="med" len="med"/>
+                    </a:lnB>
+                    <a:solidFill>
+                      <a:srgbClr val="EBBB43"/>
+                    </a:solidFill>
+                  </a:tcPr>
                 </a:tc>
                 <a:tc>
                   <a:txBody>
@@ -17959,62 +18238,38 @@
                     <a:lstStyle/>
                     <a:p>
                       <a:r>
-                        <a:rPr lang="en-US" sz="1200" dirty="0"/>
-                        <a:t>Visible</a:t>
+                        <a:rPr lang="en-US" dirty="0"/>
+                        <a:t>Mandatory</a:t>
                       </a:r>
                     </a:p>
                   </a:txBody>
-                  <a:tcPr/>
+                  <a:tcPr anchor="ctr">
+                    <a:lnR w="19050" cap="flat" cmpd="sng" algn="ctr">
+                      <a:solidFill>
+                        <a:schemeClr val="bg1"/>
+                      </a:solidFill>
+                      <a:prstDash val="solid"/>
+                      <a:round/>
+                      <a:headEnd type="none" w="med" len="med"/>
+                      <a:tailEnd type="none" w="med" len="med"/>
+                    </a:lnR>
+                    <a:lnB w="19050" cap="flat" cmpd="sng" algn="ctr">
+                      <a:solidFill>
+                        <a:schemeClr val="bg1"/>
+                      </a:solidFill>
+                      <a:prstDash val="solid"/>
+                      <a:round/>
+                      <a:headEnd type="none" w="med" len="med"/>
+                      <a:tailEnd type="none" w="med" len="med"/>
+                    </a:lnB>
+                    <a:solidFill>
+                      <a:srgbClr val="EBBB43"/>
+                    </a:solidFill>
+                  </a:tcPr>
                 </a:tc>
                 <a:extLst>
                   <a:ext uri="{0D108BD9-81ED-4DB2-BD59-A6C34878D82A}">
-                    <a16:rowId xmlns:a16="http://schemas.microsoft.com/office/drawing/2014/main" val="2085931372"/>
-                  </a:ext>
-                </a:extLst>
-              </a:tr>
-              <a:tr h="370840">
-                <a:tc>
-                  <a:txBody>
-                    <a:bodyPr/>
-                    <a:lstStyle/>
-                    <a:p>
-                      <a:r>
-                        <a:rPr lang="en-US" sz="1200" dirty="0"/>
-                        <a:t>R6</a:t>
-                      </a:r>
-                    </a:p>
-                  </a:txBody>
-                  <a:tcPr/>
-                </a:tc>
-                <a:tc>
-                  <a:txBody>
-                    <a:bodyPr/>
-                    <a:lstStyle/>
-                    <a:p>
-                      <a:r>
-                        <a:rPr lang="en-US" sz="1200" dirty="0"/>
-                        <a:t>The game must save the user’s data</a:t>
-                      </a:r>
-                    </a:p>
-                  </a:txBody>
-                  <a:tcPr/>
-                </a:tc>
-                <a:tc>
-                  <a:txBody>
-                    <a:bodyPr/>
-                    <a:lstStyle/>
-                    <a:p>
-                      <a:r>
-                        <a:rPr lang="en-US" sz="1200" dirty="0"/>
-                        <a:t>Invisible</a:t>
-                      </a:r>
-                    </a:p>
-                  </a:txBody>
-                  <a:tcPr/>
-                </a:tc>
-                <a:extLst>
-                  <a:ext uri="{0D108BD9-81ED-4DB2-BD59-A6C34878D82A}">
-                    <a16:rowId xmlns:a16="http://schemas.microsoft.com/office/drawing/2014/main" val="4138630267"/>
+                    <a16:rowId xmlns:a16="http://schemas.microsoft.com/office/drawing/2014/main" val="1830734360"/>
                   </a:ext>
                 </a:extLst>
               </a:tr>
@@ -18024,10 +18279,10 @@
       </p:graphicFrame>
       <p:sp>
         <p:nvSpPr>
-          <p:cNvPr id="3" name="Google Shape;531;p73">
+          <p:cNvPr id="7" name="Google Shape;531;p73">
             <a:extLst>
               <a:ext uri="{FF2B5EF4-FFF2-40B4-BE49-F238E27FC236}">
-                <a16:creationId xmlns:a16="http://schemas.microsoft.com/office/drawing/2014/main" id="{93AE1D72-C5FB-1F21-E38D-F1A465209720}"/>
+                <a16:creationId xmlns:a16="http://schemas.microsoft.com/office/drawing/2014/main" id="{126A4635-AAC8-9A3B-C152-6D714771B9CC}"/>
               </a:ext>
             </a:extLst>
           </p:cNvPr>
@@ -18038,8 +18293,8 @@
         </p:nvSpPr>
         <p:spPr>
           <a:xfrm>
-            <a:off x="8427719" y="4710914"/>
-            <a:ext cx="716281" cy="432586"/>
+            <a:off x="7993856" y="4710914"/>
+            <a:ext cx="890594" cy="432586"/>
           </a:xfrm>
           <a:prstGeom prst="rect">
             <a:avLst/>
@@ -18301,10 +18556,10 @@
             </a:lvl9pPr>
           </a:lstStyle>
           <a:p>
-            <a:pPr marL="88900" indent="0"/>
+            <a:pPr marL="88900" indent="0" algn="r"/>
             <a:r>
               <a:rPr lang="en" dirty="0"/>
-              <a:t>10/11</a:t>
+              <a:t>9/11</a:t>
             </a:r>
           </a:p>
         </p:txBody>
@@ -18312,7 +18567,7 @@
     </p:spTree>
     <p:extLst>
       <p:ext uri="{BB962C8B-B14F-4D97-AF65-F5344CB8AC3E}">
-        <p14:creationId xmlns:p14="http://schemas.microsoft.com/office/powerpoint/2010/main" val="1649728121"/>
+        <p14:creationId xmlns:p14="http://schemas.microsoft.com/office/powerpoint/2010/main" val="1592349818"/>
       </p:ext>
     </p:extLst>
   </p:cSld>
@@ -18840,7 +19095,7 @@
         </p:nvSpPr>
         <p:spPr>
           <a:xfrm>
-            <a:off x="5690650" y="838281"/>
+            <a:off x="5690650" y="653929"/>
             <a:ext cx="2454000" cy="236700"/>
           </a:xfrm>
           <a:prstGeom prst="rect">
@@ -18848,7 +19103,7 @@
           </a:prstGeom>
         </p:spPr>
         <p:txBody>
-          <a:bodyPr spcFirstLastPara="1" wrap="square" lIns="91425" tIns="91425" rIns="91425" bIns="91425" anchor="t" anchorCtr="0">
+          <a:bodyPr spcFirstLastPara="1" wrap="square" lIns="91425" tIns="91425" rIns="91425" bIns="91425" anchor="ctr" anchorCtr="0">
             <a:noAutofit/>
           </a:bodyPr>
           <a:lstStyle/>
@@ -18882,7 +19137,7 @@
         </p:nvSpPr>
         <p:spPr>
           <a:xfrm>
-            <a:off x="5690650" y="562736"/>
+            <a:off x="5690650" y="378384"/>
             <a:ext cx="3193800" cy="325200"/>
           </a:xfrm>
           <a:prstGeom prst="rect">
@@ -18943,7 +19198,7 @@
         </p:nvSpPr>
         <p:spPr>
           <a:xfrm>
-            <a:off x="5690650" y="1401961"/>
+            <a:off x="5690650" y="1136544"/>
             <a:ext cx="3193800" cy="325200"/>
           </a:xfrm>
           <a:prstGeom prst="rect">
@@ -19004,7 +19259,7 @@
         </p:nvSpPr>
         <p:spPr>
           <a:xfrm>
-            <a:off x="5690650" y="1681434"/>
+            <a:off x="5690650" y="1416017"/>
             <a:ext cx="2655828" cy="236700"/>
           </a:xfrm>
           <a:prstGeom prst="rect">
@@ -19012,7 +19267,7 @@
           </a:prstGeom>
         </p:spPr>
         <p:txBody>
-          <a:bodyPr spcFirstLastPara="1" wrap="square" lIns="91425" tIns="91425" rIns="91425" bIns="91425" anchor="t" anchorCtr="0">
+          <a:bodyPr spcFirstLastPara="1" wrap="square" lIns="91425" tIns="91425" rIns="91425" bIns="91425" anchor="ctr" anchorCtr="0">
             <a:noAutofit/>
           </a:bodyPr>
           <a:lstStyle/>
@@ -19051,7 +19306,7 @@
         </p:nvSpPr>
         <p:spPr>
           <a:xfrm>
-            <a:off x="4810771" y="682804"/>
+            <a:off x="4810771" y="498452"/>
             <a:ext cx="684600" cy="290400"/>
           </a:xfrm>
           <a:prstGeom prst="rect">
@@ -19093,7 +19348,7 @@
         </p:nvSpPr>
         <p:spPr>
           <a:xfrm>
-            <a:off x="4810771" y="1550726"/>
+            <a:off x="4810771" y="1285309"/>
             <a:ext cx="684600" cy="290400"/>
           </a:xfrm>
           <a:prstGeom prst="rect">
@@ -19135,7 +19390,7 @@
         </p:nvSpPr>
         <p:spPr>
           <a:xfrm>
-            <a:off x="5690650" y="2279086"/>
+            <a:off x="5690650" y="1895636"/>
             <a:ext cx="3193800" cy="325200"/>
           </a:xfrm>
           <a:prstGeom prst="rect">
@@ -19196,7 +19451,7 @@
         </p:nvSpPr>
         <p:spPr>
           <a:xfrm>
-            <a:off x="5690650" y="2564156"/>
+            <a:off x="5690650" y="2180706"/>
             <a:ext cx="2454000" cy="236700"/>
           </a:xfrm>
           <a:prstGeom prst="rect">
@@ -19204,7 +19459,7 @@
           </a:prstGeom>
         </p:spPr>
         <p:txBody>
-          <a:bodyPr spcFirstLastPara="1" wrap="square" lIns="91425" tIns="91425" rIns="91425" bIns="91425" anchor="t" anchorCtr="0">
+          <a:bodyPr spcFirstLastPara="1" wrap="square" lIns="91425" tIns="91425" rIns="91425" bIns="91425" anchor="ctr" anchorCtr="0">
             <a:noAutofit/>
           </a:bodyPr>
           <a:lstStyle/>
@@ -19238,7 +19493,7 @@
         </p:nvSpPr>
         <p:spPr>
           <a:xfrm>
-            <a:off x="5690650" y="3147011"/>
+            <a:off x="5690650" y="2660325"/>
             <a:ext cx="3193800" cy="325200"/>
           </a:xfrm>
           <a:prstGeom prst="rect">
@@ -19299,7 +19554,7 @@
         </p:nvSpPr>
         <p:spPr>
           <a:xfrm>
-            <a:off x="5690650" y="3426484"/>
+            <a:off x="5690650" y="2939798"/>
             <a:ext cx="2454000" cy="236700"/>
           </a:xfrm>
           <a:prstGeom prst="rect">
@@ -19307,7 +19562,7 @@
           </a:prstGeom>
         </p:spPr>
         <p:txBody>
-          <a:bodyPr spcFirstLastPara="1" wrap="square" lIns="91425" tIns="91425" rIns="91425" bIns="91425" anchor="t" anchorCtr="0">
+          <a:bodyPr spcFirstLastPara="1" wrap="square" lIns="91425" tIns="91425" rIns="91425" bIns="91425" anchor="ctr" anchorCtr="0">
             <a:noAutofit/>
           </a:bodyPr>
           <a:lstStyle/>
@@ -19346,7 +19601,7 @@
         </p:nvSpPr>
         <p:spPr>
           <a:xfrm>
-            <a:off x="4810771" y="2399154"/>
+            <a:off x="4810771" y="2015704"/>
             <a:ext cx="684600" cy="290400"/>
           </a:xfrm>
           <a:prstGeom prst="rect">
@@ -19388,7 +19643,7 @@
         </p:nvSpPr>
         <p:spPr>
           <a:xfrm>
-            <a:off x="4810771" y="3267076"/>
+            <a:off x="4810771" y="2780390"/>
             <a:ext cx="684600" cy="290400"/>
           </a:xfrm>
           <a:prstGeom prst="rect">
@@ -19460,7 +19715,7 @@
         </p:nvSpPr>
         <p:spPr>
           <a:xfrm>
-            <a:off x="5690650" y="4024449"/>
+            <a:off x="5690650" y="3417563"/>
             <a:ext cx="3193800" cy="325200"/>
           </a:xfrm>
           <a:prstGeom prst="rect">
@@ -19754,7 +20009,7 @@
         </p:nvSpPr>
         <p:spPr>
           <a:xfrm>
-            <a:off x="5690650" y="4303922"/>
+            <a:off x="5690650" y="3697036"/>
             <a:ext cx="2454000" cy="236700"/>
           </a:xfrm>
           <a:prstGeom prst="rect">
@@ -19766,7 +20021,7 @@
           </a:ln>
         </p:spPr>
         <p:txBody>
-          <a:bodyPr spcFirstLastPara="1" wrap="square" lIns="91425" tIns="91425" rIns="91425" bIns="91425" anchor="t" anchorCtr="0">
+          <a:bodyPr spcFirstLastPara="1" wrap="square" lIns="91425" tIns="91425" rIns="91425" bIns="91425" anchor="ctr" anchorCtr="0">
             <a:noAutofit/>
           </a:bodyPr>
           <a:lstStyle>
@@ -20053,7 +20308,7 @@
         </p:nvSpPr>
         <p:spPr>
           <a:xfrm>
-            <a:off x="4810771" y="4144514"/>
+            <a:off x="4810771" y="3537628"/>
             <a:ext cx="684600" cy="290400"/>
           </a:xfrm>
           <a:prstGeom prst="rect">
@@ -20339,8 +20594,8 @@
         </p:nvSpPr>
         <p:spPr>
           <a:xfrm>
-            <a:off x="8427719" y="4710914"/>
-            <a:ext cx="716281" cy="432586"/>
+            <a:off x="7993856" y="4710914"/>
+            <a:ext cx="890594" cy="432586"/>
           </a:xfrm>
           <a:prstGeom prst="rect">
             <a:avLst/>
@@ -20602,10 +20857,881 @@
             </a:lvl9pPr>
           </a:lstStyle>
           <a:p>
-            <a:pPr marL="88900" indent="0"/>
+            <a:pPr marL="88900" indent="0" algn="r"/>
             <a:r>
               <a:rPr lang="en" dirty="0"/>
               <a:t>2/11</a:t>
+            </a:r>
+          </a:p>
+        </p:txBody>
+      </p:sp>
+      <p:sp>
+        <p:nvSpPr>
+          <p:cNvPr id="9" name="Google Shape;493;p70">
+            <a:extLst>
+              <a:ext uri="{FF2B5EF4-FFF2-40B4-BE49-F238E27FC236}">
+                <a16:creationId xmlns:a16="http://schemas.microsoft.com/office/drawing/2014/main" id="{CA1BE3E3-2EAA-664B-FBA3-65A6AF9F6C55}"/>
+              </a:ext>
+            </a:extLst>
+          </p:cNvPr>
+          <p:cNvSpPr txBox="1">
+            <a:spLocks/>
+          </p:cNvSpPr>
+          <p:nvPr/>
+        </p:nvSpPr>
+        <p:spPr>
+          <a:xfrm>
+            <a:off x="5690650" y="4171136"/>
+            <a:ext cx="3193800" cy="325200"/>
+          </a:xfrm>
+          <a:prstGeom prst="rect">
+            <a:avLst/>
+          </a:prstGeom>
+          <a:noFill/>
+          <a:ln>
+            <a:noFill/>
+          </a:ln>
+        </p:spPr>
+        <p:txBody>
+          <a:bodyPr spcFirstLastPara="1" wrap="square" lIns="91425" tIns="91425" rIns="91425" bIns="91425" anchor="ctr" anchorCtr="0">
+            <a:noAutofit/>
+          </a:bodyPr>
+          <a:lstStyle>
+            <a:defPPr marR="0" lvl="0" algn="l" rtl="0">
+              <a:lnSpc>
+                <a:spcPct val="100000"/>
+              </a:lnSpc>
+              <a:spcBef>
+                <a:spcPts val="0"/>
+              </a:spcBef>
+              <a:spcAft>
+                <a:spcPts val="0"/>
+              </a:spcAft>
+            </a:defPPr>
+            <a:lvl1pPr marR="0" lvl="0" algn="l" rtl="0">
+              <a:lnSpc>
+                <a:spcPct val="100000"/>
+              </a:lnSpc>
+              <a:spcBef>
+                <a:spcPts val="0"/>
+              </a:spcBef>
+              <a:spcAft>
+                <a:spcPts val="0"/>
+              </a:spcAft>
+              <a:buClr>
+                <a:schemeClr val="dk1"/>
+              </a:buClr>
+              <a:buSzPts val="1800"/>
+              <a:buFont typeface="Julius Sans One"/>
+              <a:buNone/>
+              <a:defRPr sz="1800" b="1" i="0" u="none" strike="noStrike" cap="none">
+                <a:solidFill>
+                  <a:schemeClr val="dk1"/>
+                </a:solidFill>
+                <a:latin typeface="Julius Sans One"/>
+                <a:ea typeface="Julius Sans One"/>
+                <a:cs typeface="Julius Sans One"/>
+                <a:sym typeface="Julius Sans One"/>
+              </a:defRPr>
+            </a:lvl1pPr>
+            <a:lvl2pPr marR="0" lvl="1" algn="ctr" rtl="0">
+              <a:lnSpc>
+                <a:spcPct val="100000"/>
+              </a:lnSpc>
+              <a:spcBef>
+                <a:spcPts val="0"/>
+              </a:spcBef>
+              <a:spcAft>
+                <a:spcPts val="0"/>
+              </a:spcAft>
+              <a:buClr>
+                <a:schemeClr val="dk1"/>
+              </a:buClr>
+              <a:buSzPts val="1800"/>
+              <a:buFont typeface="Julius Sans One"/>
+              <a:buNone/>
+              <a:defRPr sz="1800" b="0" i="0" u="none" strike="noStrike" cap="none">
+                <a:solidFill>
+                  <a:schemeClr val="dk1"/>
+                </a:solidFill>
+                <a:latin typeface="Julius Sans One"/>
+                <a:ea typeface="Julius Sans One"/>
+                <a:cs typeface="Julius Sans One"/>
+                <a:sym typeface="Julius Sans One"/>
+              </a:defRPr>
+            </a:lvl2pPr>
+            <a:lvl3pPr marR="0" lvl="2" algn="ctr" rtl="0">
+              <a:lnSpc>
+                <a:spcPct val="100000"/>
+              </a:lnSpc>
+              <a:spcBef>
+                <a:spcPts val="0"/>
+              </a:spcBef>
+              <a:spcAft>
+                <a:spcPts val="0"/>
+              </a:spcAft>
+              <a:buClr>
+                <a:schemeClr val="dk1"/>
+              </a:buClr>
+              <a:buSzPts val="1800"/>
+              <a:buFont typeface="Julius Sans One"/>
+              <a:buNone/>
+              <a:defRPr sz="1800" b="0" i="0" u="none" strike="noStrike" cap="none">
+                <a:solidFill>
+                  <a:schemeClr val="dk1"/>
+                </a:solidFill>
+                <a:latin typeface="Julius Sans One"/>
+                <a:ea typeface="Julius Sans One"/>
+                <a:cs typeface="Julius Sans One"/>
+                <a:sym typeface="Julius Sans One"/>
+              </a:defRPr>
+            </a:lvl3pPr>
+            <a:lvl4pPr marR="0" lvl="3" algn="ctr" rtl="0">
+              <a:lnSpc>
+                <a:spcPct val="100000"/>
+              </a:lnSpc>
+              <a:spcBef>
+                <a:spcPts val="0"/>
+              </a:spcBef>
+              <a:spcAft>
+                <a:spcPts val="0"/>
+              </a:spcAft>
+              <a:buClr>
+                <a:schemeClr val="dk1"/>
+              </a:buClr>
+              <a:buSzPts val="1800"/>
+              <a:buFont typeface="Julius Sans One"/>
+              <a:buNone/>
+              <a:defRPr sz="1800" b="0" i="0" u="none" strike="noStrike" cap="none">
+                <a:solidFill>
+                  <a:schemeClr val="dk1"/>
+                </a:solidFill>
+                <a:latin typeface="Julius Sans One"/>
+                <a:ea typeface="Julius Sans One"/>
+                <a:cs typeface="Julius Sans One"/>
+                <a:sym typeface="Julius Sans One"/>
+              </a:defRPr>
+            </a:lvl4pPr>
+            <a:lvl5pPr marR="0" lvl="4" algn="ctr" rtl="0">
+              <a:lnSpc>
+                <a:spcPct val="100000"/>
+              </a:lnSpc>
+              <a:spcBef>
+                <a:spcPts val="0"/>
+              </a:spcBef>
+              <a:spcAft>
+                <a:spcPts val="0"/>
+              </a:spcAft>
+              <a:buClr>
+                <a:schemeClr val="dk1"/>
+              </a:buClr>
+              <a:buSzPts val="1800"/>
+              <a:buFont typeface="Julius Sans One"/>
+              <a:buNone/>
+              <a:defRPr sz="1800" b="0" i="0" u="none" strike="noStrike" cap="none">
+                <a:solidFill>
+                  <a:schemeClr val="dk1"/>
+                </a:solidFill>
+                <a:latin typeface="Julius Sans One"/>
+                <a:ea typeface="Julius Sans One"/>
+                <a:cs typeface="Julius Sans One"/>
+                <a:sym typeface="Julius Sans One"/>
+              </a:defRPr>
+            </a:lvl5pPr>
+            <a:lvl6pPr marR="0" lvl="5" algn="ctr" rtl="0">
+              <a:lnSpc>
+                <a:spcPct val="100000"/>
+              </a:lnSpc>
+              <a:spcBef>
+                <a:spcPts val="0"/>
+              </a:spcBef>
+              <a:spcAft>
+                <a:spcPts val="0"/>
+              </a:spcAft>
+              <a:buClr>
+                <a:schemeClr val="dk1"/>
+              </a:buClr>
+              <a:buSzPts val="1800"/>
+              <a:buFont typeface="Julius Sans One"/>
+              <a:buNone/>
+              <a:defRPr sz="1800" b="0" i="0" u="none" strike="noStrike" cap="none">
+                <a:solidFill>
+                  <a:schemeClr val="dk1"/>
+                </a:solidFill>
+                <a:latin typeface="Julius Sans One"/>
+                <a:ea typeface="Julius Sans One"/>
+                <a:cs typeface="Julius Sans One"/>
+                <a:sym typeface="Julius Sans One"/>
+              </a:defRPr>
+            </a:lvl6pPr>
+            <a:lvl7pPr marR="0" lvl="6" algn="ctr" rtl="0">
+              <a:lnSpc>
+                <a:spcPct val="100000"/>
+              </a:lnSpc>
+              <a:spcBef>
+                <a:spcPts val="0"/>
+              </a:spcBef>
+              <a:spcAft>
+                <a:spcPts val="0"/>
+              </a:spcAft>
+              <a:buClr>
+                <a:schemeClr val="dk1"/>
+              </a:buClr>
+              <a:buSzPts val="1800"/>
+              <a:buFont typeface="Julius Sans One"/>
+              <a:buNone/>
+              <a:defRPr sz="1800" b="0" i="0" u="none" strike="noStrike" cap="none">
+                <a:solidFill>
+                  <a:schemeClr val="dk1"/>
+                </a:solidFill>
+                <a:latin typeface="Julius Sans One"/>
+                <a:ea typeface="Julius Sans One"/>
+                <a:cs typeface="Julius Sans One"/>
+                <a:sym typeface="Julius Sans One"/>
+              </a:defRPr>
+            </a:lvl7pPr>
+            <a:lvl8pPr marR="0" lvl="7" algn="ctr" rtl="0">
+              <a:lnSpc>
+                <a:spcPct val="100000"/>
+              </a:lnSpc>
+              <a:spcBef>
+                <a:spcPts val="0"/>
+              </a:spcBef>
+              <a:spcAft>
+                <a:spcPts val="0"/>
+              </a:spcAft>
+              <a:buClr>
+                <a:schemeClr val="dk1"/>
+              </a:buClr>
+              <a:buSzPts val="1800"/>
+              <a:buFont typeface="Julius Sans One"/>
+              <a:buNone/>
+              <a:defRPr sz="1800" b="0" i="0" u="none" strike="noStrike" cap="none">
+                <a:solidFill>
+                  <a:schemeClr val="dk1"/>
+                </a:solidFill>
+                <a:latin typeface="Julius Sans One"/>
+                <a:ea typeface="Julius Sans One"/>
+                <a:cs typeface="Julius Sans One"/>
+                <a:sym typeface="Julius Sans One"/>
+              </a:defRPr>
+            </a:lvl8pPr>
+            <a:lvl9pPr marR="0" lvl="8" algn="ctr" rtl="0">
+              <a:lnSpc>
+                <a:spcPct val="100000"/>
+              </a:lnSpc>
+              <a:spcBef>
+                <a:spcPts val="0"/>
+              </a:spcBef>
+              <a:spcAft>
+                <a:spcPts val="0"/>
+              </a:spcAft>
+              <a:buClr>
+                <a:schemeClr val="dk1"/>
+              </a:buClr>
+              <a:buSzPts val="1800"/>
+              <a:buFont typeface="Julius Sans One"/>
+              <a:buNone/>
+              <a:defRPr sz="1800" b="0" i="0" u="none" strike="noStrike" cap="none">
+                <a:solidFill>
+                  <a:schemeClr val="dk1"/>
+                </a:solidFill>
+                <a:latin typeface="Julius Sans One"/>
+                <a:ea typeface="Julius Sans One"/>
+                <a:cs typeface="Julius Sans One"/>
+                <a:sym typeface="Julius Sans One"/>
+              </a:defRPr>
+            </a:lvl9pPr>
+          </a:lstStyle>
+          <a:p>
+            <a:r>
+              <a:rPr lang="en-US">
+                <a:effectLst>
+                  <a:outerShdw blurRad="38100" dist="38100" dir="2700000" algn="tl">
+                    <a:srgbClr val="000000">
+                      <a:alpha val="43137"/>
+                    </a:srgbClr>
+                  </a:outerShdw>
+                </a:effectLst>
+              </a:rPr>
+              <a:t>System</a:t>
+            </a:r>
+          </a:p>
+        </p:txBody>
+      </p:sp>
+      <p:sp>
+        <p:nvSpPr>
+          <p:cNvPr id="10" name="Google Shape;494;p70">
+            <a:extLst>
+              <a:ext uri="{FF2B5EF4-FFF2-40B4-BE49-F238E27FC236}">
+                <a16:creationId xmlns:a16="http://schemas.microsoft.com/office/drawing/2014/main" id="{BC5976E5-A5E9-0928-C1FC-60E2B4119CAA}"/>
+              </a:ext>
+            </a:extLst>
+          </p:cNvPr>
+          <p:cNvSpPr txBox="1">
+            <a:spLocks/>
+          </p:cNvSpPr>
+          <p:nvPr/>
+        </p:nvSpPr>
+        <p:spPr>
+          <a:xfrm>
+            <a:off x="5690650" y="4450609"/>
+            <a:ext cx="2454000" cy="236700"/>
+          </a:xfrm>
+          <a:prstGeom prst="rect">
+            <a:avLst/>
+          </a:prstGeom>
+          <a:noFill/>
+          <a:ln>
+            <a:noFill/>
+          </a:ln>
+        </p:spPr>
+        <p:txBody>
+          <a:bodyPr spcFirstLastPara="1" wrap="square" lIns="91425" tIns="91425" rIns="91425" bIns="91425" anchor="ctr" anchorCtr="0">
+            <a:noAutofit/>
+          </a:bodyPr>
+          <a:lstStyle>
+            <a:defPPr marR="0" lvl="0" algn="l" rtl="0">
+              <a:lnSpc>
+                <a:spcPct val="100000"/>
+              </a:lnSpc>
+              <a:spcBef>
+                <a:spcPts val="0"/>
+              </a:spcBef>
+              <a:spcAft>
+                <a:spcPts val="0"/>
+              </a:spcAft>
+            </a:defPPr>
+            <a:lvl1pPr marL="457200" marR="0" lvl="0" indent="-317500" algn="l" rtl="0">
+              <a:lnSpc>
+                <a:spcPct val="100000"/>
+              </a:lnSpc>
+              <a:spcBef>
+                <a:spcPts val="0"/>
+              </a:spcBef>
+              <a:spcAft>
+                <a:spcPts val="0"/>
+              </a:spcAft>
+              <a:buClr>
+                <a:schemeClr val="dk1"/>
+              </a:buClr>
+              <a:buSzPts val="1400"/>
+              <a:buFont typeface="Didact Gothic"/>
+              <a:buNone/>
+              <a:defRPr sz="1400" b="0" i="0" u="none" strike="noStrike" cap="none">
+                <a:solidFill>
+                  <a:schemeClr val="dk1"/>
+                </a:solidFill>
+                <a:latin typeface="Didact Gothic"/>
+                <a:ea typeface="Didact Gothic"/>
+                <a:cs typeface="Didact Gothic"/>
+                <a:sym typeface="Didact Gothic"/>
+              </a:defRPr>
+            </a:lvl1pPr>
+            <a:lvl2pPr marL="914400" marR="0" lvl="1" indent="-317500" algn="ctr" rtl="0">
+              <a:lnSpc>
+                <a:spcPct val="100000"/>
+              </a:lnSpc>
+              <a:spcBef>
+                <a:spcPts val="0"/>
+              </a:spcBef>
+              <a:spcAft>
+                <a:spcPts val="0"/>
+              </a:spcAft>
+              <a:buClr>
+                <a:schemeClr val="dk1"/>
+              </a:buClr>
+              <a:buSzPts val="1400"/>
+              <a:buFont typeface="Didact Gothic"/>
+              <a:buNone/>
+              <a:defRPr sz="1400" b="0" i="0" u="none" strike="noStrike" cap="none">
+                <a:solidFill>
+                  <a:schemeClr val="dk1"/>
+                </a:solidFill>
+                <a:latin typeface="Didact Gothic"/>
+                <a:ea typeface="Didact Gothic"/>
+                <a:cs typeface="Didact Gothic"/>
+                <a:sym typeface="Didact Gothic"/>
+              </a:defRPr>
+            </a:lvl2pPr>
+            <a:lvl3pPr marL="1371600" marR="0" lvl="2" indent="-317500" algn="ctr" rtl="0">
+              <a:lnSpc>
+                <a:spcPct val="100000"/>
+              </a:lnSpc>
+              <a:spcBef>
+                <a:spcPts val="0"/>
+              </a:spcBef>
+              <a:spcAft>
+                <a:spcPts val="0"/>
+              </a:spcAft>
+              <a:buClr>
+                <a:schemeClr val="dk1"/>
+              </a:buClr>
+              <a:buSzPts val="1400"/>
+              <a:buFont typeface="Didact Gothic"/>
+              <a:buNone/>
+              <a:defRPr sz="1400" b="0" i="0" u="none" strike="noStrike" cap="none">
+                <a:solidFill>
+                  <a:schemeClr val="dk1"/>
+                </a:solidFill>
+                <a:latin typeface="Didact Gothic"/>
+                <a:ea typeface="Didact Gothic"/>
+                <a:cs typeface="Didact Gothic"/>
+                <a:sym typeface="Didact Gothic"/>
+              </a:defRPr>
+            </a:lvl3pPr>
+            <a:lvl4pPr marL="1828800" marR="0" lvl="3" indent="-317500" algn="ctr" rtl="0">
+              <a:lnSpc>
+                <a:spcPct val="100000"/>
+              </a:lnSpc>
+              <a:spcBef>
+                <a:spcPts val="0"/>
+              </a:spcBef>
+              <a:spcAft>
+                <a:spcPts val="0"/>
+              </a:spcAft>
+              <a:buClr>
+                <a:schemeClr val="dk1"/>
+              </a:buClr>
+              <a:buSzPts val="1400"/>
+              <a:buFont typeface="Didact Gothic"/>
+              <a:buNone/>
+              <a:defRPr sz="1400" b="0" i="0" u="none" strike="noStrike" cap="none">
+                <a:solidFill>
+                  <a:schemeClr val="dk1"/>
+                </a:solidFill>
+                <a:latin typeface="Didact Gothic"/>
+                <a:ea typeface="Didact Gothic"/>
+                <a:cs typeface="Didact Gothic"/>
+                <a:sym typeface="Didact Gothic"/>
+              </a:defRPr>
+            </a:lvl4pPr>
+            <a:lvl5pPr marL="2286000" marR="0" lvl="4" indent="-317500" algn="ctr" rtl="0">
+              <a:lnSpc>
+                <a:spcPct val="100000"/>
+              </a:lnSpc>
+              <a:spcBef>
+                <a:spcPts val="0"/>
+              </a:spcBef>
+              <a:spcAft>
+                <a:spcPts val="0"/>
+              </a:spcAft>
+              <a:buClr>
+                <a:schemeClr val="dk1"/>
+              </a:buClr>
+              <a:buSzPts val="1400"/>
+              <a:buFont typeface="Didact Gothic"/>
+              <a:buNone/>
+              <a:defRPr sz="1400" b="0" i="0" u="none" strike="noStrike" cap="none">
+                <a:solidFill>
+                  <a:schemeClr val="dk1"/>
+                </a:solidFill>
+                <a:latin typeface="Didact Gothic"/>
+                <a:ea typeface="Didact Gothic"/>
+                <a:cs typeface="Didact Gothic"/>
+                <a:sym typeface="Didact Gothic"/>
+              </a:defRPr>
+            </a:lvl5pPr>
+            <a:lvl6pPr marL="2743200" marR="0" lvl="5" indent="-317500" algn="ctr" rtl="0">
+              <a:lnSpc>
+                <a:spcPct val="100000"/>
+              </a:lnSpc>
+              <a:spcBef>
+                <a:spcPts val="0"/>
+              </a:spcBef>
+              <a:spcAft>
+                <a:spcPts val="0"/>
+              </a:spcAft>
+              <a:buClr>
+                <a:schemeClr val="dk1"/>
+              </a:buClr>
+              <a:buSzPts val="1400"/>
+              <a:buFont typeface="Didact Gothic"/>
+              <a:buNone/>
+              <a:defRPr sz="1400" b="0" i="0" u="none" strike="noStrike" cap="none">
+                <a:solidFill>
+                  <a:schemeClr val="dk1"/>
+                </a:solidFill>
+                <a:latin typeface="Didact Gothic"/>
+                <a:ea typeface="Didact Gothic"/>
+                <a:cs typeface="Didact Gothic"/>
+                <a:sym typeface="Didact Gothic"/>
+              </a:defRPr>
+            </a:lvl6pPr>
+            <a:lvl7pPr marL="3200400" marR="0" lvl="6" indent="-317500" algn="ctr" rtl="0">
+              <a:lnSpc>
+                <a:spcPct val="100000"/>
+              </a:lnSpc>
+              <a:spcBef>
+                <a:spcPts val="0"/>
+              </a:spcBef>
+              <a:spcAft>
+                <a:spcPts val="0"/>
+              </a:spcAft>
+              <a:buClr>
+                <a:schemeClr val="dk1"/>
+              </a:buClr>
+              <a:buSzPts val="1400"/>
+              <a:buFont typeface="Didact Gothic"/>
+              <a:buNone/>
+              <a:defRPr sz="1400" b="0" i="0" u="none" strike="noStrike" cap="none">
+                <a:solidFill>
+                  <a:schemeClr val="dk1"/>
+                </a:solidFill>
+                <a:latin typeface="Didact Gothic"/>
+                <a:ea typeface="Didact Gothic"/>
+                <a:cs typeface="Didact Gothic"/>
+                <a:sym typeface="Didact Gothic"/>
+              </a:defRPr>
+            </a:lvl7pPr>
+            <a:lvl8pPr marL="3657600" marR="0" lvl="7" indent="-317500" algn="ctr" rtl="0">
+              <a:lnSpc>
+                <a:spcPct val="100000"/>
+              </a:lnSpc>
+              <a:spcBef>
+                <a:spcPts val="0"/>
+              </a:spcBef>
+              <a:spcAft>
+                <a:spcPts val="0"/>
+              </a:spcAft>
+              <a:buClr>
+                <a:schemeClr val="dk1"/>
+              </a:buClr>
+              <a:buSzPts val="1400"/>
+              <a:buFont typeface="Didact Gothic"/>
+              <a:buNone/>
+              <a:defRPr sz="1400" b="0" i="0" u="none" strike="noStrike" cap="none">
+                <a:solidFill>
+                  <a:schemeClr val="dk1"/>
+                </a:solidFill>
+                <a:latin typeface="Didact Gothic"/>
+                <a:ea typeface="Didact Gothic"/>
+                <a:cs typeface="Didact Gothic"/>
+                <a:sym typeface="Didact Gothic"/>
+              </a:defRPr>
+            </a:lvl8pPr>
+            <a:lvl9pPr marL="4114800" marR="0" lvl="8" indent="-317500" algn="ctr" rtl="0">
+              <a:lnSpc>
+                <a:spcPct val="100000"/>
+              </a:lnSpc>
+              <a:spcBef>
+                <a:spcPts val="0"/>
+              </a:spcBef>
+              <a:spcAft>
+                <a:spcPts val="0"/>
+              </a:spcAft>
+              <a:buClr>
+                <a:schemeClr val="dk1"/>
+              </a:buClr>
+              <a:buSzPts val="1400"/>
+              <a:buFont typeface="Didact Gothic"/>
+              <a:buNone/>
+              <a:defRPr sz="1400" b="0" i="0" u="none" strike="noStrike" cap="none">
+                <a:solidFill>
+                  <a:schemeClr val="dk1"/>
+                </a:solidFill>
+                <a:latin typeface="Didact Gothic"/>
+                <a:ea typeface="Didact Gothic"/>
+                <a:cs typeface="Didact Gothic"/>
+                <a:sym typeface="Didact Gothic"/>
+              </a:defRPr>
+            </a:lvl9pPr>
+          </a:lstStyle>
+          <a:p>
+            <a:pPr marL="0" indent="0">
+              <a:buSzPts val="1100"/>
+              <a:buFont typeface="Arial"/>
+              <a:buNone/>
+            </a:pPr>
+            <a:r>
+              <a:rPr lang="en-US" dirty="0"/>
+              <a:t>Attributes and functions</a:t>
+            </a:r>
+          </a:p>
+        </p:txBody>
+      </p:sp>
+      <p:sp>
+        <p:nvSpPr>
+          <p:cNvPr id="11" name="Google Shape;496;p70">
+            <a:extLst>
+              <a:ext uri="{FF2B5EF4-FFF2-40B4-BE49-F238E27FC236}">
+                <a16:creationId xmlns:a16="http://schemas.microsoft.com/office/drawing/2014/main" id="{F817CA3E-132D-BFBF-85A7-3AC8B547772D}"/>
+              </a:ext>
+            </a:extLst>
+          </p:cNvPr>
+          <p:cNvSpPr txBox="1">
+            <a:spLocks/>
+          </p:cNvSpPr>
+          <p:nvPr/>
+        </p:nvSpPr>
+        <p:spPr>
+          <a:xfrm>
+            <a:off x="4810771" y="4291201"/>
+            <a:ext cx="684600" cy="290400"/>
+          </a:xfrm>
+          <a:prstGeom prst="rect">
+            <a:avLst/>
+          </a:prstGeom>
+          <a:noFill/>
+          <a:ln>
+            <a:noFill/>
+          </a:ln>
+        </p:spPr>
+        <p:txBody>
+          <a:bodyPr spcFirstLastPara="1" wrap="square" lIns="91425" tIns="91425" rIns="91425" bIns="91425" anchor="ctr" anchorCtr="0">
+            <a:noAutofit/>
+          </a:bodyPr>
+          <a:lstStyle>
+            <a:defPPr marR="0" lvl="0" algn="l" rtl="0">
+              <a:lnSpc>
+                <a:spcPct val="100000"/>
+              </a:lnSpc>
+              <a:spcBef>
+                <a:spcPts val="0"/>
+              </a:spcBef>
+              <a:spcAft>
+                <a:spcPts val="0"/>
+              </a:spcAft>
+            </a:defPPr>
+            <a:lvl1pPr marR="0" lvl="0" algn="r" rtl="0">
+              <a:lnSpc>
+                <a:spcPct val="100000"/>
+              </a:lnSpc>
+              <a:spcBef>
+                <a:spcPts val="0"/>
+              </a:spcBef>
+              <a:spcAft>
+                <a:spcPts val="0"/>
+              </a:spcAft>
+              <a:buClr>
+                <a:schemeClr val="dk1"/>
+              </a:buClr>
+              <a:buSzPts val="1800"/>
+              <a:buFont typeface="Julius Sans One"/>
+              <a:buNone/>
+              <a:defRPr sz="1800" b="1" i="0" u="none" strike="noStrike" cap="none">
+                <a:solidFill>
+                  <a:schemeClr val="dk1"/>
+                </a:solidFill>
+                <a:latin typeface="Julius Sans One"/>
+                <a:ea typeface="Julius Sans One"/>
+                <a:cs typeface="Julius Sans One"/>
+                <a:sym typeface="Julius Sans One"/>
+              </a:defRPr>
+            </a:lvl1pPr>
+            <a:lvl2pPr marR="0" lvl="1" algn="ctr" rtl="0">
+              <a:lnSpc>
+                <a:spcPct val="100000"/>
+              </a:lnSpc>
+              <a:spcBef>
+                <a:spcPts val="0"/>
+              </a:spcBef>
+              <a:spcAft>
+                <a:spcPts val="0"/>
+              </a:spcAft>
+              <a:buClr>
+                <a:schemeClr val="dk1"/>
+              </a:buClr>
+              <a:buSzPts val="1800"/>
+              <a:buFont typeface="Julius Sans One"/>
+              <a:buNone/>
+              <a:defRPr sz="1800" b="0" i="0" u="none" strike="noStrike" cap="none">
+                <a:solidFill>
+                  <a:schemeClr val="dk1"/>
+                </a:solidFill>
+                <a:latin typeface="Julius Sans One"/>
+                <a:ea typeface="Julius Sans One"/>
+                <a:cs typeface="Julius Sans One"/>
+                <a:sym typeface="Julius Sans One"/>
+              </a:defRPr>
+            </a:lvl2pPr>
+            <a:lvl3pPr marR="0" lvl="2" algn="ctr" rtl="0">
+              <a:lnSpc>
+                <a:spcPct val="100000"/>
+              </a:lnSpc>
+              <a:spcBef>
+                <a:spcPts val="0"/>
+              </a:spcBef>
+              <a:spcAft>
+                <a:spcPts val="0"/>
+              </a:spcAft>
+              <a:buClr>
+                <a:schemeClr val="dk1"/>
+              </a:buClr>
+              <a:buSzPts val="1800"/>
+              <a:buFont typeface="Julius Sans One"/>
+              <a:buNone/>
+              <a:defRPr sz="1800" b="0" i="0" u="none" strike="noStrike" cap="none">
+                <a:solidFill>
+                  <a:schemeClr val="dk1"/>
+                </a:solidFill>
+                <a:latin typeface="Julius Sans One"/>
+                <a:ea typeface="Julius Sans One"/>
+                <a:cs typeface="Julius Sans One"/>
+                <a:sym typeface="Julius Sans One"/>
+              </a:defRPr>
+            </a:lvl3pPr>
+            <a:lvl4pPr marR="0" lvl="3" algn="ctr" rtl="0">
+              <a:lnSpc>
+                <a:spcPct val="100000"/>
+              </a:lnSpc>
+              <a:spcBef>
+                <a:spcPts val="0"/>
+              </a:spcBef>
+              <a:spcAft>
+                <a:spcPts val="0"/>
+              </a:spcAft>
+              <a:buClr>
+                <a:schemeClr val="dk1"/>
+              </a:buClr>
+              <a:buSzPts val="1800"/>
+              <a:buFont typeface="Julius Sans One"/>
+              <a:buNone/>
+              <a:defRPr sz="1800" b="0" i="0" u="none" strike="noStrike" cap="none">
+                <a:solidFill>
+                  <a:schemeClr val="dk1"/>
+                </a:solidFill>
+                <a:latin typeface="Julius Sans One"/>
+                <a:ea typeface="Julius Sans One"/>
+                <a:cs typeface="Julius Sans One"/>
+                <a:sym typeface="Julius Sans One"/>
+              </a:defRPr>
+            </a:lvl4pPr>
+            <a:lvl5pPr marR="0" lvl="4" algn="ctr" rtl="0">
+              <a:lnSpc>
+                <a:spcPct val="100000"/>
+              </a:lnSpc>
+              <a:spcBef>
+                <a:spcPts val="0"/>
+              </a:spcBef>
+              <a:spcAft>
+                <a:spcPts val="0"/>
+              </a:spcAft>
+              <a:buClr>
+                <a:schemeClr val="dk1"/>
+              </a:buClr>
+              <a:buSzPts val="1800"/>
+              <a:buFont typeface="Julius Sans One"/>
+              <a:buNone/>
+              <a:defRPr sz="1800" b="0" i="0" u="none" strike="noStrike" cap="none">
+                <a:solidFill>
+                  <a:schemeClr val="dk1"/>
+                </a:solidFill>
+                <a:latin typeface="Julius Sans One"/>
+                <a:ea typeface="Julius Sans One"/>
+                <a:cs typeface="Julius Sans One"/>
+                <a:sym typeface="Julius Sans One"/>
+              </a:defRPr>
+            </a:lvl5pPr>
+            <a:lvl6pPr marR="0" lvl="5" algn="ctr" rtl="0">
+              <a:lnSpc>
+                <a:spcPct val="100000"/>
+              </a:lnSpc>
+              <a:spcBef>
+                <a:spcPts val="0"/>
+              </a:spcBef>
+              <a:spcAft>
+                <a:spcPts val="0"/>
+              </a:spcAft>
+              <a:buClr>
+                <a:schemeClr val="dk1"/>
+              </a:buClr>
+              <a:buSzPts val="1800"/>
+              <a:buFont typeface="Julius Sans One"/>
+              <a:buNone/>
+              <a:defRPr sz="1800" b="0" i="0" u="none" strike="noStrike" cap="none">
+                <a:solidFill>
+                  <a:schemeClr val="dk1"/>
+                </a:solidFill>
+                <a:latin typeface="Julius Sans One"/>
+                <a:ea typeface="Julius Sans One"/>
+                <a:cs typeface="Julius Sans One"/>
+                <a:sym typeface="Julius Sans One"/>
+              </a:defRPr>
+            </a:lvl6pPr>
+            <a:lvl7pPr marR="0" lvl="6" algn="ctr" rtl="0">
+              <a:lnSpc>
+                <a:spcPct val="100000"/>
+              </a:lnSpc>
+              <a:spcBef>
+                <a:spcPts val="0"/>
+              </a:spcBef>
+              <a:spcAft>
+                <a:spcPts val="0"/>
+              </a:spcAft>
+              <a:buClr>
+                <a:schemeClr val="dk1"/>
+              </a:buClr>
+              <a:buSzPts val="1800"/>
+              <a:buFont typeface="Julius Sans One"/>
+              <a:buNone/>
+              <a:defRPr sz="1800" b="0" i="0" u="none" strike="noStrike" cap="none">
+                <a:solidFill>
+                  <a:schemeClr val="dk1"/>
+                </a:solidFill>
+                <a:latin typeface="Julius Sans One"/>
+                <a:ea typeface="Julius Sans One"/>
+                <a:cs typeface="Julius Sans One"/>
+                <a:sym typeface="Julius Sans One"/>
+              </a:defRPr>
+            </a:lvl7pPr>
+            <a:lvl8pPr marR="0" lvl="7" algn="ctr" rtl="0">
+              <a:lnSpc>
+                <a:spcPct val="100000"/>
+              </a:lnSpc>
+              <a:spcBef>
+                <a:spcPts val="0"/>
+              </a:spcBef>
+              <a:spcAft>
+                <a:spcPts val="0"/>
+              </a:spcAft>
+              <a:buClr>
+                <a:schemeClr val="dk1"/>
+              </a:buClr>
+              <a:buSzPts val="1800"/>
+              <a:buFont typeface="Julius Sans One"/>
+              <a:buNone/>
+              <a:defRPr sz="1800" b="0" i="0" u="none" strike="noStrike" cap="none">
+                <a:solidFill>
+                  <a:schemeClr val="dk1"/>
+                </a:solidFill>
+                <a:latin typeface="Julius Sans One"/>
+                <a:ea typeface="Julius Sans One"/>
+                <a:cs typeface="Julius Sans One"/>
+                <a:sym typeface="Julius Sans One"/>
+              </a:defRPr>
+            </a:lvl8pPr>
+            <a:lvl9pPr marR="0" lvl="8" algn="ctr" rtl="0">
+              <a:lnSpc>
+                <a:spcPct val="100000"/>
+              </a:lnSpc>
+              <a:spcBef>
+                <a:spcPts val="0"/>
+              </a:spcBef>
+              <a:spcAft>
+                <a:spcPts val="0"/>
+              </a:spcAft>
+              <a:buClr>
+                <a:schemeClr val="dk1"/>
+              </a:buClr>
+              <a:buSzPts val="1800"/>
+              <a:buFont typeface="Julius Sans One"/>
+              <a:buNone/>
+              <a:defRPr sz="1800" b="0" i="0" u="none" strike="noStrike" cap="none">
+                <a:solidFill>
+                  <a:schemeClr val="dk1"/>
+                </a:solidFill>
+                <a:latin typeface="Julius Sans One"/>
+                <a:ea typeface="Julius Sans One"/>
+                <a:cs typeface="Julius Sans One"/>
+                <a:sym typeface="Julius Sans One"/>
+              </a:defRPr>
+            </a:lvl9pPr>
+          </a:lstStyle>
+          <a:p>
+            <a:r>
+              <a:rPr lang="en" dirty="0"/>
+              <a:t>06</a:t>
             </a:r>
           </a:p>
         </p:txBody>
@@ -22032,10 +23158,10 @@
       </p:sp>
       <p:sp>
         <p:nvSpPr>
-          <p:cNvPr id="12" name="Google Shape;531;p73">
+          <p:cNvPr id="4" name="Google Shape;531;p73">
             <a:extLst>
               <a:ext uri="{FF2B5EF4-FFF2-40B4-BE49-F238E27FC236}">
-                <a16:creationId xmlns:a16="http://schemas.microsoft.com/office/drawing/2014/main" id="{2BC4312E-1566-957A-B595-1F14B34951CA}"/>
+                <a16:creationId xmlns:a16="http://schemas.microsoft.com/office/drawing/2014/main" id="{6BDCC61B-0749-83A4-7601-D0E654B64F1E}"/>
               </a:ext>
             </a:extLst>
           </p:cNvPr>
@@ -22046,8 +23172,8 @@
         </p:nvSpPr>
         <p:spPr>
           <a:xfrm>
-            <a:off x="8427719" y="4710914"/>
-            <a:ext cx="716281" cy="432586"/>
+            <a:off x="7993856" y="4710914"/>
+            <a:ext cx="890594" cy="432586"/>
           </a:xfrm>
           <a:prstGeom prst="rect">
             <a:avLst/>
@@ -22309,11 +23435,11 @@
             </a:lvl9pPr>
           </a:lstStyle>
           <a:p>
-            <a:pPr marL="88900" indent="0"/>
+            <a:pPr marL="88900" indent="0" algn="r"/>
             <a:r>
               <a:rPr lang="en" dirty="0">
                 <a:solidFill>
-                  <a:schemeClr val="bg1"/>
+                  <a:schemeClr val="accent5"/>
                 </a:solidFill>
               </a:rPr>
               <a:t>3/11</a:t>
@@ -22465,15 +23591,59 @@
                                   </p:childTnLst>
                                 </p:cTn>
                               </p:par>
+                            </p:childTnLst>
+                          </p:cTn>
+                        </p:par>
+                        <p:par>
+                          <p:cTn id="14" fill="hold">
+                            <p:stCondLst>
+                              <p:cond delay="1000"/>
+                            </p:stCondLst>
+                            <p:childTnLst>
                               <p:par>
-                                <p:cTn id="14" presetID="10" presetClass="entr" presetSubtype="0" fill="hold" grpId="0" nodeType="withEffect">
+                                <p:cTn id="15" presetID="10" presetClass="entr" presetSubtype="0" fill="hold" grpId="0" nodeType="afterEffect">
                                   <p:stCondLst>
                                     <p:cond delay="0"/>
                                   </p:stCondLst>
                                   <p:childTnLst>
                                     <p:set>
                                       <p:cBhvr>
-                                        <p:cTn id="15" dur="1" fill="hold">
+                                        <p:cTn id="16" dur="1" fill="hold">
+                                          <p:stCondLst>
+                                            <p:cond delay="0"/>
+                                          </p:stCondLst>
+                                        </p:cTn>
+                                        <p:tgtEl>
+                                          <p:spTgt spid="11"/>
+                                        </p:tgtEl>
+                                        <p:attrNameLst>
+                                          <p:attrName>style.visibility</p:attrName>
+                                        </p:attrNameLst>
+                                      </p:cBhvr>
+                                      <p:to>
+                                        <p:strVal val="visible"/>
+                                      </p:to>
+                                    </p:set>
+                                    <p:animEffect transition="in" filter="fade">
+                                      <p:cBhvr>
+                                        <p:cTn id="17" dur="1000"/>
+                                        <p:tgtEl>
+                                          <p:spTgt spid="11"/>
+                                        </p:tgtEl>
+                                      </p:cBhvr>
+                                    </p:animEffect>
+                                  </p:childTnLst>
+                                </p:cTn>
+                              </p:par>
+                              <p:par>
+                                <p:cTn id="18" presetID="10" presetClass="entr" presetSubtype="0" fill="hold" grpId="0" nodeType="withEffect">
+                                  <p:stCondLst>
+                                    <p:cond delay="0"/>
+                                  </p:stCondLst>
+                                  <p:childTnLst>
+                                    <p:set>
+                                      <p:cBhvr>
+                                        <p:cTn id="19" dur="1" fill="hold">
                                           <p:stCondLst>
                                             <p:cond delay="0"/>
                                           </p:stCondLst>
@@ -22491,7 +23661,7 @@
                                     </p:set>
                                     <p:animEffect transition="in" filter="fade">
                                       <p:cBhvr>
-                                        <p:cTn id="16" dur="1000"/>
+                                        <p:cTn id="20" dur="1000"/>
                                         <p:tgtEl>
                                           <p:spTgt spid="8"/>
                                         </p:tgtEl>
@@ -22501,14 +23671,14 @@
                                 </p:cTn>
                               </p:par>
                               <p:par>
-                                <p:cTn id="17" presetID="10" presetClass="entr" presetSubtype="0" fill="hold" grpId="0" nodeType="withEffect">
+                                <p:cTn id="21" presetID="10" presetClass="entr" presetSubtype="0" fill="hold" grpId="0" nodeType="withEffect">
                                   <p:stCondLst>
                                     <p:cond delay="0"/>
                                   </p:stCondLst>
                                   <p:childTnLst>
                                     <p:set>
                                       <p:cBhvr>
-                                        <p:cTn id="18" dur="1" fill="hold">
+                                        <p:cTn id="22" dur="1" fill="hold">
                                           <p:stCondLst>
                                             <p:cond delay="0"/>
                                           </p:stCondLst>
@@ -22526,7 +23696,7 @@
                                     </p:set>
                                     <p:animEffect transition="in" filter="fade">
                                       <p:cBhvr>
-                                        <p:cTn id="19" dur="1000"/>
+                                        <p:cTn id="23" dur="1000"/>
                                         <p:tgtEl>
                                           <p:spTgt spid="9"/>
                                         </p:tgtEl>
@@ -22535,15 +23705,24 @@
                                   </p:childTnLst>
                                 </p:cTn>
                               </p:par>
+                            </p:childTnLst>
+                          </p:cTn>
+                        </p:par>
+                        <p:par>
+                          <p:cTn id="24" fill="hold">
+                            <p:stCondLst>
+                              <p:cond delay="2000"/>
+                            </p:stCondLst>
+                            <p:childTnLst>
                               <p:par>
-                                <p:cTn id="20" presetID="10" presetClass="entr" presetSubtype="0" fill="hold" grpId="0" nodeType="withEffect">
+                                <p:cTn id="25" presetID="10" presetClass="entr" presetSubtype="0" fill="hold" grpId="0" nodeType="afterEffect">
                                   <p:stCondLst>
                                     <p:cond delay="0"/>
                                   </p:stCondLst>
                                   <p:childTnLst>
                                     <p:set>
                                       <p:cBhvr>
-                                        <p:cTn id="21" dur="1" fill="hold">
+                                        <p:cTn id="26" dur="1" fill="hold">
                                           <p:stCondLst>
                                             <p:cond delay="0"/>
                                           </p:stCondLst>
@@ -22561,44 +23740,9 @@
                                     </p:set>
                                     <p:animEffect transition="in" filter="fade">
                                       <p:cBhvr>
-                                        <p:cTn id="22" dur="1000"/>
+                                        <p:cTn id="27" dur="1000"/>
                                         <p:tgtEl>
                                           <p:spTgt spid="10"/>
-                                        </p:tgtEl>
-                                      </p:cBhvr>
-                                    </p:animEffect>
-                                  </p:childTnLst>
-                                </p:cTn>
-                              </p:par>
-                              <p:par>
-                                <p:cTn id="23" presetID="10" presetClass="entr" presetSubtype="0" fill="hold" grpId="0" nodeType="withEffect">
-                                  <p:stCondLst>
-                                    <p:cond delay="0"/>
-                                  </p:stCondLst>
-                                  <p:childTnLst>
-                                    <p:set>
-                                      <p:cBhvr>
-                                        <p:cTn id="24" dur="1" fill="hold">
-                                          <p:stCondLst>
-                                            <p:cond delay="0"/>
-                                          </p:stCondLst>
-                                        </p:cTn>
-                                        <p:tgtEl>
-                                          <p:spTgt spid="11"/>
-                                        </p:tgtEl>
-                                        <p:attrNameLst>
-                                          <p:attrName>style.visibility</p:attrName>
-                                        </p:attrNameLst>
-                                      </p:cBhvr>
-                                      <p:to>
-                                        <p:strVal val="visible"/>
-                                      </p:to>
-                                    </p:set>
-                                    <p:animEffect transition="in" filter="fade">
-                                      <p:cBhvr>
-                                        <p:cTn id="25" dur="1000"/>
-                                        <p:tgtEl>
-                                          <p:spTgt spid="11"/>
                                         </p:tgtEl>
                                       </p:cBhvr>
                                     </p:animEffect>
@@ -22661,6 +23805,36 @@
           <a:chExt cx="0" cy="0"/>
         </a:xfrm>
       </p:grpSpPr>
+      <p:pic>
+        <p:nvPicPr>
+          <p:cNvPr id="4" name="Imagem 3" descr="Uma imagem com píxel, Gráficos&#10;&#10;Descrição gerada automaticamente">
+            <a:extLst>
+              <a:ext uri="{FF2B5EF4-FFF2-40B4-BE49-F238E27FC236}">
+                <a16:creationId xmlns:a16="http://schemas.microsoft.com/office/drawing/2014/main" id="{997116D6-2F8A-60CE-2E0D-F21B19A198CB}"/>
+              </a:ext>
+            </a:extLst>
+          </p:cNvPr>
+          <p:cNvPicPr>
+            <a:picLocks noChangeAspect="1"/>
+          </p:cNvPicPr>
+          <p:nvPr/>
+        </p:nvPicPr>
+        <p:blipFill>
+          <a:blip r:embed="rId2"/>
+          <a:stretch>
+            <a:fillRect/>
+          </a:stretch>
+        </p:blipFill>
+        <p:spPr>
+          <a:xfrm>
+            <a:off x="4476137" y="1732936"/>
+            <a:ext cx="4547419" cy="3410564"/>
+          </a:xfrm>
+          <a:prstGeom prst="rect">
+            <a:avLst/>
+          </a:prstGeom>
+        </p:spPr>
+      </p:pic>
       <p:sp>
         <p:nvSpPr>
           <p:cNvPr id="2" name="Subtítulo 1">
@@ -22760,7 +23934,7 @@
           <a:lstStyle/>
           <a:p>
             <a:r>
-              <a:rPr lang="en-US"/>
+              <a:rPr lang="en-US" dirty="0"/>
               <a:t>Objectives</a:t>
             </a:r>
           </a:p>
@@ -22768,10 +23942,10 @@
       </p:sp>
       <p:sp>
         <p:nvSpPr>
-          <p:cNvPr id="6" name="Google Shape;531;p73">
+          <p:cNvPr id="7" name="Google Shape;531;p73">
             <a:extLst>
               <a:ext uri="{FF2B5EF4-FFF2-40B4-BE49-F238E27FC236}">
-                <a16:creationId xmlns:a16="http://schemas.microsoft.com/office/drawing/2014/main" id="{F40CE150-C062-427E-D6A3-E216F4457C67}"/>
+                <a16:creationId xmlns:a16="http://schemas.microsoft.com/office/drawing/2014/main" id="{C58A6F2A-34D2-37F3-524B-A3A5078D1028}"/>
               </a:ext>
             </a:extLst>
           </p:cNvPr>
@@ -22782,8 +23956,8 @@
         </p:nvSpPr>
         <p:spPr>
           <a:xfrm>
-            <a:off x="8427719" y="4710914"/>
-            <a:ext cx="716281" cy="432586"/>
+            <a:off x="7993856" y="4710914"/>
+            <a:ext cx="890594" cy="432586"/>
           </a:xfrm>
           <a:prstGeom prst="rect">
             <a:avLst/>
@@ -23045,7 +24219,7 @@
             </a:lvl9pPr>
           </a:lstStyle>
           <a:p>
-            <a:pPr marL="88900" indent="0"/>
+            <a:pPr marL="88900" indent="0" algn="r"/>
             <a:r>
               <a:rPr lang="en" dirty="0"/>
               <a:t>4/11</a:t>
@@ -23053,36 +24227,6 @@
           </a:p>
         </p:txBody>
       </p:sp>
-      <p:pic>
-        <p:nvPicPr>
-          <p:cNvPr id="19" name="Imagem 18" descr="Uma imagem com captura de ecrã, Jogo de pc, Software de multimédia, jogo&#10;&#10;Descrição gerada automaticamente">
-            <a:extLst>
-              <a:ext uri="{FF2B5EF4-FFF2-40B4-BE49-F238E27FC236}">
-                <a16:creationId xmlns:a16="http://schemas.microsoft.com/office/drawing/2014/main" id="{86A39810-3D1A-2C29-441A-D679C9767A13}"/>
-              </a:ext>
-            </a:extLst>
-          </p:cNvPr>
-          <p:cNvPicPr>
-            <a:picLocks noChangeAspect="1"/>
-          </p:cNvPicPr>
-          <p:nvPr/>
-        </p:nvPicPr>
-        <p:blipFill>
-          <a:blip r:embed="rId2"/>
-          <a:stretch>
-            <a:fillRect/>
-          </a:stretch>
-        </p:blipFill>
-        <p:spPr>
-          <a:xfrm>
-            <a:off x="4371996" y="2096934"/>
-            <a:ext cx="4772004" cy="2277097"/>
-          </a:xfrm>
-          <a:prstGeom prst="rect">
-            <a:avLst/>
-          </a:prstGeom>
-        </p:spPr>
-      </p:pic>
     </p:spTree>
     <p:extLst>
       <p:ext uri="{BB962C8B-B14F-4D97-AF65-F5344CB8AC3E}">
@@ -23284,6 +24428,96 @@
                             </p:childTnLst>
                           </p:cTn>
                         </p:par>
+                        <p:par>
+                          <p:cTn id="15" fill="hold">
+                            <p:stCondLst>
+                              <p:cond delay="750"/>
+                            </p:stCondLst>
+                            <p:childTnLst>
+                              <p:par>
+                                <p:cTn id="16" presetID="42" presetClass="entr" presetSubtype="0" fill="hold" nodeType="afterEffect">
+                                  <p:stCondLst>
+                                    <p:cond delay="0"/>
+                                  </p:stCondLst>
+                                  <p:childTnLst>
+                                    <p:set>
+                                      <p:cBhvr>
+                                        <p:cTn id="17" dur="1" fill="hold">
+                                          <p:stCondLst>
+                                            <p:cond delay="0"/>
+                                          </p:stCondLst>
+                                        </p:cTn>
+                                        <p:tgtEl>
+                                          <p:spTgt spid="4"/>
+                                        </p:tgtEl>
+                                        <p:attrNameLst>
+                                          <p:attrName>style.visibility</p:attrName>
+                                        </p:attrNameLst>
+                                      </p:cBhvr>
+                                      <p:to>
+                                        <p:strVal val="visible"/>
+                                      </p:to>
+                                    </p:set>
+                                    <p:animEffect transition="in" filter="fade">
+                                      <p:cBhvr>
+                                        <p:cTn id="18" dur="750"/>
+                                        <p:tgtEl>
+                                          <p:spTgt spid="4"/>
+                                        </p:tgtEl>
+                                      </p:cBhvr>
+                                    </p:animEffect>
+                                    <p:anim calcmode="lin" valueType="num">
+                                      <p:cBhvr>
+                                        <p:cTn id="19" dur="750" fill="hold"/>
+                                        <p:tgtEl>
+                                          <p:spTgt spid="4"/>
+                                        </p:tgtEl>
+                                        <p:attrNameLst>
+                                          <p:attrName>ppt_x</p:attrName>
+                                        </p:attrNameLst>
+                                      </p:cBhvr>
+                                      <p:tavLst>
+                                        <p:tav tm="0">
+                                          <p:val>
+                                            <p:strVal val="#ppt_x"/>
+                                          </p:val>
+                                        </p:tav>
+                                        <p:tav tm="100000">
+                                          <p:val>
+                                            <p:strVal val="#ppt_x"/>
+                                          </p:val>
+                                        </p:tav>
+                                      </p:tavLst>
+                                    </p:anim>
+                                    <p:anim calcmode="lin" valueType="num">
+                                      <p:cBhvr>
+                                        <p:cTn id="20" dur="750" fill="hold"/>
+                                        <p:tgtEl>
+                                          <p:spTgt spid="4"/>
+                                        </p:tgtEl>
+                                        <p:attrNameLst>
+                                          <p:attrName>ppt_y</p:attrName>
+                                        </p:attrNameLst>
+                                      </p:cBhvr>
+                                      <p:tavLst>
+                                        <p:tav tm="0">
+                                          <p:val>
+                                            <p:strVal val="#ppt_y+.1"/>
+                                          </p:val>
+                                        </p:tav>
+                                        <p:tav tm="100000">
+                                          <p:val>
+                                            <p:strVal val="#ppt_y"/>
+                                          </p:val>
+                                        </p:tav>
+                                      </p:tavLst>
+                                    </p:anim>
+                                  </p:childTnLst>
+                                </p:cTn>
+                              </p:par>
+                            </p:childTnLst>
+                          </p:cTn>
+                        </p:par>
                       </p:childTnLst>
                     </p:cTn>
                   </p:par>
@@ -23522,293 +24756,6 @@
           </a:p>
         </p:txBody>
       </p:sp>
-      <p:sp>
-        <p:nvSpPr>
-          <p:cNvPr id="14" name="Google Shape;531;p73">
-            <a:extLst>
-              <a:ext uri="{FF2B5EF4-FFF2-40B4-BE49-F238E27FC236}">
-                <a16:creationId xmlns:a16="http://schemas.microsoft.com/office/drawing/2014/main" id="{9828323C-6E31-8BBA-52FE-751DA28C403F}"/>
-              </a:ext>
-            </a:extLst>
-          </p:cNvPr>
-          <p:cNvSpPr txBox="1">
-            <a:spLocks/>
-          </p:cNvSpPr>
-          <p:nvPr/>
-        </p:nvSpPr>
-        <p:spPr>
-          <a:xfrm>
-            <a:off x="8427719" y="4710914"/>
-            <a:ext cx="716281" cy="432586"/>
-          </a:xfrm>
-          <a:prstGeom prst="rect">
-            <a:avLst/>
-          </a:prstGeom>
-          <a:noFill/>
-          <a:ln>
-            <a:noFill/>
-          </a:ln>
-        </p:spPr>
-        <p:txBody>
-          <a:bodyPr spcFirstLastPara="1" wrap="square" lIns="91425" tIns="91425" rIns="91425" bIns="91425" numCol="1" anchor="t" anchorCtr="0">
-            <a:noAutofit/>
-          </a:bodyPr>
-          <a:lstStyle>
-            <a:defPPr marR="0" lvl="0" algn="l" rtl="0">
-              <a:lnSpc>
-                <a:spcPct val="100000"/>
-              </a:lnSpc>
-              <a:spcBef>
-                <a:spcPts val="0"/>
-              </a:spcBef>
-              <a:spcAft>
-                <a:spcPts val="0"/>
-              </a:spcAft>
-            </a:defPPr>
-            <a:lvl1pPr marL="457200" marR="0" lvl="0" indent="-317500" algn="l" rtl="0">
-              <a:lnSpc>
-                <a:spcPct val="100000"/>
-              </a:lnSpc>
-              <a:spcBef>
-                <a:spcPts val="0"/>
-              </a:spcBef>
-              <a:spcAft>
-                <a:spcPts val="0"/>
-              </a:spcAft>
-              <a:buClr>
-                <a:schemeClr val="dk1"/>
-              </a:buClr>
-              <a:buSzPts val="1400"/>
-              <a:buFont typeface="Didact Gothic"/>
-              <a:buNone/>
-              <a:defRPr sz="1400" b="0" i="0" u="none" strike="noStrike" cap="none">
-                <a:solidFill>
-                  <a:schemeClr val="dk1"/>
-                </a:solidFill>
-                <a:latin typeface="Didact Gothic"/>
-                <a:ea typeface="Didact Gothic"/>
-                <a:cs typeface="Didact Gothic"/>
-                <a:sym typeface="Didact Gothic"/>
-              </a:defRPr>
-            </a:lvl1pPr>
-            <a:lvl2pPr marL="914400" marR="0" lvl="1" indent="-317500" algn="l" rtl="0">
-              <a:lnSpc>
-                <a:spcPct val="115000"/>
-              </a:lnSpc>
-              <a:spcBef>
-                <a:spcPts val="0"/>
-              </a:spcBef>
-              <a:spcAft>
-                <a:spcPts val="0"/>
-              </a:spcAft>
-              <a:buClr>
-                <a:schemeClr val="dk1"/>
-              </a:buClr>
-              <a:buSzPts val="1400"/>
-              <a:buFont typeface="Didact Gothic"/>
-              <a:buNone/>
-              <a:defRPr sz="1400" b="0" i="0" u="none" strike="noStrike" cap="none">
-                <a:solidFill>
-                  <a:schemeClr val="dk1"/>
-                </a:solidFill>
-                <a:latin typeface="Didact Gothic"/>
-                <a:ea typeface="Didact Gothic"/>
-                <a:cs typeface="Didact Gothic"/>
-                <a:sym typeface="Didact Gothic"/>
-              </a:defRPr>
-            </a:lvl2pPr>
-            <a:lvl3pPr marL="1371600" marR="0" lvl="2" indent="-317500" algn="l" rtl="0">
-              <a:lnSpc>
-                <a:spcPct val="115000"/>
-              </a:lnSpc>
-              <a:spcBef>
-                <a:spcPts val="1600"/>
-              </a:spcBef>
-              <a:spcAft>
-                <a:spcPts val="0"/>
-              </a:spcAft>
-              <a:buClr>
-                <a:schemeClr val="dk1"/>
-              </a:buClr>
-              <a:buSzPts val="1400"/>
-              <a:buFont typeface="Didact Gothic"/>
-              <a:buNone/>
-              <a:defRPr sz="1400" b="0" i="0" u="none" strike="noStrike" cap="none">
-                <a:solidFill>
-                  <a:schemeClr val="dk1"/>
-                </a:solidFill>
-                <a:latin typeface="Didact Gothic"/>
-                <a:ea typeface="Didact Gothic"/>
-                <a:cs typeface="Didact Gothic"/>
-                <a:sym typeface="Didact Gothic"/>
-              </a:defRPr>
-            </a:lvl3pPr>
-            <a:lvl4pPr marL="1828800" marR="0" lvl="3" indent="-317500" algn="l" rtl="0">
-              <a:lnSpc>
-                <a:spcPct val="115000"/>
-              </a:lnSpc>
-              <a:spcBef>
-                <a:spcPts val="1600"/>
-              </a:spcBef>
-              <a:spcAft>
-                <a:spcPts val="0"/>
-              </a:spcAft>
-              <a:buClr>
-                <a:schemeClr val="dk1"/>
-              </a:buClr>
-              <a:buSzPts val="1400"/>
-              <a:buFont typeface="Didact Gothic"/>
-              <a:buNone/>
-              <a:defRPr sz="1400" b="0" i="0" u="none" strike="noStrike" cap="none">
-                <a:solidFill>
-                  <a:schemeClr val="dk1"/>
-                </a:solidFill>
-                <a:latin typeface="Didact Gothic"/>
-                <a:ea typeface="Didact Gothic"/>
-                <a:cs typeface="Didact Gothic"/>
-                <a:sym typeface="Didact Gothic"/>
-              </a:defRPr>
-            </a:lvl4pPr>
-            <a:lvl5pPr marL="2286000" marR="0" lvl="4" indent="-317500" algn="l" rtl="0">
-              <a:lnSpc>
-                <a:spcPct val="115000"/>
-              </a:lnSpc>
-              <a:spcBef>
-                <a:spcPts val="1600"/>
-              </a:spcBef>
-              <a:spcAft>
-                <a:spcPts val="0"/>
-              </a:spcAft>
-              <a:buClr>
-                <a:schemeClr val="dk1"/>
-              </a:buClr>
-              <a:buSzPts val="1400"/>
-              <a:buFont typeface="Didact Gothic"/>
-              <a:buNone/>
-              <a:defRPr sz="1400" b="0" i="0" u="none" strike="noStrike" cap="none">
-                <a:solidFill>
-                  <a:schemeClr val="dk1"/>
-                </a:solidFill>
-                <a:latin typeface="Didact Gothic"/>
-                <a:ea typeface="Didact Gothic"/>
-                <a:cs typeface="Didact Gothic"/>
-                <a:sym typeface="Didact Gothic"/>
-              </a:defRPr>
-            </a:lvl5pPr>
-            <a:lvl6pPr marL="2743200" marR="0" lvl="5" indent="-317500" algn="l" rtl="0">
-              <a:lnSpc>
-                <a:spcPct val="115000"/>
-              </a:lnSpc>
-              <a:spcBef>
-                <a:spcPts val="1600"/>
-              </a:spcBef>
-              <a:spcAft>
-                <a:spcPts val="0"/>
-              </a:spcAft>
-              <a:buClr>
-                <a:schemeClr val="dk1"/>
-              </a:buClr>
-              <a:buSzPts val="1400"/>
-              <a:buFont typeface="Didact Gothic"/>
-              <a:buNone/>
-              <a:defRPr sz="1400" b="0" i="0" u="none" strike="noStrike" cap="none">
-                <a:solidFill>
-                  <a:schemeClr val="dk1"/>
-                </a:solidFill>
-                <a:latin typeface="Didact Gothic"/>
-                <a:ea typeface="Didact Gothic"/>
-                <a:cs typeface="Didact Gothic"/>
-                <a:sym typeface="Didact Gothic"/>
-              </a:defRPr>
-            </a:lvl6pPr>
-            <a:lvl7pPr marL="3200400" marR="0" lvl="6" indent="-317500" algn="l" rtl="0">
-              <a:lnSpc>
-                <a:spcPct val="115000"/>
-              </a:lnSpc>
-              <a:spcBef>
-                <a:spcPts val="1600"/>
-              </a:spcBef>
-              <a:spcAft>
-                <a:spcPts val="0"/>
-              </a:spcAft>
-              <a:buClr>
-                <a:schemeClr val="dk1"/>
-              </a:buClr>
-              <a:buSzPts val="1400"/>
-              <a:buFont typeface="Didact Gothic"/>
-              <a:buNone/>
-              <a:defRPr sz="1400" b="0" i="0" u="none" strike="noStrike" cap="none">
-                <a:solidFill>
-                  <a:schemeClr val="dk1"/>
-                </a:solidFill>
-                <a:latin typeface="Didact Gothic"/>
-                <a:ea typeface="Didact Gothic"/>
-                <a:cs typeface="Didact Gothic"/>
-                <a:sym typeface="Didact Gothic"/>
-              </a:defRPr>
-            </a:lvl7pPr>
-            <a:lvl8pPr marL="3657600" marR="0" lvl="7" indent="-317500" algn="l" rtl="0">
-              <a:lnSpc>
-                <a:spcPct val="115000"/>
-              </a:lnSpc>
-              <a:spcBef>
-                <a:spcPts val="1600"/>
-              </a:spcBef>
-              <a:spcAft>
-                <a:spcPts val="0"/>
-              </a:spcAft>
-              <a:buClr>
-                <a:schemeClr val="dk1"/>
-              </a:buClr>
-              <a:buSzPts val="1400"/>
-              <a:buFont typeface="Didact Gothic"/>
-              <a:buNone/>
-              <a:defRPr sz="1400" b="0" i="0" u="none" strike="noStrike" cap="none">
-                <a:solidFill>
-                  <a:schemeClr val="dk1"/>
-                </a:solidFill>
-                <a:latin typeface="Didact Gothic"/>
-                <a:ea typeface="Didact Gothic"/>
-                <a:cs typeface="Didact Gothic"/>
-                <a:sym typeface="Didact Gothic"/>
-              </a:defRPr>
-            </a:lvl8pPr>
-            <a:lvl9pPr marL="4114800" marR="0" lvl="8" indent="-317500" algn="l" rtl="0">
-              <a:lnSpc>
-                <a:spcPct val="115000"/>
-              </a:lnSpc>
-              <a:spcBef>
-                <a:spcPts val="1600"/>
-              </a:spcBef>
-              <a:spcAft>
-                <a:spcPts val="1600"/>
-              </a:spcAft>
-              <a:buClr>
-                <a:schemeClr val="dk1"/>
-              </a:buClr>
-              <a:buSzPts val="1400"/>
-              <a:buFont typeface="Didact Gothic"/>
-              <a:buNone/>
-              <a:defRPr sz="1400" b="0" i="0" u="none" strike="noStrike" cap="none">
-                <a:solidFill>
-                  <a:schemeClr val="dk1"/>
-                </a:solidFill>
-                <a:latin typeface="Didact Gothic"/>
-                <a:ea typeface="Didact Gothic"/>
-                <a:cs typeface="Didact Gothic"/>
-                <a:sym typeface="Didact Gothic"/>
-              </a:defRPr>
-            </a:lvl9pPr>
-          </a:lstStyle>
-          <a:p>
-            <a:pPr marL="88900" indent="0"/>
-            <a:r>
-              <a:rPr lang="en" dirty="0"/>
-              <a:t>5/11</a:t>
-            </a:r>
-          </a:p>
-        </p:txBody>
-      </p:sp>
       <p:pic>
         <p:nvPicPr>
           <p:cNvPr id="20" name="Imagem 19">
@@ -23858,8 +24805,8 @@
           <a:stretch/>
         </p:blipFill>
         <p:spPr>
-          <a:xfrm rot="1303896">
-            <a:off x="2321226" y="417965"/>
+          <a:xfrm rot="967889">
+            <a:off x="2420832" y="466412"/>
             <a:ext cx="1351619" cy="1802158"/>
           </a:xfrm>
           <a:prstGeom prst="rect">
@@ -23896,6 +24843,293 @@
           </a:prstGeom>
         </p:spPr>
       </p:pic>
+      <p:sp>
+        <p:nvSpPr>
+          <p:cNvPr id="2" name="Google Shape;531;p73">
+            <a:extLst>
+              <a:ext uri="{FF2B5EF4-FFF2-40B4-BE49-F238E27FC236}">
+                <a16:creationId xmlns:a16="http://schemas.microsoft.com/office/drawing/2014/main" id="{C9C938F6-1103-05BF-9257-ECA48C507C21}"/>
+              </a:ext>
+            </a:extLst>
+          </p:cNvPr>
+          <p:cNvSpPr txBox="1">
+            <a:spLocks/>
+          </p:cNvSpPr>
+          <p:nvPr/>
+        </p:nvSpPr>
+        <p:spPr>
+          <a:xfrm>
+            <a:off x="7993856" y="4710914"/>
+            <a:ext cx="890594" cy="432586"/>
+          </a:xfrm>
+          <a:prstGeom prst="rect">
+            <a:avLst/>
+          </a:prstGeom>
+          <a:noFill/>
+          <a:ln>
+            <a:noFill/>
+          </a:ln>
+        </p:spPr>
+        <p:txBody>
+          <a:bodyPr spcFirstLastPara="1" wrap="square" lIns="91425" tIns="91425" rIns="91425" bIns="91425" numCol="1" anchor="t" anchorCtr="0">
+            <a:noAutofit/>
+          </a:bodyPr>
+          <a:lstStyle>
+            <a:defPPr marR="0" lvl="0" algn="l" rtl="0">
+              <a:lnSpc>
+                <a:spcPct val="100000"/>
+              </a:lnSpc>
+              <a:spcBef>
+                <a:spcPts val="0"/>
+              </a:spcBef>
+              <a:spcAft>
+                <a:spcPts val="0"/>
+              </a:spcAft>
+            </a:defPPr>
+            <a:lvl1pPr marL="457200" marR="0" lvl="0" indent="-317500" algn="l" rtl="0">
+              <a:lnSpc>
+                <a:spcPct val="100000"/>
+              </a:lnSpc>
+              <a:spcBef>
+                <a:spcPts val="0"/>
+              </a:spcBef>
+              <a:spcAft>
+                <a:spcPts val="0"/>
+              </a:spcAft>
+              <a:buClr>
+                <a:schemeClr val="dk1"/>
+              </a:buClr>
+              <a:buSzPts val="1400"/>
+              <a:buFont typeface="Didact Gothic"/>
+              <a:buNone/>
+              <a:defRPr sz="1400" b="0" i="0" u="none" strike="noStrike" cap="none">
+                <a:solidFill>
+                  <a:schemeClr val="dk1"/>
+                </a:solidFill>
+                <a:latin typeface="Didact Gothic"/>
+                <a:ea typeface="Didact Gothic"/>
+                <a:cs typeface="Didact Gothic"/>
+                <a:sym typeface="Didact Gothic"/>
+              </a:defRPr>
+            </a:lvl1pPr>
+            <a:lvl2pPr marL="914400" marR="0" lvl="1" indent="-317500" algn="l" rtl="0">
+              <a:lnSpc>
+                <a:spcPct val="115000"/>
+              </a:lnSpc>
+              <a:spcBef>
+                <a:spcPts val="0"/>
+              </a:spcBef>
+              <a:spcAft>
+                <a:spcPts val="0"/>
+              </a:spcAft>
+              <a:buClr>
+                <a:schemeClr val="dk1"/>
+              </a:buClr>
+              <a:buSzPts val="1400"/>
+              <a:buFont typeface="Didact Gothic"/>
+              <a:buNone/>
+              <a:defRPr sz="1400" b="0" i="0" u="none" strike="noStrike" cap="none">
+                <a:solidFill>
+                  <a:schemeClr val="dk1"/>
+                </a:solidFill>
+                <a:latin typeface="Didact Gothic"/>
+                <a:ea typeface="Didact Gothic"/>
+                <a:cs typeface="Didact Gothic"/>
+                <a:sym typeface="Didact Gothic"/>
+              </a:defRPr>
+            </a:lvl2pPr>
+            <a:lvl3pPr marL="1371600" marR="0" lvl="2" indent="-317500" algn="l" rtl="0">
+              <a:lnSpc>
+                <a:spcPct val="115000"/>
+              </a:lnSpc>
+              <a:spcBef>
+                <a:spcPts val="1600"/>
+              </a:spcBef>
+              <a:spcAft>
+                <a:spcPts val="0"/>
+              </a:spcAft>
+              <a:buClr>
+                <a:schemeClr val="dk1"/>
+              </a:buClr>
+              <a:buSzPts val="1400"/>
+              <a:buFont typeface="Didact Gothic"/>
+              <a:buNone/>
+              <a:defRPr sz="1400" b="0" i="0" u="none" strike="noStrike" cap="none">
+                <a:solidFill>
+                  <a:schemeClr val="dk1"/>
+                </a:solidFill>
+                <a:latin typeface="Didact Gothic"/>
+                <a:ea typeface="Didact Gothic"/>
+                <a:cs typeface="Didact Gothic"/>
+                <a:sym typeface="Didact Gothic"/>
+              </a:defRPr>
+            </a:lvl3pPr>
+            <a:lvl4pPr marL="1828800" marR="0" lvl="3" indent="-317500" algn="l" rtl="0">
+              <a:lnSpc>
+                <a:spcPct val="115000"/>
+              </a:lnSpc>
+              <a:spcBef>
+                <a:spcPts val="1600"/>
+              </a:spcBef>
+              <a:spcAft>
+                <a:spcPts val="0"/>
+              </a:spcAft>
+              <a:buClr>
+                <a:schemeClr val="dk1"/>
+              </a:buClr>
+              <a:buSzPts val="1400"/>
+              <a:buFont typeface="Didact Gothic"/>
+              <a:buNone/>
+              <a:defRPr sz="1400" b="0" i="0" u="none" strike="noStrike" cap="none">
+                <a:solidFill>
+                  <a:schemeClr val="dk1"/>
+                </a:solidFill>
+                <a:latin typeface="Didact Gothic"/>
+                <a:ea typeface="Didact Gothic"/>
+                <a:cs typeface="Didact Gothic"/>
+                <a:sym typeface="Didact Gothic"/>
+              </a:defRPr>
+            </a:lvl4pPr>
+            <a:lvl5pPr marL="2286000" marR="0" lvl="4" indent="-317500" algn="l" rtl="0">
+              <a:lnSpc>
+                <a:spcPct val="115000"/>
+              </a:lnSpc>
+              <a:spcBef>
+                <a:spcPts val="1600"/>
+              </a:spcBef>
+              <a:spcAft>
+                <a:spcPts val="0"/>
+              </a:spcAft>
+              <a:buClr>
+                <a:schemeClr val="dk1"/>
+              </a:buClr>
+              <a:buSzPts val="1400"/>
+              <a:buFont typeface="Didact Gothic"/>
+              <a:buNone/>
+              <a:defRPr sz="1400" b="0" i="0" u="none" strike="noStrike" cap="none">
+                <a:solidFill>
+                  <a:schemeClr val="dk1"/>
+                </a:solidFill>
+                <a:latin typeface="Didact Gothic"/>
+                <a:ea typeface="Didact Gothic"/>
+                <a:cs typeface="Didact Gothic"/>
+                <a:sym typeface="Didact Gothic"/>
+              </a:defRPr>
+            </a:lvl5pPr>
+            <a:lvl6pPr marL="2743200" marR="0" lvl="5" indent="-317500" algn="l" rtl="0">
+              <a:lnSpc>
+                <a:spcPct val="115000"/>
+              </a:lnSpc>
+              <a:spcBef>
+                <a:spcPts val="1600"/>
+              </a:spcBef>
+              <a:spcAft>
+                <a:spcPts val="0"/>
+              </a:spcAft>
+              <a:buClr>
+                <a:schemeClr val="dk1"/>
+              </a:buClr>
+              <a:buSzPts val="1400"/>
+              <a:buFont typeface="Didact Gothic"/>
+              <a:buNone/>
+              <a:defRPr sz="1400" b="0" i="0" u="none" strike="noStrike" cap="none">
+                <a:solidFill>
+                  <a:schemeClr val="dk1"/>
+                </a:solidFill>
+                <a:latin typeface="Didact Gothic"/>
+                <a:ea typeface="Didact Gothic"/>
+                <a:cs typeface="Didact Gothic"/>
+                <a:sym typeface="Didact Gothic"/>
+              </a:defRPr>
+            </a:lvl6pPr>
+            <a:lvl7pPr marL="3200400" marR="0" lvl="6" indent="-317500" algn="l" rtl="0">
+              <a:lnSpc>
+                <a:spcPct val="115000"/>
+              </a:lnSpc>
+              <a:spcBef>
+                <a:spcPts val="1600"/>
+              </a:spcBef>
+              <a:spcAft>
+                <a:spcPts val="0"/>
+              </a:spcAft>
+              <a:buClr>
+                <a:schemeClr val="dk1"/>
+              </a:buClr>
+              <a:buSzPts val="1400"/>
+              <a:buFont typeface="Didact Gothic"/>
+              <a:buNone/>
+              <a:defRPr sz="1400" b="0" i="0" u="none" strike="noStrike" cap="none">
+                <a:solidFill>
+                  <a:schemeClr val="dk1"/>
+                </a:solidFill>
+                <a:latin typeface="Didact Gothic"/>
+                <a:ea typeface="Didact Gothic"/>
+                <a:cs typeface="Didact Gothic"/>
+                <a:sym typeface="Didact Gothic"/>
+              </a:defRPr>
+            </a:lvl7pPr>
+            <a:lvl8pPr marL="3657600" marR="0" lvl="7" indent="-317500" algn="l" rtl="0">
+              <a:lnSpc>
+                <a:spcPct val="115000"/>
+              </a:lnSpc>
+              <a:spcBef>
+                <a:spcPts val="1600"/>
+              </a:spcBef>
+              <a:spcAft>
+                <a:spcPts val="0"/>
+              </a:spcAft>
+              <a:buClr>
+                <a:schemeClr val="dk1"/>
+              </a:buClr>
+              <a:buSzPts val="1400"/>
+              <a:buFont typeface="Didact Gothic"/>
+              <a:buNone/>
+              <a:defRPr sz="1400" b="0" i="0" u="none" strike="noStrike" cap="none">
+                <a:solidFill>
+                  <a:schemeClr val="dk1"/>
+                </a:solidFill>
+                <a:latin typeface="Didact Gothic"/>
+                <a:ea typeface="Didact Gothic"/>
+                <a:cs typeface="Didact Gothic"/>
+                <a:sym typeface="Didact Gothic"/>
+              </a:defRPr>
+            </a:lvl8pPr>
+            <a:lvl9pPr marL="4114800" marR="0" lvl="8" indent="-317500" algn="l" rtl="0">
+              <a:lnSpc>
+                <a:spcPct val="115000"/>
+              </a:lnSpc>
+              <a:spcBef>
+                <a:spcPts val="1600"/>
+              </a:spcBef>
+              <a:spcAft>
+                <a:spcPts val="1600"/>
+              </a:spcAft>
+              <a:buClr>
+                <a:schemeClr val="dk1"/>
+              </a:buClr>
+              <a:buSzPts val="1400"/>
+              <a:buFont typeface="Didact Gothic"/>
+              <a:buNone/>
+              <a:defRPr sz="1400" b="0" i="0" u="none" strike="noStrike" cap="none">
+                <a:solidFill>
+                  <a:schemeClr val="dk1"/>
+                </a:solidFill>
+                <a:latin typeface="Didact Gothic"/>
+                <a:ea typeface="Didact Gothic"/>
+                <a:cs typeface="Didact Gothic"/>
+                <a:sym typeface="Didact Gothic"/>
+              </a:defRPr>
+            </a:lvl9pPr>
+          </a:lstStyle>
+          <a:p>
+            <a:pPr marL="88900" indent="0" algn="r"/>
+            <a:r>
+              <a:rPr lang="en" dirty="0"/>
+              <a:t>5/11</a:t>
+            </a:r>
+          </a:p>
+        </p:txBody>
+      </p:sp>
     </p:spTree>
     <p:extLst>
       <p:ext uri="{BB962C8B-B14F-4D97-AF65-F5344CB8AC3E}">
@@ -24097,6 +25331,456 @@
                             </p:childTnLst>
                           </p:cTn>
                         </p:par>
+                        <p:par>
+                          <p:cTn id="15" fill="hold">
+                            <p:stCondLst>
+                              <p:cond delay="750"/>
+                            </p:stCondLst>
+                            <p:childTnLst>
+                              <p:par>
+                                <p:cTn id="16" presetID="42" presetClass="entr" presetSubtype="0" fill="hold" nodeType="afterEffect">
+                                  <p:stCondLst>
+                                    <p:cond delay="0"/>
+                                  </p:stCondLst>
+                                  <p:childTnLst>
+                                    <p:set>
+                                      <p:cBhvr>
+                                        <p:cTn id="17" dur="1" fill="hold">
+                                          <p:stCondLst>
+                                            <p:cond delay="0"/>
+                                          </p:stCondLst>
+                                        </p:cTn>
+                                        <p:tgtEl>
+                                          <p:spTgt spid="23"/>
+                                        </p:tgtEl>
+                                        <p:attrNameLst>
+                                          <p:attrName>style.visibility</p:attrName>
+                                        </p:attrNameLst>
+                                      </p:cBhvr>
+                                      <p:to>
+                                        <p:strVal val="visible"/>
+                                      </p:to>
+                                    </p:set>
+                                    <p:animEffect transition="in" filter="fade">
+                                      <p:cBhvr>
+                                        <p:cTn id="18" dur="750"/>
+                                        <p:tgtEl>
+                                          <p:spTgt spid="23"/>
+                                        </p:tgtEl>
+                                      </p:cBhvr>
+                                    </p:animEffect>
+                                    <p:anim calcmode="lin" valueType="num">
+                                      <p:cBhvr>
+                                        <p:cTn id="19" dur="750" fill="hold"/>
+                                        <p:tgtEl>
+                                          <p:spTgt spid="23"/>
+                                        </p:tgtEl>
+                                        <p:attrNameLst>
+                                          <p:attrName>ppt_x</p:attrName>
+                                        </p:attrNameLst>
+                                      </p:cBhvr>
+                                      <p:tavLst>
+                                        <p:tav tm="0">
+                                          <p:val>
+                                            <p:strVal val="#ppt_x"/>
+                                          </p:val>
+                                        </p:tav>
+                                        <p:tav tm="100000">
+                                          <p:val>
+                                            <p:strVal val="#ppt_x"/>
+                                          </p:val>
+                                        </p:tav>
+                                      </p:tavLst>
+                                    </p:anim>
+                                    <p:anim calcmode="lin" valueType="num">
+                                      <p:cBhvr>
+                                        <p:cTn id="20" dur="750" fill="hold"/>
+                                        <p:tgtEl>
+                                          <p:spTgt spid="23"/>
+                                        </p:tgtEl>
+                                        <p:attrNameLst>
+                                          <p:attrName>ppt_y</p:attrName>
+                                        </p:attrNameLst>
+                                      </p:cBhvr>
+                                      <p:tavLst>
+                                        <p:tav tm="0">
+                                          <p:val>
+                                            <p:strVal val="#ppt_y+.1"/>
+                                          </p:val>
+                                        </p:tav>
+                                        <p:tav tm="100000">
+                                          <p:val>
+                                            <p:strVal val="#ppt_y"/>
+                                          </p:val>
+                                        </p:tav>
+                                      </p:tavLst>
+                                    </p:anim>
+                                  </p:childTnLst>
+                                </p:cTn>
+                              </p:par>
+                            </p:childTnLst>
+                          </p:cTn>
+                        </p:par>
+                        <p:par>
+                          <p:cTn id="21" fill="hold">
+                            <p:stCondLst>
+                              <p:cond delay="1500"/>
+                            </p:stCondLst>
+                            <p:childTnLst>
+                              <p:par>
+                                <p:cTn id="22" presetID="42" presetClass="entr" presetSubtype="0" fill="hold" nodeType="afterEffect">
+                                  <p:stCondLst>
+                                    <p:cond delay="0"/>
+                                  </p:stCondLst>
+                                  <p:childTnLst>
+                                    <p:set>
+                                      <p:cBhvr>
+                                        <p:cTn id="23" dur="1" fill="hold">
+                                          <p:stCondLst>
+                                            <p:cond delay="0"/>
+                                          </p:stCondLst>
+                                        </p:cTn>
+                                        <p:tgtEl>
+                                          <p:spTgt spid="21"/>
+                                        </p:tgtEl>
+                                        <p:attrNameLst>
+                                          <p:attrName>style.visibility</p:attrName>
+                                        </p:attrNameLst>
+                                      </p:cBhvr>
+                                      <p:to>
+                                        <p:strVal val="visible"/>
+                                      </p:to>
+                                    </p:set>
+                                    <p:animEffect transition="in" filter="fade">
+                                      <p:cBhvr>
+                                        <p:cTn id="24" dur="750"/>
+                                        <p:tgtEl>
+                                          <p:spTgt spid="21"/>
+                                        </p:tgtEl>
+                                      </p:cBhvr>
+                                    </p:animEffect>
+                                    <p:anim calcmode="lin" valueType="num">
+                                      <p:cBhvr>
+                                        <p:cTn id="25" dur="750" fill="hold"/>
+                                        <p:tgtEl>
+                                          <p:spTgt spid="21"/>
+                                        </p:tgtEl>
+                                        <p:attrNameLst>
+                                          <p:attrName>ppt_x</p:attrName>
+                                        </p:attrNameLst>
+                                      </p:cBhvr>
+                                      <p:tavLst>
+                                        <p:tav tm="0">
+                                          <p:val>
+                                            <p:strVal val="#ppt_x"/>
+                                          </p:val>
+                                        </p:tav>
+                                        <p:tav tm="100000">
+                                          <p:val>
+                                            <p:strVal val="#ppt_x"/>
+                                          </p:val>
+                                        </p:tav>
+                                      </p:tavLst>
+                                    </p:anim>
+                                    <p:anim calcmode="lin" valueType="num">
+                                      <p:cBhvr>
+                                        <p:cTn id="26" dur="750" fill="hold"/>
+                                        <p:tgtEl>
+                                          <p:spTgt spid="21"/>
+                                        </p:tgtEl>
+                                        <p:attrNameLst>
+                                          <p:attrName>ppt_y</p:attrName>
+                                        </p:attrNameLst>
+                                      </p:cBhvr>
+                                      <p:tavLst>
+                                        <p:tav tm="0">
+                                          <p:val>
+                                            <p:strVal val="#ppt_y+.1"/>
+                                          </p:val>
+                                        </p:tav>
+                                        <p:tav tm="100000">
+                                          <p:val>
+                                            <p:strVal val="#ppt_y"/>
+                                          </p:val>
+                                        </p:tav>
+                                      </p:tavLst>
+                                    </p:anim>
+                                  </p:childTnLst>
+                                </p:cTn>
+                              </p:par>
+                            </p:childTnLst>
+                          </p:cTn>
+                        </p:par>
+                        <p:par>
+                          <p:cTn id="27" fill="hold">
+                            <p:stCondLst>
+                              <p:cond delay="2250"/>
+                            </p:stCondLst>
+                            <p:childTnLst>
+                              <p:par>
+                                <p:cTn id="28" presetID="42" presetClass="entr" presetSubtype="0" fill="hold" nodeType="afterEffect">
+                                  <p:stCondLst>
+                                    <p:cond delay="0"/>
+                                  </p:stCondLst>
+                                  <p:childTnLst>
+                                    <p:set>
+                                      <p:cBhvr>
+                                        <p:cTn id="29" dur="1" fill="hold">
+                                          <p:stCondLst>
+                                            <p:cond delay="0"/>
+                                          </p:stCondLst>
+                                        </p:cTn>
+                                        <p:tgtEl>
+                                          <p:spTgt spid="20"/>
+                                        </p:tgtEl>
+                                        <p:attrNameLst>
+                                          <p:attrName>style.visibility</p:attrName>
+                                        </p:attrNameLst>
+                                      </p:cBhvr>
+                                      <p:to>
+                                        <p:strVal val="visible"/>
+                                      </p:to>
+                                    </p:set>
+                                    <p:animEffect transition="in" filter="fade">
+                                      <p:cBhvr>
+                                        <p:cTn id="30" dur="750"/>
+                                        <p:tgtEl>
+                                          <p:spTgt spid="20"/>
+                                        </p:tgtEl>
+                                      </p:cBhvr>
+                                    </p:animEffect>
+                                    <p:anim calcmode="lin" valueType="num">
+                                      <p:cBhvr>
+                                        <p:cTn id="31" dur="750" fill="hold"/>
+                                        <p:tgtEl>
+                                          <p:spTgt spid="20"/>
+                                        </p:tgtEl>
+                                        <p:attrNameLst>
+                                          <p:attrName>ppt_x</p:attrName>
+                                        </p:attrNameLst>
+                                      </p:cBhvr>
+                                      <p:tavLst>
+                                        <p:tav tm="0">
+                                          <p:val>
+                                            <p:strVal val="#ppt_x"/>
+                                          </p:val>
+                                        </p:tav>
+                                        <p:tav tm="100000">
+                                          <p:val>
+                                            <p:strVal val="#ppt_x"/>
+                                          </p:val>
+                                        </p:tav>
+                                      </p:tavLst>
+                                    </p:anim>
+                                    <p:anim calcmode="lin" valueType="num">
+                                      <p:cBhvr>
+                                        <p:cTn id="32" dur="750" fill="hold"/>
+                                        <p:tgtEl>
+                                          <p:spTgt spid="20"/>
+                                        </p:tgtEl>
+                                        <p:attrNameLst>
+                                          <p:attrName>ppt_y</p:attrName>
+                                        </p:attrNameLst>
+                                      </p:cBhvr>
+                                      <p:tavLst>
+                                        <p:tav tm="0">
+                                          <p:val>
+                                            <p:strVal val="#ppt_y+.1"/>
+                                          </p:val>
+                                        </p:tav>
+                                        <p:tav tm="100000">
+                                          <p:val>
+                                            <p:strVal val="#ppt_y"/>
+                                          </p:val>
+                                        </p:tav>
+                                      </p:tavLst>
+                                    </p:anim>
+                                  </p:childTnLst>
+                                </p:cTn>
+                              </p:par>
+                            </p:childTnLst>
+                          </p:cTn>
+                        </p:par>
+                        <p:par>
+                          <p:cTn id="33" fill="hold">
+                            <p:stCondLst>
+                              <p:cond delay="3000"/>
+                            </p:stCondLst>
+                            <p:childTnLst>
+                              <p:par>
+                                <p:cTn id="34" presetID="42" presetClass="entr" presetSubtype="0" fill="hold" nodeType="afterEffect">
+                                  <p:stCondLst>
+                                    <p:cond delay="0"/>
+                                  </p:stCondLst>
+                                  <p:childTnLst>
+                                    <p:set>
+                                      <p:cBhvr>
+                                        <p:cTn id="35" dur="1" fill="hold">
+                                          <p:stCondLst>
+                                            <p:cond delay="0"/>
+                                          </p:stCondLst>
+                                        </p:cTn>
+                                        <p:tgtEl>
+                                          <p:spTgt spid="22"/>
+                                        </p:tgtEl>
+                                        <p:attrNameLst>
+                                          <p:attrName>style.visibility</p:attrName>
+                                        </p:attrNameLst>
+                                      </p:cBhvr>
+                                      <p:to>
+                                        <p:strVal val="visible"/>
+                                      </p:to>
+                                    </p:set>
+                                    <p:animEffect transition="in" filter="fade">
+                                      <p:cBhvr>
+                                        <p:cTn id="36" dur="750"/>
+                                        <p:tgtEl>
+                                          <p:spTgt spid="22"/>
+                                        </p:tgtEl>
+                                      </p:cBhvr>
+                                    </p:animEffect>
+                                    <p:anim calcmode="lin" valueType="num">
+                                      <p:cBhvr>
+                                        <p:cTn id="37" dur="750" fill="hold"/>
+                                        <p:tgtEl>
+                                          <p:spTgt spid="22"/>
+                                        </p:tgtEl>
+                                        <p:attrNameLst>
+                                          <p:attrName>ppt_x</p:attrName>
+                                        </p:attrNameLst>
+                                      </p:cBhvr>
+                                      <p:tavLst>
+                                        <p:tav tm="0">
+                                          <p:val>
+                                            <p:strVal val="#ppt_x"/>
+                                          </p:val>
+                                        </p:tav>
+                                        <p:tav tm="100000">
+                                          <p:val>
+                                            <p:strVal val="#ppt_x"/>
+                                          </p:val>
+                                        </p:tav>
+                                      </p:tavLst>
+                                    </p:anim>
+                                    <p:anim calcmode="lin" valueType="num">
+                                      <p:cBhvr>
+                                        <p:cTn id="38" dur="750" fill="hold"/>
+                                        <p:tgtEl>
+                                          <p:spTgt spid="22"/>
+                                        </p:tgtEl>
+                                        <p:attrNameLst>
+                                          <p:attrName>ppt_y</p:attrName>
+                                        </p:attrNameLst>
+                                      </p:cBhvr>
+                                      <p:tavLst>
+                                        <p:tav tm="0">
+                                          <p:val>
+                                            <p:strVal val="#ppt_y+.1"/>
+                                          </p:val>
+                                        </p:tav>
+                                        <p:tav tm="100000">
+                                          <p:val>
+                                            <p:strVal val="#ppt_y"/>
+                                          </p:val>
+                                        </p:tav>
+                                      </p:tavLst>
+                                    </p:anim>
+                                  </p:childTnLst>
+                                </p:cTn>
+                              </p:par>
+                            </p:childTnLst>
+                          </p:cTn>
+                        </p:par>
+                        <p:par>
+                          <p:cTn id="39" fill="hold">
+                            <p:stCondLst>
+                              <p:cond delay="3750"/>
+                            </p:stCondLst>
+                            <p:childTnLst>
+                              <p:par>
+                                <p:cTn id="40" presetID="42" presetClass="entr" presetSubtype="0" fill="hold" nodeType="afterEffect">
+                                  <p:stCondLst>
+                                    <p:cond delay="0"/>
+                                  </p:stCondLst>
+                                  <p:childTnLst>
+                                    <p:set>
+                                      <p:cBhvr>
+                                        <p:cTn id="41" dur="1" fill="hold">
+                                          <p:stCondLst>
+                                            <p:cond delay="0"/>
+                                          </p:stCondLst>
+                                        </p:cTn>
+                                        <p:tgtEl>
+                                          <p:spTgt spid="24"/>
+                                        </p:tgtEl>
+                                        <p:attrNameLst>
+                                          <p:attrName>style.visibility</p:attrName>
+                                        </p:attrNameLst>
+                                      </p:cBhvr>
+                                      <p:to>
+                                        <p:strVal val="visible"/>
+                                      </p:to>
+                                    </p:set>
+                                    <p:animEffect transition="in" filter="fade">
+                                      <p:cBhvr>
+                                        <p:cTn id="42" dur="750"/>
+                                        <p:tgtEl>
+                                          <p:spTgt spid="24"/>
+                                        </p:tgtEl>
+                                      </p:cBhvr>
+                                    </p:animEffect>
+                                    <p:anim calcmode="lin" valueType="num">
+                                      <p:cBhvr>
+                                        <p:cTn id="43" dur="750" fill="hold"/>
+                                        <p:tgtEl>
+                                          <p:spTgt spid="24"/>
+                                        </p:tgtEl>
+                                        <p:attrNameLst>
+                                          <p:attrName>ppt_x</p:attrName>
+                                        </p:attrNameLst>
+                                      </p:cBhvr>
+                                      <p:tavLst>
+                                        <p:tav tm="0">
+                                          <p:val>
+                                            <p:strVal val="#ppt_x"/>
+                                          </p:val>
+                                        </p:tav>
+                                        <p:tav tm="100000">
+                                          <p:val>
+                                            <p:strVal val="#ppt_x"/>
+                                          </p:val>
+                                        </p:tav>
+                                      </p:tavLst>
+                                    </p:anim>
+                                    <p:anim calcmode="lin" valueType="num">
+                                      <p:cBhvr>
+                                        <p:cTn id="44" dur="750" fill="hold"/>
+                                        <p:tgtEl>
+                                          <p:spTgt spid="24"/>
+                                        </p:tgtEl>
+                                        <p:attrNameLst>
+                                          <p:attrName>ppt_y</p:attrName>
+                                        </p:attrNameLst>
+                                      </p:cBhvr>
+                                      <p:tavLst>
+                                        <p:tav tm="0">
+                                          <p:val>
+                                            <p:strVal val="#ppt_y+.1"/>
+                                          </p:val>
+                                        </p:tav>
+                                        <p:tav tm="100000">
+                                          <p:val>
+                                            <p:strVal val="#ppt_y"/>
+                                          </p:val>
+                                        </p:tav>
+                                      </p:tavLst>
+                                    </p:anim>
+                                  </p:childTnLst>
+                                </p:cTn>
+                              </p:par>
+                            </p:childTnLst>
+                          </p:cTn>
+                        </p:par>
                       </p:childTnLst>
                     </p:cTn>
                   </p:par>
@@ -26084,297 +27768,6 @@
           </a:prstGeom>
         </p:spPr>
       </p:pic>
-      <p:sp>
-        <p:nvSpPr>
-          <p:cNvPr id="2" name="Google Shape;531;p73">
-            <a:extLst>
-              <a:ext uri="{FF2B5EF4-FFF2-40B4-BE49-F238E27FC236}">
-                <a16:creationId xmlns:a16="http://schemas.microsoft.com/office/drawing/2014/main" id="{6AB3BE35-2493-B1A8-EA36-8B90DB51255A}"/>
-              </a:ext>
-            </a:extLst>
-          </p:cNvPr>
-          <p:cNvSpPr txBox="1">
-            <a:spLocks/>
-          </p:cNvSpPr>
-          <p:nvPr/>
-        </p:nvSpPr>
-        <p:spPr>
-          <a:xfrm>
-            <a:off x="8427719" y="4710914"/>
-            <a:ext cx="716281" cy="432586"/>
-          </a:xfrm>
-          <a:prstGeom prst="rect">
-            <a:avLst/>
-          </a:prstGeom>
-          <a:noFill/>
-          <a:ln>
-            <a:noFill/>
-          </a:ln>
-        </p:spPr>
-        <p:txBody>
-          <a:bodyPr spcFirstLastPara="1" wrap="square" lIns="91425" tIns="91425" rIns="91425" bIns="91425" numCol="1" anchor="t" anchorCtr="0">
-            <a:noAutofit/>
-          </a:bodyPr>
-          <a:lstStyle>
-            <a:defPPr marR="0" lvl="0" algn="l" rtl="0">
-              <a:lnSpc>
-                <a:spcPct val="100000"/>
-              </a:lnSpc>
-              <a:spcBef>
-                <a:spcPts val="0"/>
-              </a:spcBef>
-              <a:spcAft>
-                <a:spcPts val="0"/>
-              </a:spcAft>
-            </a:defPPr>
-            <a:lvl1pPr marL="457200" marR="0" lvl="0" indent="-317500" algn="l" rtl="0">
-              <a:lnSpc>
-                <a:spcPct val="100000"/>
-              </a:lnSpc>
-              <a:spcBef>
-                <a:spcPts val="0"/>
-              </a:spcBef>
-              <a:spcAft>
-                <a:spcPts val="0"/>
-              </a:spcAft>
-              <a:buClr>
-                <a:schemeClr val="dk1"/>
-              </a:buClr>
-              <a:buSzPts val="1400"/>
-              <a:buFont typeface="Didact Gothic"/>
-              <a:buNone/>
-              <a:defRPr sz="1400" b="0" i="0" u="none" strike="noStrike" cap="none">
-                <a:solidFill>
-                  <a:schemeClr val="dk1"/>
-                </a:solidFill>
-                <a:latin typeface="Didact Gothic"/>
-                <a:ea typeface="Didact Gothic"/>
-                <a:cs typeface="Didact Gothic"/>
-                <a:sym typeface="Didact Gothic"/>
-              </a:defRPr>
-            </a:lvl1pPr>
-            <a:lvl2pPr marL="914400" marR="0" lvl="1" indent="-317500" algn="l" rtl="0">
-              <a:lnSpc>
-                <a:spcPct val="115000"/>
-              </a:lnSpc>
-              <a:spcBef>
-                <a:spcPts val="0"/>
-              </a:spcBef>
-              <a:spcAft>
-                <a:spcPts val="0"/>
-              </a:spcAft>
-              <a:buClr>
-                <a:schemeClr val="dk1"/>
-              </a:buClr>
-              <a:buSzPts val="1400"/>
-              <a:buFont typeface="Didact Gothic"/>
-              <a:buNone/>
-              <a:defRPr sz="1400" b="0" i="0" u="none" strike="noStrike" cap="none">
-                <a:solidFill>
-                  <a:schemeClr val="dk1"/>
-                </a:solidFill>
-                <a:latin typeface="Didact Gothic"/>
-                <a:ea typeface="Didact Gothic"/>
-                <a:cs typeface="Didact Gothic"/>
-                <a:sym typeface="Didact Gothic"/>
-              </a:defRPr>
-            </a:lvl2pPr>
-            <a:lvl3pPr marL="1371600" marR="0" lvl="2" indent="-317500" algn="l" rtl="0">
-              <a:lnSpc>
-                <a:spcPct val="115000"/>
-              </a:lnSpc>
-              <a:spcBef>
-                <a:spcPts val="1600"/>
-              </a:spcBef>
-              <a:spcAft>
-                <a:spcPts val="0"/>
-              </a:spcAft>
-              <a:buClr>
-                <a:schemeClr val="dk1"/>
-              </a:buClr>
-              <a:buSzPts val="1400"/>
-              <a:buFont typeface="Didact Gothic"/>
-              <a:buNone/>
-              <a:defRPr sz="1400" b="0" i="0" u="none" strike="noStrike" cap="none">
-                <a:solidFill>
-                  <a:schemeClr val="dk1"/>
-                </a:solidFill>
-                <a:latin typeface="Didact Gothic"/>
-                <a:ea typeface="Didact Gothic"/>
-                <a:cs typeface="Didact Gothic"/>
-                <a:sym typeface="Didact Gothic"/>
-              </a:defRPr>
-            </a:lvl3pPr>
-            <a:lvl4pPr marL="1828800" marR="0" lvl="3" indent="-317500" algn="l" rtl="0">
-              <a:lnSpc>
-                <a:spcPct val="115000"/>
-              </a:lnSpc>
-              <a:spcBef>
-                <a:spcPts val="1600"/>
-              </a:spcBef>
-              <a:spcAft>
-                <a:spcPts val="0"/>
-              </a:spcAft>
-              <a:buClr>
-                <a:schemeClr val="dk1"/>
-              </a:buClr>
-              <a:buSzPts val="1400"/>
-              <a:buFont typeface="Didact Gothic"/>
-              <a:buNone/>
-              <a:defRPr sz="1400" b="0" i="0" u="none" strike="noStrike" cap="none">
-                <a:solidFill>
-                  <a:schemeClr val="dk1"/>
-                </a:solidFill>
-                <a:latin typeface="Didact Gothic"/>
-                <a:ea typeface="Didact Gothic"/>
-                <a:cs typeface="Didact Gothic"/>
-                <a:sym typeface="Didact Gothic"/>
-              </a:defRPr>
-            </a:lvl4pPr>
-            <a:lvl5pPr marL="2286000" marR="0" lvl="4" indent="-317500" algn="l" rtl="0">
-              <a:lnSpc>
-                <a:spcPct val="115000"/>
-              </a:lnSpc>
-              <a:spcBef>
-                <a:spcPts val="1600"/>
-              </a:spcBef>
-              <a:spcAft>
-                <a:spcPts val="0"/>
-              </a:spcAft>
-              <a:buClr>
-                <a:schemeClr val="dk1"/>
-              </a:buClr>
-              <a:buSzPts val="1400"/>
-              <a:buFont typeface="Didact Gothic"/>
-              <a:buNone/>
-              <a:defRPr sz="1400" b="0" i="0" u="none" strike="noStrike" cap="none">
-                <a:solidFill>
-                  <a:schemeClr val="dk1"/>
-                </a:solidFill>
-                <a:latin typeface="Didact Gothic"/>
-                <a:ea typeface="Didact Gothic"/>
-                <a:cs typeface="Didact Gothic"/>
-                <a:sym typeface="Didact Gothic"/>
-              </a:defRPr>
-            </a:lvl5pPr>
-            <a:lvl6pPr marL="2743200" marR="0" lvl="5" indent="-317500" algn="l" rtl="0">
-              <a:lnSpc>
-                <a:spcPct val="115000"/>
-              </a:lnSpc>
-              <a:spcBef>
-                <a:spcPts val="1600"/>
-              </a:spcBef>
-              <a:spcAft>
-                <a:spcPts val="0"/>
-              </a:spcAft>
-              <a:buClr>
-                <a:schemeClr val="dk1"/>
-              </a:buClr>
-              <a:buSzPts val="1400"/>
-              <a:buFont typeface="Didact Gothic"/>
-              <a:buNone/>
-              <a:defRPr sz="1400" b="0" i="0" u="none" strike="noStrike" cap="none">
-                <a:solidFill>
-                  <a:schemeClr val="dk1"/>
-                </a:solidFill>
-                <a:latin typeface="Didact Gothic"/>
-                <a:ea typeface="Didact Gothic"/>
-                <a:cs typeface="Didact Gothic"/>
-                <a:sym typeface="Didact Gothic"/>
-              </a:defRPr>
-            </a:lvl6pPr>
-            <a:lvl7pPr marL="3200400" marR="0" lvl="6" indent="-317500" algn="l" rtl="0">
-              <a:lnSpc>
-                <a:spcPct val="115000"/>
-              </a:lnSpc>
-              <a:spcBef>
-                <a:spcPts val="1600"/>
-              </a:spcBef>
-              <a:spcAft>
-                <a:spcPts val="0"/>
-              </a:spcAft>
-              <a:buClr>
-                <a:schemeClr val="dk1"/>
-              </a:buClr>
-              <a:buSzPts val="1400"/>
-              <a:buFont typeface="Didact Gothic"/>
-              <a:buNone/>
-              <a:defRPr sz="1400" b="0" i="0" u="none" strike="noStrike" cap="none">
-                <a:solidFill>
-                  <a:schemeClr val="dk1"/>
-                </a:solidFill>
-                <a:latin typeface="Didact Gothic"/>
-                <a:ea typeface="Didact Gothic"/>
-                <a:cs typeface="Didact Gothic"/>
-                <a:sym typeface="Didact Gothic"/>
-              </a:defRPr>
-            </a:lvl7pPr>
-            <a:lvl8pPr marL="3657600" marR="0" lvl="7" indent="-317500" algn="l" rtl="0">
-              <a:lnSpc>
-                <a:spcPct val="115000"/>
-              </a:lnSpc>
-              <a:spcBef>
-                <a:spcPts val="1600"/>
-              </a:spcBef>
-              <a:spcAft>
-                <a:spcPts val="0"/>
-              </a:spcAft>
-              <a:buClr>
-                <a:schemeClr val="dk1"/>
-              </a:buClr>
-              <a:buSzPts val="1400"/>
-              <a:buFont typeface="Didact Gothic"/>
-              <a:buNone/>
-              <a:defRPr sz="1400" b="0" i="0" u="none" strike="noStrike" cap="none">
-                <a:solidFill>
-                  <a:schemeClr val="dk1"/>
-                </a:solidFill>
-                <a:latin typeface="Didact Gothic"/>
-                <a:ea typeface="Didact Gothic"/>
-                <a:cs typeface="Didact Gothic"/>
-                <a:sym typeface="Didact Gothic"/>
-              </a:defRPr>
-            </a:lvl8pPr>
-            <a:lvl9pPr marL="4114800" marR="0" lvl="8" indent="-317500" algn="l" rtl="0">
-              <a:lnSpc>
-                <a:spcPct val="115000"/>
-              </a:lnSpc>
-              <a:spcBef>
-                <a:spcPts val="1600"/>
-              </a:spcBef>
-              <a:spcAft>
-                <a:spcPts val="1600"/>
-              </a:spcAft>
-              <a:buClr>
-                <a:schemeClr val="dk1"/>
-              </a:buClr>
-              <a:buSzPts val="1400"/>
-              <a:buFont typeface="Didact Gothic"/>
-              <a:buNone/>
-              <a:defRPr sz="1400" b="0" i="0" u="none" strike="noStrike" cap="none">
-                <a:solidFill>
-                  <a:schemeClr val="dk1"/>
-                </a:solidFill>
-                <a:latin typeface="Didact Gothic"/>
-                <a:ea typeface="Didact Gothic"/>
-                <a:cs typeface="Didact Gothic"/>
-                <a:sym typeface="Didact Gothic"/>
-              </a:defRPr>
-            </a:lvl9pPr>
-          </a:lstStyle>
-          <a:p>
-            <a:pPr marL="88900" indent="0"/>
-            <a:r>
-              <a:rPr lang="en" dirty="0">
-                <a:solidFill>
-                  <a:schemeClr val="bg1"/>
-                </a:solidFill>
-              </a:rPr>
-              <a:t>6/11</a:t>
-            </a:r>
-          </a:p>
-        </p:txBody>
-      </p:sp>
       <p:pic>
         <p:nvPicPr>
           <p:cNvPr id="4" name="Imagem 3" descr="Uma imagem com Saturação de cores&#10;&#10;Descrição gerada automaticamente">
@@ -26405,6 +27798,297 @@
           </a:prstGeom>
         </p:spPr>
       </p:pic>
+      <p:sp>
+        <p:nvSpPr>
+          <p:cNvPr id="3" name="Google Shape;531;p73">
+            <a:extLst>
+              <a:ext uri="{FF2B5EF4-FFF2-40B4-BE49-F238E27FC236}">
+                <a16:creationId xmlns:a16="http://schemas.microsoft.com/office/drawing/2014/main" id="{1D02783A-9F45-74B4-6720-36F4C34CF819}"/>
+              </a:ext>
+            </a:extLst>
+          </p:cNvPr>
+          <p:cNvSpPr txBox="1">
+            <a:spLocks/>
+          </p:cNvSpPr>
+          <p:nvPr/>
+        </p:nvSpPr>
+        <p:spPr>
+          <a:xfrm>
+            <a:off x="7993856" y="4710914"/>
+            <a:ext cx="890594" cy="432586"/>
+          </a:xfrm>
+          <a:prstGeom prst="rect">
+            <a:avLst/>
+          </a:prstGeom>
+          <a:noFill/>
+          <a:ln>
+            <a:noFill/>
+          </a:ln>
+        </p:spPr>
+        <p:txBody>
+          <a:bodyPr spcFirstLastPara="1" wrap="square" lIns="91425" tIns="91425" rIns="91425" bIns="91425" numCol="1" anchor="t" anchorCtr="0">
+            <a:noAutofit/>
+          </a:bodyPr>
+          <a:lstStyle>
+            <a:defPPr marR="0" lvl="0" algn="l" rtl="0">
+              <a:lnSpc>
+                <a:spcPct val="100000"/>
+              </a:lnSpc>
+              <a:spcBef>
+                <a:spcPts val="0"/>
+              </a:spcBef>
+              <a:spcAft>
+                <a:spcPts val="0"/>
+              </a:spcAft>
+            </a:defPPr>
+            <a:lvl1pPr marL="457200" marR="0" lvl="0" indent="-317500" algn="l" rtl="0">
+              <a:lnSpc>
+                <a:spcPct val="100000"/>
+              </a:lnSpc>
+              <a:spcBef>
+                <a:spcPts val="0"/>
+              </a:spcBef>
+              <a:spcAft>
+                <a:spcPts val="0"/>
+              </a:spcAft>
+              <a:buClr>
+                <a:schemeClr val="dk1"/>
+              </a:buClr>
+              <a:buSzPts val="1400"/>
+              <a:buFont typeface="Didact Gothic"/>
+              <a:buNone/>
+              <a:defRPr sz="1400" b="0" i="0" u="none" strike="noStrike" cap="none">
+                <a:solidFill>
+                  <a:schemeClr val="dk1"/>
+                </a:solidFill>
+                <a:latin typeface="Didact Gothic"/>
+                <a:ea typeface="Didact Gothic"/>
+                <a:cs typeface="Didact Gothic"/>
+                <a:sym typeface="Didact Gothic"/>
+              </a:defRPr>
+            </a:lvl1pPr>
+            <a:lvl2pPr marL="914400" marR="0" lvl="1" indent="-317500" algn="l" rtl="0">
+              <a:lnSpc>
+                <a:spcPct val="115000"/>
+              </a:lnSpc>
+              <a:spcBef>
+                <a:spcPts val="0"/>
+              </a:spcBef>
+              <a:spcAft>
+                <a:spcPts val="0"/>
+              </a:spcAft>
+              <a:buClr>
+                <a:schemeClr val="dk1"/>
+              </a:buClr>
+              <a:buSzPts val="1400"/>
+              <a:buFont typeface="Didact Gothic"/>
+              <a:buNone/>
+              <a:defRPr sz="1400" b="0" i="0" u="none" strike="noStrike" cap="none">
+                <a:solidFill>
+                  <a:schemeClr val="dk1"/>
+                </a:solidFill>
+                <a:latin typeface="Didact Gothic"/>
+                <a:ea typeface="Didact Gothic"/>
+                <a:cs typeface="Didact Gothic"/>
+                <a:sym typeface="Didact Gothic"/>
+              </a:defRPr>
+            </a:lvl2pPr>
+            <a:lvl3pPr marL="1371600" marR="0" lvl="2" indent="-317500" algn="l" rtl="0">
+              <a:lnSpc>
+                <a:spcPct val="115000"/>
+              </a:lnSpc>
+              <a:spcBef>
+                <a:spcPts val="1600"/>
+              </a:spcBef>
+              <a:spcAft>
+                <a:spcPts val="0"/>
+              </a:spcAft>
+              <a:buClr>
+                <a:schemeClr val="dk1"/>
+              </a:buClr>
+              <a:buSzPts val="1400"/>
+              <a:buFont typeface="Didact Gothic"/>
+              <a:buNone/>
+              <a:defRPr sz="1400" b="0" i="0" u="none" strike="noStrike" cap="none">
+                <a:solidFill>
+                  <a:schemeClr val="dk1"/>
+                </a:solidFill>
+                <a:latin typeface="Didact Gothic"/>
+                <a:ea typeface="Didact Gothic"/>
+                <a:cs typeface="Didact Gothic"/>
+                <a:sym typeface="Didact Gothic"/>
+              </a:defRPr>
+            </a:lvl3pPr>
+            <a:lvl4pPr marL="1828800" marR="0" lvl="3" indent="-317500" algn="l" rtl="0">
+              <a:lnSpc>
+                <a:spcPct val="115000"/>
+              </a:lnSpc>
+              <a:spcBef>
+                <a:spcPts val="1600"/>
+              </a:spcBef>
+              <a:spcAft>
+                <a:spcPts val="0"/>
+              </a:spcAft>
+              <a:buClr>
+                <a:schemeClr val="dk1"/>
+              </a:buClr>
+              <a:buSzPts val="1400"/>
+              <a:buFont typeface="Didact Gothic"/>
+              <a:buNone/>
+              <a:defRPr sz="1400" b="0" i="0" u="none" strike="noStrike" cap="none">
+                <a:solidFill>
+                  <a:schemeClr val="dk1"/>
+                </a:solidFill>
+                <a:latin typeface="Didact Gothic"/>
+                <a:ea typeface="Didact Gothic"/>
+                <a:cs typeface="Didact Gothic"/>
+                <a:sym typeface="Didact Gothic"/>
+              </a:defRPr>
+            </a:lvl4pPr>
+            <a:lvl5pPr marL="2286000" marR="0" lvl="4" indent="-317500" algn="l" rtl="0">
+              <a:lnSpc>
+                <a:spcPct val="115000"/>
+              </a:lnSpc>
+              <a:spcBef>
+                <a:spcPts val="1600"/>
+              </a:spcBef>
+              <a:spcAft>
+                <a:spcPts val="0"/>
+              </a:spcAft>
+              <a:buClr>
+                <a:schemeClr val="dk1"/>
+              </a:buClr>
+              <a:buSzPts val="1400"/>
+              <a:buFont typeface="Didact Gothic"/>
+              <a:buNone/>
+              <a:defRPr sz="1400" b="0" i="0" u="none" strike="noStrike" cap="none">
+                <a:solidFill>
+                  <a:schemeClr val="dk1"/>
+                </a:solidFill>
+                <a:latin typeface="Didact Gothic"/>
+                <a:ea typeface="Didact Gothic"/>
+                <a:cs typeface="Didact Gothic"/>
+                <a:sym typeface="Didact Gothic"/>
+              </a:defRPr>
+            </a:lvl5pPr>
+            <a:lvl6pPr marL="2743200" marR="0" lvl="5" indent="-317500" algn="l" rtl="0">
+              <a:lnSpc>
+                <a:spcPct val="115000"/>
+              </a:lnSpc>
+              <a:spcBef>
+                <a:spcPts val="1600"/>
+              </a:spcBef>
+              <a:spcAft>
+                <a:spcPts val="0"/>
+              </a:spcAft>
+              <a:buClr>
+                <a:schemeClr val="dk1"/>
+              </a:buClr>
+              <a:buSzPts val="1400"/>
+              <a:buFont typeface="Didact Gothic"/>
+              <a:buNone/>
+              <a:defRPr sz="1400" b="0" i="0" u="none" strike="noStrike" cap="none">
+                <a:solidFill>
+                  <a:schemeClr val="dk1"/>
+                </a:solidFill>
+                <a:latin typeface="Didact Gothic"/>
+                <a:ea typeface="Didact Gothic"/>
+                <a:cs typeface="Didact Gothic"/>
+                <a:sym typeface="Didact Gothic"/>
+              </a:defRPr>
+            </a:lvl6pPr>
+            <a:lvl7pPr marL="3200400" marR="0" lvl="6" indent="-317500" algn="l" rtl="0">
+              <a:lnSpc>
+                <a:spcPct val="115000"/>
+              </a:lnSpc>
+              <a:spcBef>
+                <a:spcPts val="1600"/>
+              </a:spcBef>
+              <a:spcAft>
+                <a:spcPts val="0"/>
+              </a:spcAft>
+              <a:buClr>
+                <a:schemeClr val="dk1"/>
+              </a:buClr>
+              <a:buSzPts val="1400"/>
+              <a:buFont typeface="Didact Gothic"/>
+              <a:buNone/>
+              <a:defRPr sz="1400" b="0" i="0" u="none" strike="noStrike" cap="none">
+                <a:solidFill>
+                  <a:schemeClr val="dk1"/>
+                </a:solidFill>
+                <a:latin typeface="Didact Gothic"/>
+                <a:ea typeface="Didact Gothic"/>
+                <a:cs typeface="Didact Gothic"/>
+                <a:sym typeface="Didact Gothic"/>
+              </a:defRPr>
+            </a:lvl7pPr>
+            <a:lvl8pPr marL="3657600" marR="0" lvl="7" indent="-317500" algn="l" rtl="0">
+              <a:lnSpc>
+                <a:spcPct val="115000"/>
+              </a:lnSpc>
+              <a:spcBef>
+                <a:spcPts val="1600"/>
+              </a:spcBef>
+              <a:spcAft>
+                <a:spcPts val="0"/>
+              </a:spcAft>
+              <a:buClr>
+                <a:schemeClr val="dk1"/>
+              </a:buClr>
+              <a:buSzPts val="1400"/>
+              <a:buFont typeface="Didact Gothic"/>
+              <a:buNone/>
+              <a:defRPr sz="1400" b="0" i="0" u="none" strike="noStrike" cap="none">
+                <a:solidFill>
+                  <a:schemeClr val="dk1"/>
+                </a:solidFill>
+                <a:latin typeface="Didact Gothic"/>
+                <a:ea typeface="Didact Gothic"/>
+                <a:cs typeface="Didact Gothic"/>
+                <a:sym typeface="Didact Gothic"/>
+              </a:defRPr>
+            </a:lvl8pPr>
+            <a:lvl9pPr marL="4114800" marR="0" lvl="8" indent="-317500" algn="l" rtl="0">
+              <a:lnSpc>
+                <a:spcPct val="115000"/>
+              </a:lnSpc>
+              <a:spcBef>
+                <a:spcPts val="1600"/>
+              </a:spcBef>
+              <a:spcAft>
+                <a:spcPts val="1600"/>
+              </a:spcAft>
+              <a:buClr>
+                <a:schemeClr val="dk1"/>
+              </a:buClr>
+              <a:buSzPts val="1400"/>
+              <a:buFont typeface="Didact Gothic"/>
+              <a:buNone/>
+              <a:defRPr sz="1400" b="0" i="0" u="none" strike="noStrike" cap="none">
+                <a:solidFill>
+                  <a:schemeClr val="dk1"/>
+                </a:solidFill>
+                <a:latin typeface="Didact Gothic"/>
+                <a:ea typeface="Didact Gothic"/>
+                <a:cs typeface="Didact Gothic"/>
+                <a:sym typeface="Didact Gothic"/>
+              </a:defRPr>
+            </a:lvl9pPr>
+          </a:lstStyle>
+          <a:p>
+            <a:pPr marL="88900" indent="0" algn="r"/>
+            <a:r>
+              <a:rPr lang="en" dirty="0">
+                <a:solidFill>
+                  <a:schemeClr val="accent5"/>
+                </a:solidFill>
+              </a:rPr>
+              <a:t>6/11</a:t>
+            </a:r>
+          </a:p>
+        </p:txBody>
+      </p:sp>
     </p:spTree>
   </p:cSld>
   <p:clrMapOvr>
@@ -28406,10 +30090,10 @@
       </p:sp>
       <p:sp>
         <p:nvSpPr>
-          <p:cNvPr id="16" name="Google Shape;531;p73">
+          <p:cNvPr id="8" name="Google Shape;531;p73">
             <a:extLst>
               <a:ext uri="{FF2B5EF4-FFF2-40B4-BE49-F238E27FC236}">
-                <a16:creationId xmlns:a16="http://schemas.microsoft.com/office/drawing/2014/main" id="{BE0A6A87-6AF6-AB6E-6A1A-3488AA33A546}"/>
+                <a16:creationId xmlns:a16="http://schemas.microsoft.com/office/drawing/2014/main" id="{D910FFC1-F0D1-C9D6-341C-9766359BBC93}"/>
               </a:ext>
             </a:extLst>
           </p:cNvPr>
@@ -28420,8 +30104,8 @@
         </p:nvSpPr>
         <p:spPr>
           <a:xfrm>
-            <a:off x="8427719" y="4710914"/>
-            <a:ext cx="716281" cy="432586"/>
+            <a:off x="7993856" y="4710914"/>
+            <a:ext cx="890594" cy="432586"/>
           </a:xfrm>
           <a:prstGeom prst="rect">
             <a:avLst/>
@@ -28683,7 +30367,7 @@
             </a:lvl9pPr>
           </a:lstStyle>
           <a:p>
-            <a:pPr marL="88900" indent="0"/>
+            <a:pPr marL="88900" indent="0" algn="r"/>
             <a:r>
               <a:rPr lang="en" dirty="0"/>
               <a:t>7/11</a:t>
@@ -29030,10 +30714,10 @@
       </p:sp>
       <p:sp>
         <p:nvSpPr>
-          <p:cNvPr id="2" name="Google Shape;531;p73">
+          <p:cNvPr id="3" name="Google Shape;531;p73">
             <a:extLst>
               <a:ext uri="{FF2B5EF4-FFF2-40B4-BE49-F238E27FC236}">
-                <a16:creationId xmlns:a16="http://schemas.microsoft.com/office/drawing/2014/main" id="{ABD9A414-FA3B-0F2E-0C27-86C5C1DE1066}"/>
+                <a16:creationId xmlns:a16="http://schemas.microsoft.com/office/drawing/2014/main" id="{EAC6A330-D512-F2F1-5F9B-3340ED2D3645}"/>
               </a:ext>
             </a:extLst>
           </p:cNvPr>
@@ -29044,8 +30728,8 @@
         </p:nvSpPr>
         <p:spPr>
           <a:xfrm>
-            <a:off x="8427719" y="4710914"/>
-            <a:ext cx="716281" cy="432586"/>
+            <a:off x="7993856" y="4710914"/>
+            <a:ext cx="890594" cy="432586"/>
           </a:xfrm>
           <a:prstGeom prst="rect">
             <a:avLst/>
@@ -29307,7 +30991,7 @@
             </a:lvl9pPr>
           </a:lstStyle>
           <a:p>
-            <a:pPr marL="88900" indent="0"/>
+            <a:pPr marL="88900" indent="0" algn="r"/>
             <a:r>
               <a:rPr lang="en" dirty="0"/>
               <a:t>8/11</a:t>
@@ -29345,10 +31029,10 @@
       </p:grpSpPr>
       <p:sp>
         <p:nvSpPr>
-          <p:cNvPr id="14" name="Título 13">
+          <p:cNvPr id="2" name="Título 1">
             <a:extLst>
               <a:ext uri="{FF2B5EF4-FFF2-40B4-BE49-F238E27FC236}">
-                <a16:creationId xmlns:a16="http://schemas.microsoft.com/office/drawing/2014/main" id="{A3E7F3BB-5235-5B5B-0CEF-D18167B9A11B}"/>
+                <a16:creationId xmlns:a16="http://schemas.microsoft.com/office/drawing/2014/main" id="{92576A9C-1C0E-96D5-9C40-CA6D25D5249D}"/>
               </a:ext>
             </a:extLst>
           </p:cNvPr>
@@ -29356,7 +31040,7 @@
             <a:spLocks noGrp="1"/>
           </p:cNvSpPr>
           <p:nvPr>
-            <p:ph type="title" idx="15"/>
+            <p:ph type="title"/>
           </p:nvPr>
         </p:nvSpPr>
         <p:spPr/>
@@ -29366,17 +31050,21 @@
           <a:p>
             <a:r>
               <a:rPr lang="en-US" dirty="0"/>
-              <a:t>System Attributes</a:t>
+              <a:t>System Functions</a:t>
             </a:r>
+            <a:br>
+              <a:rPr lang="en-US" dirty="0"/>
+            </a:br>
+            <a:endParaRPr lang="en-US" dirty="0"/>
           </a:p>
         </p:txBody>
       </p:sp>
       <p:graphicFrame>
         <p:nvGraphicFramePr>
-          <p:cNvPr id="2" name="Tabela 2">
+          <p:cNvPr id="6" name="Tabela 6">
             <a:extLst>
               <a:ext uri="{FF2B5EF4-FFF2-40B4-BE49-F238E27FC236}">
-                <a16:creationId xmlns:a16="http://schemas.microsoft.com/office/drawing/2014/main" id="{0DDED308-75E4-C364-CC32-352E38B2470A}"/>
+                <a16:creationId xmlns:a16="http://schemas.microsoft.com/office/drawing/2014/main" id="{6400C405-188F-CDF4-501D-26DDF4970508}"/>
               </a:ext>
             </a:extLst>
           </p:cNvPr>
@@ -29386,53 +31074,53 @@
           <p:nvPr>
             <p:extLst>
               <p:ext uri="{D42A27DB-BD31-4B8C-83A1-F6EECF244321}">
-                <p14:modId xmlns:p14="http://schemas.microsoft.com/office/powerpoint/2010/main" val="3046115410"/>
+                <p14:modId xmlns:p14="http://schemas.microsoft.com/office/powerpoint/2010/main" val="2604925411"/>
               </p:ext>
             </p:extLst>
           </p:nvPr>
         </p:nvGraphicFramePr>
         <p:xfrm>
-          <a:off x="4468872" y="1489710"/>
-          <a:ext cx="4523874" cy="3108960"/>
+          <a:off x="1021855" y="1371149"/>
+          <a:ext cx="7093640" cy="2595880"/>
         </p:xfrm>
         <a:graphic>
           <a:graphicData uri="http://schemas.openxmlformats.org/drawingml/2006/table">
             <a:tbl>
               <a:tblPr firstRow="1" bandRow="1">
-                <a:tableStyleId>{00A15C55-8517-42AA-B614-E9B94910E393}</a:tableStyleId>
+                <a:tableStyleId>{5C22544A-7EE6-4342-B048-85BDC9FD1C3A}</a:tableStyleId>
               </a:tblPr>
               <a:tblGrid>
-                <a:gridCol w="1507958">
+                <a:gridCol w="1304898">
                   <a:extLst>
                     <a:ext uri="{9D8B030D-6E8A-4147-A177-3AD203B41FA5}">
-                      <a16:colId xmlns:a16="http://schemas.microsoft.com/office/drawing/2014/main" val="1681547778"/>
+                      <a16:colId xmlns:a16="http://schemas.microsoft.com/office/drawing/2014/main" val="418046561"/>
                     </a:ext>
                   </a:extLst>
                 </a:gridCol>
-                <a:gridCol w="1507958">
+                <a:gridCol w="4322452">
                   <a:extLst>
                     <a:ext uri="{9D8B030D-6E8A-4147-A177-3AD203B41FA5}">
-                      <a16:colId xmlns:a16="http://schemas.microsoft.com/office/drawing/2014/main" val="519148131"/>
+                      <a16:colId xmlns:a16="http://schemas.microsoft.com/office/drawing/2014/main" val="1552109539"/>
                     </a:ext>
                   </a:extLst>
                 </a:gridCol>
-                <a:gridCol w="1507958">
+                <a:gridCol w="1466290">
                   <a:extLst>
                     <a:ext uri="{9D8B030D-6E8A-4147-A177-3AD203B41FA5}">
-                      <a16:colId xmlns:a16="http://schemas.microsoft.com/office/drawing/2014/main" val="1040589824"/>
+                      <a16:colId xmlns:a16="http://schemas.microsoft.com/office/drawing/2014/main" val="3561355658"/>
                     </a:ext>
                   </a:extLst>
                 </a:gridCol>
               </a:tblGrid>
-              <a:tr h="292180">
+              <a:tr h="370840">
                 <a:tc>
                   <a:txBody>
                     <a:bodyPr/>
                     <a:lstStyle/>
                     <a:p>
                       <a:r>
-                        <a:rPr lang="en-US" dirty="0"/>
-                        <a:t>Attributes</a:t>
+                        <a:rPr lang="en-US" sz="1200" dirty="0"/>
+                        <a:t>Requirements</a:t>
                       </a:r>
                     </a:p>
                   </a:txBody>
@@ -29444,8 +31132,8 @@
                     <a:lstStyle/>
                     <a:p>
                       <a:r>
-                        <a:rPr lang="en-US" dirty="0"/>
-                        <a:t>Details / Restrictions (D / R)</a:t>
+                        <a:rPr lang="en-US" sz="1200" dirty="0"/>
+                        <a:t>Function</a:t>
                       </a:r>
                     </a:p>
                   </a:txBody>
@@ -29457,8 +31145,8 @@
                     <a:lstStyle/>
                     <a:p>
                       <a:r>
-                        <a:rPr lang="en-US" dirty="0"/>
-                        <a:t>Categories</a:t>
+                        <a:rPr lang="en-US" sz="1200" dirty="0"/>
+                        <a:t>Category</a:t>
                       </a:r>
                     </a:p>
                   </a:txBody>
@@ -29466,19 +31154,19 @@
                 </a:tc>
                 <a:extLst>
                   <a:ext uri="{0D108BD9-81ED-4DB2-BD59-A6C34878D82A}">
-                    <a16:rowId xmlns:a16="http://schemas.microsoft.com/office/drawing/2014/main" val="2027282949"/>
+                    <a16:rowId xmlns:a16="http://schemas.microsoft.com/office/drawing/2014/main" val="1002566362"/>
                   </a:ext>
                 </a:extLst>
               </a:tr>
-              <a:tr h="292180">
+              <a:tr h="370840">
                 <a:tc>
                   <a:txBody>
                     <a:bodyPr/>
                     <a:lstStyle/>
                     <a:p>
                       <a:r>
-                        <a:rPr lang="en-US" dirty="0"/>
-                        <a:t>Platforms</a:t>
+                        <a:rPr lang="en-US" sz="1200" dirty="0"/>
+                        <a:t>R1</a:t>
                       </a:r>
                     </a:p>
                   </a:txBody>
@@ -29490,8 +31178,8 @@
                     <a:lstStyle/>
                     <a:p>
                       <a:r>
-                        <a:rPr lang="en-US" dirty="0"/>
-                        <a:t>D – Unity, Mobile</a:t>
+                        <a:rPr lang="en-US" sz="1200" dirty="0"/>
+                        <a:t>The game must have a tutorial</a:t>
                       </a:r>
                     </a:p>
                   </a:txBody>
@@ -29503,8 +31191,8 @@
                     <a:lstStyle/>
                     <a:p>
                       <a:r>
-                        <a:rPr lang="en-US" dirty="0"/>
-                        <a:t>Mandatory</a:t>
+                        <a:rPr lang="en-US" sz="1200" dirty="0"/>
+                        <a:t>Visible</a:t>
                       </a:r>
                     </a:p>
                   </a:txBody>
@@ -29512,19 +31200,19 @@
                 </a:tc>
                 <a:extLst>
                   <a:ext uri="{0D108BD9-81ED-4DB2-BD59-A6C34878D82A}">
-                    <a16:rowId xmlns:a16="http://schemas.microsoft.com/office/drawing/2014/main" val="3493805386"/>
+                    <a16:rowId xmlns:a16="http://schemas.microsoft.com/office/drawing/2014/main" val="746098265"/>
                   </a:ext>
                 </a:extLst>
               </a:tr>
-              <a:tr h="292180">
+              <a:tr h="370840">
                 <a:tc>
                   <a:txBody>
                     <a:bodyPr/>
                     <a:lstStyle/>
                     <a:p>
                       <a:r>
-                        <a:rPr lang="en-US" dirty="0"/>
-                        <a:t>Ease of use</a:t>
+                        <a:rPr lang="en-US" sz="1200" dirty="0"/>
+                        <a:t>R2</a:t>
                       </a:r>
                     </a:p>
                   </a:txBody>
@@ -29536,8 +31224,8 @@
                     <a:lstStyle/>
                     <a:p>
                       <a:r>
-                        <a:rPr lang="en-US" dirty="0"/>
-                        <a:t>D – simplistic, intuitive</a:t>
+                        <a:rPr lang="en-US" sz="1200" dirty="0"/>
+                        <a:t>The player must be able to control his actions</a:t>
                       </a:r>
                     </a:p>
                   </a:txBody>
@@ -29549,8 +31237,8 @@
                     <a:lstStyle/>
                     <a:p>
                       <a:r>
-                        <a:rPr lang="en-US" dirty="0"/>
-                        <a:t>Mandatory</a:t>
+                        <a:rPr lang="en-US" sz="1200" dirty="0"/>
+                        <a:t>Visible</a:t>
                       </a:r>
                     </a:p>
                   </a:txBody>
@@ -29558,19 +31246,19 @@
                 </a:tc>
                 <a:extLst>
                   <a:ext uri="{0D108BD9-81ED-4DB2-BD59-A6C34878D82A}">
-                    <a16:rowId xmlns:a16="http://schemas.microsoft.com/office/drawing/2014/main" val="1295825423"/>
+                    <a16:rowId xmlns:a16="http://schemas.microsoft.com/office/drawing/2014/main" val="309980605"/>
                   </a:ext>
                 </a:extLst>
               </a:tr>
-              <a:tr h="292180">
+              <a:tr h="370840">
                 <a:tc>
                   <a:txBody>
                     <a:bodyPr/>
                     <a:lstStyle/>
                     <a:p>
                       <a:r>
-                        <a:rPr lang="en-US" dirty="0"/>
-                        <a:t>Monetization</a:t>
+                        <a:rPr lang="en-US" sz="1200" dirty="0"/>
+                        <a:t>R3</a:t>
                       </a:r>
                     </a:p>
                   </a:txBody>
@@ -29582,8 +31270,8 @@
                     <a:lstStyle/>
                     <a:p>
                       <a:r>
-                        <a:rPr lang="en-US" dirty="0"/>
-                        <a:t>D – Ads, paid currency</a:t>
+                        <a:rPr lang="en-US" sz="1200" dirty="0"/>
+                        <a:t>The player must be able to select the level he wants.</a:t>
                       </a:r>
                     </a:p>
                   </a:txBody>
@@ -29595,8 +31283,8 @@
                     <a:lstStyle/>
                     <a:p>
                       <a:r>
-                        <a:rPr lang="en-US" dirty="0"/>
-                        <a:t>Preferable</a:t>
+                        <a:rPr lang="en-US" sz="1200" dirty="0"/>
+                        <a:t>Visible</a:t>
                       </a:r>
                     </a:p>
                   </a:txBody>
@@ -29604,19 +31292,19 @@
                 </a:tc>
                 <a:extLst>
                   <a:ext uri="{0D108BD9-81ED-4DB2-BD59-A6C34878D82A}">
-                    <a16:rowId xmlns:a16="http://schemas.microsoft.com/office/drawing/2014/main" val="221035577"/>
+                    <a16:rowId xmlns:a16="http://schemas.microsoft.com/office/drawing/2014/main" val="402637408"/>
                   </a:ext>
                 </a:extLst>
               </a:tr>
-              <a:tr h="292180">
+              <a:tr h="370840">
                 <a:tc>
                   <a:txBody>
                     <a:bodyPr/>
                     <a:lstStyle/>
                     <a:p>
                       <a:r>
-                        <a:rPr lang="en-US" dirty="0"/>
-                        <a:t>Graphics</a:t>
+                        <a:rPr lang="en-US" sz="1200" dirty="0"/>
+                        <a:t>R4</a:t>
                       </a:r>
                     </a:p>
                   </a:txBody>
@@ -29628,8 +31316,8 @@
                     <a:lstStyle/>
                     <a:p>
                       <a:r>
-                        <a:rPr lang="en-US" dirty="0"/>
-                        <a:t>D – 2D, Pixel art</a:t>
+                        <a:rPr lang="en-US" sz="1200" dirty="0"/>
+                        <a:t>Loading visuals and data need to be quick</a:t>
                       </a:r>
                     </a:p>
                   </a:txBody>
@@ -29641,8 +31329,8 @@
                     <a:lstStyle/>
                     <a:p>
                       <a:r>
-                        <a:rPr lang="en-US" dirty="0"/>
-                        <a:t>Mandatory</a:t>
+                        <a:rPr lang="en-US" sz="1200" dirty="0"/>
+                        <a:t>Invisible</a:t>
                       </a:r>
                     </a:p>
                   </a:txBody>
@@ -29650,19 +31338,19 @@
                 </a:tc>
                 <a:extLst>
                   <a:ext uri="{0D108BD9-81ED-4DB2-BD59-A6C34878D82A}">
-                    <a16:rowId xmlns:a16="http://schemas.microsoft.com/office/drawing/2014/main" val="3044347824"/>
+                    <a16:rowId xmlns:a16="http://schemas.microsoft.com/office/drawing/2014/main" val="3047824491"/>
                   </a:ext>
                 </a:extLst>
               </a:tr>
-              <a:tr h="292180">
+              <a:tr h="370840">
                 <a:tc>
                   <a:txBody>
                     <a:bodyPr/>
                     <a:lstStyle/>
                     <a:p>
                       <a:r>
-                        <a:rPr lang="en-US" dirty="0"/>
-                        <a:t>Controls</a:t>
+                        <a:rPr lang="en-US" sz="1200" dirty="0"/>
+                        <a:t>R5</a:t>
                       </a:r>
                     </a:p>
                   </a:txBody>
@@ -29674,8 +31362,8 @@
                     <a:lstStyle/>
                     <a:p>
                       <a:r>
-                        <a:rPr lang="en-US" dirty="0"/>
-                        <a:t>D – Touch Controls</a:t>
+                        <a:rPr lang="en-US" sz="1200" dirty="0"/>
+                        <a:t>The game must have music and sound effects.</a:t>
                       </a:r>
                     </a:p>
                   </a:txBody>
@@ -29687,8 +31375,8 @@
                     <a:lstStyle/>
                     <a:p>
                       <a:r>
-                        <a:rPr lang="en-US" dirty="0"/>
-                        <a:t>Mandatory</a:t>
+                        <a:rPr lang="en-US" sz="1200" dirty="0"/>
+                        <a:t>Visible</a:t>
                       </a:r>
                     </a:p>
                   </a:txBody>
@@ -29696,7 +31384,53 @@
                 </a:tc>
                 <a:extLst>
                   <a:ext uri="{0D108BD9-81ED-4DB2-BD59-A6C34878D82A}">
-                    <a16:rowId xmlns:a16="http://schemas.microsoft.com/office/drawing/2014/main" val="1830734360"/>
+                    <a16:rowId xmlns:a16="http://schemas.microsoft.com/office/drawing/2014/main" val="2085931372"/>
+                  </a:ext>
+                </a:extLst>
+              </a:tr>
+              <a:tr h="370840">
+                <a:tc>
+                  <a:txBody>
+                    <a:bodyPr/>
+                    <a:lstStyle/>
+                    <a:p>
+                      <a:r>
+                        <a:rPr lang="en-US" sz="1200" dirty="0"/>
+                        <a:t>R6</a:t>
+                      </a:r>
+                    </a:p>
+                  </a:txBody>
+                  <a:tcPr/>
+                </a:tc>
+                <a:tc>
+                  <a:txBody>
+                    <a:bodyPr/>
+                    <a:lstStyle/>
+                    <a:p>
+                      <a:r>
+                        <a:rPr lang="en-US" sz="1200" dirty="0"/>
+                        <a:t>The game must save the user’s data</a:t>
+                      </a:r>
+                    </a:p>
+                  </a:txBody>
+                  <a:tcPr/>
+                </a:tc>
+                <a:tc>
+                  <a:txBody>
+                    <a:bodyPr/>
+                    <a:lstStyle/>
+                    <a:p>
+                      <a:r>
+                        <a:rPr lang="en-US" sz="1200" dirty="0"/>
+                        <a:t>Invisible</a:t>
+                      </a:r>
+                    </a:p>
+                  </a:txBody>
+                  <a:tcPr/>
+                </a:tc>
+                <a:extLst>
+                  <a:ext uri="{0D108BD9-81ED-4DB2-BD59-A6C34878D82A}">
+                    <a16:rowId xmlns:a16="http://schemas.microsoft.com/office/drawing/2014/main" val="4138630267"/>
                   </a:ext>
                 </a:extLst>
               </a:tr>
@@ -29706,10 +31440,10 @@
       </p:graphicFrame>
       <p:sp>
         <p:nvSpPr>
-          <p:cNvPr id="3" name="Google Shape;531;p73">
+          <p:cNvPr id="4" name="Google Shape;531;p73">
             <a:extLst>
               <a:ext uri="{FF2B5EF4-FFF2-40B4-BE49-F238E27FC236}">
-                <a16:creationId xmlns:a16="http://schemas.microsoft.com/office/drawing/2014/main" id="{E304DDC4-BF6D-5FDB-1CDA-BFF69B6716EF}"/>
+                <a16:creationId xmlns:a16="http://schemas.microsoft.com/office/drawing/2014/main" id="{6858B4FE-6B67-70A9-3027-BC017B8010BF}"/>
               </a:ext>
             </a:extLst>
           </p:cNvPr>
@@ -29720,8 +31454,8 @@
         </p:nvSpPr>
         <p:spPr>
           <a:xfrm>
-            <a:off x="8427719" y="4710914"/>
-            <a:ext cx="716281" cy="432586"/>
+            <a:off x="7993856" y="4710914"/>
+            <a:ext cx="890594" cy="432586"/>
           </a:xfrm>
           <a:prstGeom prst="rect">
             <a:avLst/>
@@ -29983,10 +31717,10 @@
             </a:lvl9pPr>
           </a:lstStyle>
           <a:p>
-            <a:pPr marL="88900" indent="0"/>
+            <a:pPr marL="88900" indent="0" algn="r"/>
             <a:r>
               <a:rPr lang="en" dirty="0"/>
-              <a:t>9/11</a:t>
+              <a:t>10/11</a:t>
             </a:r>
           </a:p>
         </p:txBody>
@@ -29994,7 +31728,7 @@
     </p:spTree>
     <p:extLst>
       <p:ext uri="{BB962C8B-B14F-4D97-AF65-F5344CB8AC3E}">
-        <p14:creationId xmlns:p14="http://schemas.microsoft.com/office/powerpoint/2010/main" val="2119097399"/>
+        <p14:creationId xmlns:p14="http://schemas.microsoft.com/office/powerpoint/2010/main" val="1649728121"/>
       </p:ext>
     </p:extLst>
   </p:cSld>

</xml_diff>